<commit_message>
lagt til mer i pp-en
</commit_message>
<xml_diff>
--- a/Quinizarin som en organisk sensitizer I et tynnfilm.pptx
+++ b/Quinizarin som en organisk sensitizer I et tynnfilm.pptx
@@ -5,7 +5,7 @@
     <p:sldMasterId id="2147483660" r:id="rId1"/>
   </p:sldMasterIdLst>
   <p:notesMasterIdLst>
-    <p:notesMasterId r:id="rId13"/>
+    <p:notesMasterId r:id="rId16"/>
   </p:notesMasterIdLst>
   <p:sldIdLst>
     <p:sldId id="256" r:id="rId2"/>
@@ -16,9 +16,12 @@
     <p:sldId id="260" r:id="rId7"/>
     <p:sldId id="261" r:id="rId8"/>
     <p:sldId id="263" r:id="rId9"/>
-    <p:sldId id="265" r:id="rId10"/>
-    <p:sldId id="264" r:id="rId11"/>
-    <p:sldId id="266" r:id="rId12"/>
+    <p:sldId id="269" r:id="rId10"/>
+    <p:sldId id="267" r:id="rId11"/>
+    <p:sldId id="265" r:id="rId12"/>
+    <p:sldId id="264" r:id="rId13"/>
+    <p:sldId id="266" r:id="rId14"/>
+    <p:sldId id="270" r:id="rId15"/>
   </p:sldIdLst>
   <p:sldSz cx="12192000" cy="6858000"/>
   <p:notesSz cx="6858000" cy="9144000"/>
@@ -117,6 +120,11 @@
       </a:defRPr>
     </a:lvl9pPr>
   </p:defaultTextStyle>
+  <p:extLst>
+    <p:ext uri="{EFAFB233-063F-42B5-8137-9DF3F51BA10A}">
+      <p15:sldGuideLst xmlns:p15="http://schemas.microsoft.com/office/powerpoint/2012/main"/>
+    </p:ext>
+  </p:extLst>
 </p:presentation>
 </file>
 
@@ -202,7 +210,7 @@
           <a:p>
             <a:fld id="{777B9218-BA03-4DAA-9319-CAA116347D98}" type="datetimeFigureOut">
               <a:rPr lang="en-US" smtClean="0"/>
-              <a:t>12/1/2020</a:t>
+              <a:t>12/1/20</a:t>
             </a:fld>
             <a:endParaRPr lang="en-US"/>
           </a:p>
@@ -515,88 +523,88 @@
           <a:lstStyle/>
           <a:p>
             <a:r>
-              <a:rPr lang="nb-NO" dirty="0"/>
+              <a:rPr lang="nb-NO" sz="1200" dirty="0"/>
               <a:t>ESA: </a:t>
             </a:r>
             <a:r>
-              <a:rPr lang="nb-NO" dirty="0" err="1"/>
+              <a:rPr lang="nb-NO" sz="1200" dirty="0" err="1"/>
               <a:t>Excited</a:t>
             </a:r>
             <a:r>
-              <a:rPr lang="nb-NO" dirty="0"/>
+              <a:rPr lang="nb-NO" sz="1200" dirty="0"/>
               <a:t> State </a:t>
             </a:r>
             <a:r>
-              <a:rPr lang="nb-NO" dirty="0" err="1"/>
+              <a:rPr lang="nb-NO" sz="1200" dirty="0" err="1"/>
               <a:t>Absorption</a:t>
             </a:r>
             <a:br>
-              <a:rPr lang="nb-NO" dirty="0"/>
+              <a:rPr lang="nb-NO" sz="1200" dirty="0"/>
             </a:br>
             <a:r>
-              <a:rPr lang="nb-NO" dirty="0"/>
+              <a:rPr lang="nb-NO" sz="1200" dirty="0"/>
               <a:t>ETU: Energy Transfer </a:t>
             </a:r>
             <a:r>
-              <a:rPr lang="nb-NO" dirty="0" err="1"/>
+              <a:rPr lang="nb-NO" sz="1200" dirty="0" err="1"/>
               <a:t>Upconversion</a:t>
             </a:r>
-            <a:endParaRPr lang="nb-NO" dirty="0"/>
+            <a:endParaRPr lang="nb-NO" sz="1200" dirty="0"/>
           </a:p>
           <a:p>
             <a:r>
-              <a:rPr lang="nb-NO" dirty="0"/>
+              <a:rPr lang="nb-NO" sz="1200" dirty="0"/>
               <a:t>EMU: Energy </a:t>
             </a:r>
             <a:r>
-              <a:rPr lang="nb-NO" dirty="0" err="1"/>
+              <a:rPr lang="nb-NO" sz="1200" dirty="0" err="1"/>
               <a:t>Migrated-mediated</a:t>
             </a:r>
             <a:r>
-              <a:rPr lang="nb-NO" dirty="0"/>
+              <a:rPr lang="nb-NO" sz="1200" dirty="0"/>
               <a:t> </a:t>
             </a:r>
             <a:r>
-              <a:rPr lang="nb-NO" dirty="0" err="1"/>
+              <a:rPr lang="nb-NO" sz="1200" dirty="0" err="1"/>
               <a:t>Upconversion</a:t>
             </a:r>
             <a:r>
-              <a:rPr lang="nb-NO" dirty="0"/>
+              <a:rPr lang="nb-NO" sz="1200" dirty="0"/>
               <a:t>. 1: </a:t>
             </a:r>
             <a:r>
-              <a:rPr lang="nb-NO" dirty="0" err="1"/>
+              <a:rPr lang="nb-NO" sz="1200" dirty="0" err="1"/>
               <a:t>Sensitizer</a:t>
             </a:r>
             <a:r>
-              <a:rPr lang="nb-NO" dirty="0"/>
+              <a:rPr lang="nb-NO" sz="1200" dirty="0"/>
               <a:t>, 2: </a:t>
             </a:r>
             <a:r>
-              <a:rPr lang="nb-NO" dirty="0" err="1"/>
+              <a:rPr lang="nb-NO" sz="1200" dirty="0" err="1"/>
               <a:t>Migrator</a:t>
             </a:r>
             <a:r>
-              <a:rPr lang="nb-NO" dirty="0"/>
+              <a:rPr lang="nb-NO" sz="1200" dirty="0"/>
               <a:t>, 3: </a:t>
             </a:r>
             <a:r>
-              <a:rPr lang="nb-NO" dirty="0" err="1"/>
+              <a:rPr lang="nb-NO" sz="1200" dirty="0" err="1"/>
               <a:t>Accumulator</a:t>
             </a:r>
             <a:r>
-              <a:rPr lang="nb-NO" dirty="0"/>
+              <a:rPr lang="nb-NO" sz="1200" dirty="0"/>
               <a:t>, 4: </a:t>
             </a:r>
             <a:r>
-              <a:rPr lang="nb-NO" dirty="0" err="1"/>
+              <a:rPr lang="nb-NO" sz="1200" dirty="0" err="1"/>
               <a:t>Activator</a:t>
             </a:r>
             <a:r>
-              <a:rPr lang="nb-NO" dirty="0"/>
+              <a:rPr lang="nb-NO" sz="1200" dirty="0"/>
               <a:t>.</a:t>
             </a:r>
-            <a:endParaRPr lang="en-US" dirty="0"/>
+            <a:endParaRPr lang="en-US" sz="1200" dirty="0"/>
           </a:p>
         </p:txBody>
       </p:sp>
@@ -627,6 +635,117 @@
     <p:extLst>
       <p:ext uri="{BB962C8B-B14F-4D97-AF65-F5344CB8AC3E}">
         <p14:creationId xmlns:p14="http://schemas.microsoft.com/office/powerpoint/2010/main" val="764898039"/>
+      </p:ext>
+    </p:extLst>
+  </p:cSld>
+  <p:clrMapOvr>
+    <a:masterClrMapping/>
+  </p:clrMapOvr>
+</p:notes>
+</file>
+
+<file path=ppt/notesSlides/notesSlide2.xml><?xml version="1.0" encoding="utf-8"?>
+<p:notes xmlns:a="http://schemas.openxmlformats.org/drawingml/2006/main" xmlns:r="http://schemas.openxmlformats.org/officeDocument/2006/relationships" xmlns:p="http://schemas.openxmlformats.org/presentationml/2006/main">
+  <p:cSld>
+    <p:spTree>
+      <p:nvGrpSpPr>
+        <p:cNvPr id="1" name=""/>
+        <p:cNvGrpSpPr/>
+        <p:nvPr/>
+      </p:nvGrpSpPr>
+      <p:grpSpPr>
+        <a:xfrm>
+          <a:off x="0" y="0"/>
+          <a:ext cx="0" cy="0"/>
+          <a:chOff x="0" y="0"/>
+          <a:chExt cx="0" cy="0"/>
+        </a:xfrm>
+      </p:grpSpPr>
+      <p:sp>
+        <p:nvSpPr>
+          <p:cNvPr id="2" name="Plassholder for lysbilde 1"/>
+          <p:cNvSpPr>
+            <a:spLocks noGrp="1" noRot="1" noChangeAspect="1"/>
+          </p:cNvSpPr>
+          <p:nvPr>
+            <p:ph type="sldImg"/>
+          </p:nvPr>
+        </p:nvSpPr>
+        <p:spPr/>
+      </p:sp>
+      <p:sp>
+        <p:nvSpPr>
+          <p:cNvPr id="3" name="Plassholder for notater 2"/>
+          <p:cNvSpPr>
+            <a:spLocks noGrp="1"/>
+          </p:cNvSpPr>
+          <p:nvPr>
+            <p:ph type="body" idx="1"/>
+          </p:nvPr>
+        </p:nvSpPr>
+        <p:spPr/>
+        <p:txBody>
+          <a:bodyPr/>
+          <a:lstStyle/>
+          <a:p>
+            <a:r>
+              <a:rPr lang="nb-NO" dirty="0"/>
+              <a:t>Endrer på </a:t>
+            </a:r>
+            <a:r>
+              <a:rPr lang="nb-NO" dirty="0" err="1"/>
+              <a:t>nelm</a:t>
+            </a:r>
+            <a:r>
+              <a:rPr lang="nb-NO" dirty="0"/>
+              <a:t>, </a:t>
+            </a:r>
+            <a:r>
+              <a:rPr lang="nb-NO" dirty="0" err="1"/>
+              <a:t>ibrion</a:t>
+            </a:r>
+            <a:r>
+              <a:rPr lang="nb-NO" dirty="0"/>
+              <a:t>, </a:t>
+            </a:r>
+            <a:r>
+              <a:rPr lang="nb-NO" dirty="0" err="1"/>
+              <a:t>potim</a:t>
+            </a:r>
+            <a:r>
+              <a:rPr lang="nb-NO" dirty="0"/>
+              <a:t> </a:t>
+            </a:r>
+          </a:p>
+        </p:txBody>
+      </p:sp>
+      <p:sp>
+        <p:nvSpPr>
+          <p:cNvPr id="4" name="Plassholder for lysbildenummer 3"/>
+          <p:cNvSpPr>
+            <a:spLocks noGrp="1"/>
+          </p:cNvSpPr>
+          <p:nvPr>
+            <p:ph type="sldNum" sz="quarter" idx="5"/>
+          </p:nvPr>
+        </p:nvSpPr>
+        <p:spPr/>
+        <p:txBody>
+          <a:bodyPr/>
+          <a:lstStyle/>
+          <a:p>
+            <a:fld id="{8D788C1A-5050-4824-90DC-C83F32F96AFC}" type="slidenum">
+              <a:rPr lang="en-US" smtClean="0"/>
+              <a:t>13</a:t>
+            </a:fld>
+            <a:endParaRPr lang="en-US"/>
+          </a:p>
+        </p:txBody>
+      </p:sp>
+    </p:spTree>
+    <p:extLst>
+      <p:ext uri="{BB962C8B-B14F-4D97-AF65-F5344CB8AC3E}">
+        <p14:creationId xmlns:p14="http://schemas.microsoft.com/office/powerpoint/2010/main" val="2977609161"/>
       </p:ext>
     </p:extLst>
   </p:cSld>
@@ -686,7 +805,7 @@
           <a:noFill/>
           <a:extLst>
             <a:ext uri="{909E8E84-426E-40dd-AFC4-6F175D3DCCD1}">
-              <a14:hiddenFill xmlns:a14="http://schemas.microsoft.com/office/drawing/2010/main" xmlns="">
+              <a14:hiddenFill xmlns="" xmlns:a14="http://schemas.microsoft.com/office/drawing/2010/main">
                 <a:solidFill>
                   <a:srgbClr val="FFFFFF"/>
                 </a:solidFill>
@@ -746,7 +865,7 @@
             </a:ln>
             <a:extLst>
               <a:ext uri="{91240B29-F687-4f45-9708-019B960494DF}">
-                <a14:hiddenLine xmlns:a14="http://schemas.microsoft.com/office/drawing/2010/main" xmlns="" w="9525">
+                <a14:hiddenLine xmlns="" xmlns:a14="http://schemas.microsoft.com/office/drawing/2010/main" w="9525">
                   <a:solidFill>
                     <a:srgbClr val="000000"/>
                   </a:solidFill>
@@ -836,7 +955,7 @@
             </a:ln>
             <a:extLst>
               <a:ext uri="{91240B29-F687-4f45-9708-019B960494DF}">
-                <a14:hiddenLine xmlns:a14="http://schemas.microsoft.com/office/drawing/2010/main" xmlns="" w="9525">
+                <a14:hiddenLine xmlns="" xmlns:a14="http://schemas.microsoft.com/office/drawing/2010/main" w="9525">
                   <a:solidFill>
                     <a:srgbClr val="000000"/>
                   </a:solidFill>
@@ -926,7 +1045,7 @@
             </a:ln>
             <a:extLst>
               <a:ext uri="{91240B29-F687-4f45-9708-019B960494DF}">
-                <a14:hiddenLine xmlns:a14="http://schemas.microsoft.com/office/drawing/2010/main" xmlns="" w="9525">
+                <a14:hiddenLine xmlns="" xmlns:a14="http://schemas.microsoft.com/office/drawing/2010/main" w="9525">
                   <a:solidFill>
                     <a:srgbClr val="000000"/>
                   </a:solidFill>
@@ -960,7 +1079,7 @@
             </a:ln>
             <a:extLst>
               <a:ext uri="{91240B29-F687-4f45-9708-019B960494DF}">
-                <a14:hiddenLine xmlns:a14="http://schemas.microsoft.com/office/drawing/2010/main" xmlns="" w="9525">
+                <a14:hiddenLine xmlns="" xmlns:a14="http://schemas.microsoft.com/office/drawing/2010/main" w="9525">
                   <a:solidFill>
                     <a:srgbClr val="000000"/>
                   </a:solidFill>
@@ -1050,7 +1169,7 @@
             </a:ln>
             <a:extLst>
               <a:ext uri="{91240B29-F687-4f45-9708-019B960494DF}">
-                <a14:hiddenLine xmlns:a14="http://schemas.microsoft.com/office/drawing/2010/main" xmlns="" w="9525">
+                <a14:hiddenLine xmlns="" xmlns:a14="http://schemas.microsoft.com/office/drawing/2010/main" w="9525">
                   <a:solidFill>
                     <a:srgbClr val="000000"/>
                   </a:solidFill>
@@ -1112,7 +1231,7 @@
             </a:ln>
             <a:extLst>
               <a:ext uri="{91240B29-F687-4f45-9708-019B960494DF}">
-                <a14:hiddenLine xmlns:a14="http://schemas.microsoft.com/office/drawing/2010/main" xmlns="" w="9525">
+                <a14:hiddenLine xmlns="" xmlns:a14="http://schemas.microsoft.com/office/drawing/2010/main" w="9525">
                   <a:solidFill>
                     <a:srgbClr val="000000"/>
                   </a:solidFill>
@@ -1174,7 +1293,7 @@
             </a:ln>
             <a:extLst>
               <a:ext uri="{91240B29-F687-4f45-9708-019B960494DF}">
-                <a14:hiddenLine xmlns:a14="http://schemas.microsoft.com/office/drawing/2010/main" xmlns="" w="9525">
+                <a14:hiddenLine xmlns="" xmlns:a14="http://schemas.microsoft.com/office/drawing/2010/main" w="9525">
                   <a:solidFill>
                     <a:srgbClr val="000000"/>
                   </a:solidFill>
@@ -1264,7 +1383,7 @@
             </a:ln>
             <a:extLst>
               <a:ext uri="{91240B29-F687-4f45-9708-019B960494DF}">
-                <a14:hiddenLine xmlns:a14="http://schemas.microsoft.com/office/drawing/2010/main" xmlns="" w="9525">
+                <a14:hiddenLine xmlns="" xmlns:a14="http://schemas.microsoft.com/office/drawing/2010/main" w="9525">
                   <a:solidFill>
                     <a:srgbClr val="000000"/>
                   </a:solidFill>
@@ -1326,7 +1445,7 @@
             </a:ln>
             <a:extLst>
               <a:ext uri="{91240B29-F687-4f45-9708-019B960494DF}">
-                <a14:hiddenLine xmlns:a14="http://schemas.microsoft.com/office/drawing/2010/main" xmlns="" w="9525">
+                <a14:hiddenLine xmlns="" xmlns:a14="http://schemas.microsoft.com/office/drawing/2010/main" w="9525">
                   <a:solidFill>
                     <a:srgbClr val="000000"/>
                   </a:solidFill>
@@ -1388,7 +1507,7 @@
             </a:ln>
             <a:extLst>
               <a:ext uri="{91240B29-F687-4f45-9708-019B960494DF}">
-                <a14:hiddenLine xmlns:a14="http://schemas.microsoft.com/office/drawing/2010/main" xmlns="" w="9525">
+                <a14:hiddenLine xmlns="" xmlns:a14="http://schemas.microsoft.com/office/drawing/2010/main" w="9525">
                   <a:solidFill>
                     <a:srgbClr val="000000"/>
                   </a:solidFill>
@@ -1478,7 +1597,7 @@
             </a:ln>
             <a:extLst>
               <a:ext uri="{91240B29-F687-4f45-9708-019B960494DF}">
-                <a14:hiddenLine xmlns:a14="http://schemas.microsoft.com/office/drawing/2010/main" xmlns="" w="9525">
+                <a14:hiddenLine xmlns="" xmlns:a14="http://schemas.microsoft.com/office/drawing/2010/main" w="9525">
                   <a:solidFill>
                     <a:srgbClr val="000000"/>
                   </a:solidFill>
@@ -1568,7 +1687,7 @@
             </a:ln>
             <a:extLst>
               <a:ext uri="{91240B29-F687-4f45-9708-019B960494DF}">
-                <a14:hiddenLine xmlns:a14="http://schemas.microsoft.com/office/drawing/2010/main" xmlns="" w="9525">
+                <a14:hiddenLine xmlns="" xmlns:a14="http://schemas.microsoft.com/office/drawing/2010/main" w="9525">
                   <a:solidFill>
                     <a:srgbClr val="000000"/>
                   </a:solidFill>
@@ -1630,7 +1749,7 @@
             </a:ln>
             <a:extLst>
               <a:ext uri="{91240B29-F687-4f45-9708-019B960494DF}">
-                <a14:hiddenLine xmlns:a14="http://schemas.microsoft.com/office/drawing/2010/main" xmlns="" w="9525">
+                <a14:hiddenLine xmlns="" xmlns:a14="http://schemas.microsoft.com/office/drawing/2010/main" w="9525">
                   <a:solidFill>
                     <a:srgbClr val="000000"/>
                   </a:solidFill>
@@ -1740,7 +1859,7 @@
             </a:ln>
             <a:extLst>
               <a:ext uri="{91240B29-F687-4f45-9708-019B960494DF}">
-                <a14:hiddenLine xmlns:a14="http://schemas.microsoft.com/office/drawing/2010/main" xmlns="" w="9525">
+                <a14:hiddenLine xmlns="" xmlns:a14="http://schemas.microsoft.com/office/drawing/2010/main" w="9525">
                   <a:solidFill>
                     <a:srgbClr val="000000"/>
                   </a:solidFill>
@@ -1802,7 +1921,7 @@
             </a:ln>
             <a:extLst>
               <a:ext uri="{91240B29-F687-4f45-9708-019B960494DF}">
-                <a14:hiddenLine xmlns:a14="http://schemas.microsoft.com/office/drawing/2010/main" xmlns="" w="9525">
+                <a14:hiddenLine xmlns="" xmlns:a14="http://schemas.microsoft.com/office/drawing/2010/main" w="9525">
                   <a:solidFill>
                     <a:srgbClr val="000000"/>
                   </a:solidFill>
@@ -1892,7 +2011,7 @@
             </a:ln>
             <a:extLst>
               <a:ext uri="{91240B29-F687-4f45-9708-019B960494DF}">
-                <a14:hiddenLine xmlns:a14="http://schemas.microsoft.com/office/drawing/2010/main" xmlns="" w="9525">
+                <a14:hiddenLine xmlns="" xmlns:a14="http://schemas.microsoft.com/office/drawing/2010/main" w="9525">
                   <a:solidFill>
                     <a:srgbClr val="000000"/>
                   </a:solidFill>
@@ -1982,7 +2101,7 @@
             </a:ln>
             <a:extLst>
               <a:ext uri="{91240B29-F687-4f45-9708-019B960494DF}">
-                <a14:hiddenLine xmlns:a14="http://schemas.microsoft.com/office/drawing/2010/main" xmlns="" w="9525">
+                <a14:hiddenLine xmlns="" xmlns:a14="http://schemas.microsoft.com/office/drawing/2010/main" w="9525">
                   <a:solidFill>
                     <a:srgbClr val="000000"/>
                   </a:solidFill>
@@ -2044,7 +2163,7 @@
             </a:ln>
             <a:extLst>
               <a:ext uri="{91240B29-F687-4f45-9708-019B960494DF}">
-                <a14:hiddenLine xmlns:a14="http://schemas.microsoft.com/office/drawing/2010/main" xmlns="" w="9525">
+                <a14:hiddenLine xmlns="" xmlns:a14="http://schemas.microsoft.com/office/drawing/2010/main" w="9525">
                   <a:solidFill>
                     <a:srgbClr val="000000"/>
                   </a:solidFill>
@@ -2134,7 +2253,7 @@
             </a:ln>
             <a:extLst>
               <a:ext uri="{91240B29-F687-4f45-9708-019B960494DF}">
-                <a14:hiddenLine xmlns:a14="http://schemas.microsoft.com/office/drawing/2010/main" xmlns="" w="9525">
+                <a14:hiddenLine xmlns="" xmlns:a14="http://schemas.microsoft.com/office/drawing/2010/main" w="9525">
                   <a:solidFill>
                     <a:srgbClr val="000000"/>
                   </a:solidFill>
@@ -2224,7 +2343,7 @@
             </a:ln>
             <a:extLst>
               <a:ext uri="{91240B29-F687-4f45-9708-019B960494DF}">
-                <a14:hiddenLine xmlns:a14="http://schemas.microsoft.com/office/drawing/2010/main" xmlns="" w="9525">
+                <a14:hiddenLine xmlns="" xmlns:a14="http://schemas.microsoft.com/office/drawing/2010/main" w="9525">
                   <a:solidFill>
                     <a:srgbClr val="000000"/>
                   </a:solidFill>
@@ -2280,7 +2399,7 @@
             </a:ln>
             <a:extLst>
               <a:ext uri="{91240B29-F687-4f45-9708-019B960494DF}">
-                <a14:hiddenLine xmlns:a14="http://schemas.microsoft.com/office/drawing/2010/main" xmlns="" w="9525">
+                <a14:hiddenLine xmlns="" xmlns:a14="http://schemas.microsoft.com/office/drawing/2010/main" w="9525">
                   <a:solidFill>
                     <a:srgbClr val="000000"/>
                   </a:solidFill>
@@ -2370,7 +2489,7 @@
             </a:ln>
             <a:extLst>
               <a:ext uri="{91240B29-F687-4f45-9708-019B960494DF}">
-                <a14:hiddenLine xmlns:a14="http://schemas.microsoft.com/office/drawing/2010/main" xmlns="" w="9525">
+                <a14:hiddenLine xmlns="" xmlns:a14="http://schemas.microsoft.com/office/drawing/2010/main" w="9525">
                   <a:solidFill>
                     <a:srgbClr val="000000"/>
                   </a:solidFill>
@@ -2426,7 +2545,7 @@
             </a:ln>
             <a:extLst>
               <a:ext uri="{91240B29-F687-4f45-9708-019B960494DF}">
-                <a14:hiddenLine xmlns:a14="http://schemas.microsoft.com/office/drawing/2010/main" xmlns="" w="9525">
+                <a14:hiddenLine xmlns="" xmlns:a14="http://schemas.microsoft.com/office/drawing/2010/main" w="9525">
                   <a:solidFill>
                     <a:srgbClr val="000000"/>
                   </a:solidFill>
@@ -2516,7 +2635,7 @@
             </a:ln>
             <a:extLst>
               <a:ext uri="{91240B29-F687-4f45-9708-019B960494DF}">
-                <a14:hiddenLine xmlns:a14="http://schemas.microsoft.com/office/drawing/2010/main" xmlns="" w="9525">
+                <a14:hiddenLine xmlns="" xmlns:a14="http://schemas.microsoft.com/office/drawing/2010/main" w="9525">
                   <a:solidFill>
                     <a:srgbClr val="000000"/>
                   </a:solidFill>
@@ -2584,7 +2703,7 @@
             </a:ln>
             <a:extLst>
               <a:ext uri="{91240B29-F687-4f45-9708-019B960494DF}">
-                <a14:hiddenLine xmlns:a14="http://schemas.microsoft.com/office/drawing/2010/main" xmlns="" w="9525">
+                <a14:hiddenLine xmlns="" xmlns:a14="http://schemas.microsoft.com/office/drawing/2010/main" w="9525">
                   <a:solidFill>
                     <a:srgbClr val="000000"/>
                   </a:solidFill>
@@ -2674,7 +2793,7 @@
             </a:ln>
             <a:extLst>
               <a:ext uri="{91240B29-F687-4f45-9708-019B960494DF}">
-                <a14:hiddenLine xmlns:a14="http://schemas.microsoft.com/office/drawing/2010/main" xmlns="" w="9525">
+                <a14:hiddenLine xmlns="" xmlns:a14="http://schemas.microsoft.com/office/drawing/2010/main" w="9525">
                   <a:solidFill>
                     <a:srgbClr val="000000"/>
                   </a:solidFill>
@@ -2742,7 +2861,7 @@
             </a:ln>
             <a:extLst>
               <a:ext uri="{91240B29-F687-4f45-9708-019B960494DF}">
-                <a14:hiddenLine xmlns:a14="http://schemas.microsoft.com/office/drawing/2010/main" xmlns="" w="9525">
+                <a14:hiddenLine xmlns="" xmlns:a14="http://schemas.microsoft.com/office/drawing/2010/main" w="9525">
                   <a:solidFill>
                     <a:srgbClr val="000000"/>
                   </a:solidFill>
@@ -2832,7 +2951,7 @@
             </a:ln>
             <a:extLst>
               <a:ext uri="{91240B29-F687-4f45-9708-019B960494DF}">
-                <a14:hiddenLine xmlns:a14="http://schemas.microsoft.com/office/drawing/2010/main" xmlns="" w="9525">
+                <a14:hiddenLine xmlns="" xmlns:a14="http://schemas.microsoft.com/office/drawing/2010/main" w="9525">
                   <a:solidFill>
                     <a:srgbClr val="000000"/>
                   </a:solidFill>
@@ -2866,7 +2985,7 @@
             </a:ln>
             <a:extLst>
               <a:ext uri="{91240B29-F687-4f45-9708-019B960494DF}">
-                <a14:hiddenLine xmlns:a14="http://schemas.microsoft.com/office/drawing/2010/main" xmlns="" w="9525">
+                <a14:hiddenLine xmlns="" xmlns:a14="http://schemas.microsoft.com/office/drawing/2010/main" w="9525">
                   <a:solidFill>
                     <a:srgbClr val="000000"/>
                   </a:solidFill>
@@ -2956,7 +3075,7 @@
             </a:ln>
             <a:extLst>
               <a:ext uri="{91240B29-F687-4f45-9708-019B960494DF}">
-                <a14:hiddenLine xmlns:a14="http://schemas.microsoft.com/office/drawing/2010/main" xmlns="" w="9525">
+                <a14:hiddenLine xmlns="" xmlns:a14="http://schemas.microsoft.com/office/drawing/2010/main" w="9525">
                   <a:solidFill>
                     <a:srgbClr val="000000"/>
                   </a:solidFill>
@@ -3018,7 +3137,7 @@
             </a:ln>
             <a:extLst>
               <a:ext uri="{91240B29-F687-4f45-9708-019B960494DF}">
-                <a14:hiddenLine xmlns:a14="http://schemas.microsoft.com/office/drawing/2010/main" xmlns="" w="9525">
+                <a14:hiddenLine xmlns="" xmlns:a14="http://schemas.microsoft.com/office/drawing/2010/main" w="9525">
                   <a:solidFill>
                     <a:srgbClr val="000000"/>
                   </a:solidFill>
@@ -3080,7 +3199,7 @@
             </a:ln>
             <a:extLst>
               <a:ext uri="{91240B29-F687-4f45-9708-019B960494DF}">
-                <a14:hiddenLine xmlns:a14="http://schemas.microsoft.com/office/drawing/2010/main" xmlns="" w="9525">
+                <a14:hiddenLine xmlns="" xmlns:a14="http://schemas.microsoft.com/office/drawing/2010/main" w="9525">
                   <a:solidFill>
                     <a:srgbClr val="000000"/>
                   </a:solidFill>
@@ -3170,7 +3289,7 @@
             </a:ln>
             <a:extLst>
               <a:ext uri="{91240B29-F687-4f45-9708-019B960494DF}">
-                <a14:hiddenLine xmlns:a14="http://schemas.microsoft.com/office/drawing/2010/main" xmlns="" w="9525">
+                <a14:hiddenLine xmlns="" xmlns:a14="http://schemas.microsoft.com/office/drawing/2010/main" w="9525">
                   <a:solidFill>
                     <a:srgbClr val="000000"/>
                   </a:solidFill>
@@ -3238,7 +3357,7 @@
             </a:ln>
             <a:extLst>
               <a:ext uri="{91240B29-F687-4f45-9708-019B960494DF}">
-                <a14:hiddenLine xmlns:a14="http://schemas.microsoft.com/office/drawing/2010/main" xmlns="" w="9525">
+                <a14:hiddenLine xmlns="" xmlns:a14="http://schemas.microsoft.com/office/drawing/2010/main" w="9525">
                   <a:solidFill>
                     <a:srgbClr val="000000"/>
                   </a:solidFill>
@@ -3300,7 +3419,7 @@
             </a:ln>
             <a:extLst>
               <a:ext uri="{91240B29-F687-4f45-9708-019B960494DF}">
-                <a14:hiddenLine xmlns:a14="http://schemas.microsoft.com/office/drawing/2010/main" xmlns="" w="9525">
+                <a14:hiddenLine xmlns="" xmlns:a14="http://schemas.microsoft.com/office/drawing/2010/main" w="9525">
                   <a:solidFill>
                     <a:srgbClr val="000000"/>
                   </a:solidFill>
@@ -3390,7 +3509,7 @@
             </a:ln>
             <a:extLst>
               <a:ext uri="{91240B29-F687-4f45-9708-019B960494DF}">
-                <a14:hiddenLine xmlns:a14="http://schemas.microsoft.com/office/drawing/2010/main" xmlns="" w="9525">
+                <a14:hiddenLine xmlns="" xmlns:a14="http://schemas.microsoft.com/office/drawing/2010/main" w="9525">
                   <a:solidFill>
                     <a:srgbClr val="000000"/>
                   </a:solidFill>
@@ -3452,7 +3571,7 @@
             </a:ln>
             <a:extLst>
               <a:ext uri="{91240B29-F687-4f45-9708-019B960494DF}">
-                <a14:hiddenLine xmlns:a14="http://schemas.microsoft.com/office/drawing/2010/main" xmlns="" w="9525">
+                <a14:hiddenLine xmlns="" xmlns:a14="http://schemas.microsoft.com/office/drawing/2010/main" w="9525">
                   <a:solidFill>
                     <a:srgbClr val="000000"/>
                   </a:solidFill>
@@ -3542,7 +3661,7 @@
             </a:ln>
             <a:extLst>
               <a:ext uri="{91240B29-F687-4f45-9708-019B960494DF}">
-                <a14:hiddenLine xmlns:a14="http://schemas.microsoft.com/office/drawing/2010/main" xmlns="" w="9525">
+                <a14:hiddenLine xmlns="" xmlns:a14="http://schemas.microsoft.com/office/drawing/2010/main" w="9525">
                   <a:solidFill>
                     <a:srgbClr val="000000"/>
                   </a:solidFill>
@@ -3604,7 +3723,7 @@
             </a:ln>
             <a:extLst>
               <a:ext uri="{91240B29-F687-4f45-9708-019B960494DF}">
-                <a14:hiddenLine xmlns:a14="http://schemas.microsoft.com/office/drawing/2010/main" xmlns="" w="9525">
+                <a14:hiddenLine xmlns="" xmlns:a14="http://schemas.microsoft.com/office/drawing/2010/main" w="9525">
                   <a:solidFill>
                     <a:srgbClr val="000000"/>
                   </a:solidFill>
@@ -3694,7 +3813,7 @@
             </a:ln>
             <a:extLst>
               <a:ext uri="{91240B29-F687-4f45-9708-019B960494DF}">
-                <a14:hiddenLine xmlns:a14="http://schemas.microsoft.com/office/drawing/2010/main" xmlns="" w="9525">
+                <a14:hiddenLine xmlns="" xmlns:a14="http://schemas.microsoft.com/office/drawing/2010/main" w="9525">
                   <a:solidFill>
                     <a:srgbClr val="000000"/>
                   </a:solidFill>
@@ -3728,7 +3847,7 @@
             </a:ln>
             <a:extLst>
               <a:ext uri="{91240B29-F687-4f45-9708-019B960494DF}">
-                <a14:hiddenLine xmlns:a14="http://schemas.microsoft.com/office/drawing/2010/main" xmlns="" w="9525">
+                <a14:hiddenLine xmlns="" xmlns:a14="http://schemas.microsoft.com/office/drawing/2010/main" w="9525">
                   <a:solidFill>
                     <a:srgbClr val="000000"/>
                   </a:solidFill>
@@ -3793,7 +3912,7 @@
             </a:ln>
             <a:extLst>
               <a:ext uri="{91240B29-F687-4f45-9708-019B960494DF}">
-                <a14:hiddenLine xmlns:a14="http://schemas.microsoft.com/office/drawing/2010/main" xmlns="" w="9525">
+                <a14:hiddenLine xmlns="" xmlns:a14="http://schemas.microsoft.com/office/drawing/2010/main" w="9525">
                   <a:solidFill>
                     <a:srgbClr val="000000"/>
                   </a:solidFill>
@@ -3883,7 +4002,7 @@
             </a:ln>
             <a:extLst>
               <a:ext uri="{91240B29-F687-4f45-9708-019B960494DF}">
-                <a14:hiddenLine xmlns:a14="http://schemas.microsoft.com/office/drawing/2010/main" xmlns="" w="9525">
+                <a14:hiddenLine xmlns="" xmlns:a14="http://schemas.microsoft.com/office/drawing/2010/main" w="9525">
                   <a:solidFill>
                     <a:srgbClr val="000000"/>
                   </a:solidFill>
@@ -3945,7 +4064,7 @@
             </a:ln>
             <a:extLst>
               <a:ext uri="{91240B29-F687-4f45-9708-019B960494DF}">
-                <a14:hiddenLine xmlns:a14="http://schemas.microsoft.com/office/drawing/2010/main" xmlns="" w="9525">
+                <a14:hiddenLine xmlns="" xmlns:a14="http://schemas.microsoft.com/office/drawing/2010/main" w="9525">
                   <a:solidFill>
                     <a:srgbClr val="000000"/>
                   </a:solidFill>
@@ -4035,7 +4154,7 @@
             </a:ln>
             <a:extLst>
               <a:ext uri="{91240B29-F687-4f45-9708-019B960494DF}">
-                <a14:hiddenLine xmlns:a14="http://schemas.microsoft.com/office/drawing/2010/main" xmlns="" w="9525">
+                <a14:hiddenLine xmlns="" xmlns:a14="http://schemas.microsoft.com/office/drawing/2010/main" w="9525">
                   <a:solidFill>
                     <a:srgbClr val="000000"/>
                   </a:solidFill>
@@ -4125,7 +4244,7 @@
             </a:ln>
             <a:extLst>
               <a:ext uri="{91240B29-F687-4f45-9708-019B960494DF}">
-                <a14:hiddenLine xmlns:a14="http://schemas.microsoft.com/office/drawing/2010/main" xmlns="" w="9525">
+                <a14:hiddenLine xmlns="" xmlns:a14="http://schemas.microsoft.com/office/drawing/2010/main" w="9525">
                   <a:solidFill>
                     <a:srgbClr val="000000"/>
                   </a:solidFill>
@@ -4190,7 +4309,7 @@
             </a:ln>
             <a:extLst>
               <a:ext uri="{91240B29-F687-4f45-9708-019B960494DF}">
-                <a14:hiddenLine xmlns:a14="http://schemas.microsoft.com/office/drawing/2010/main" xmlns="" w="9525">
+                <a14:hiddenLine xmlns="" xmlns:a14="http://schemas.microsoft.com/office/drawing/2010/main" w="9525">
                   <a:solidFill>
                     <a:srgbClr val="000000"/>
                   </a:solidFill>
@@ -4252,7 +4371,7 @@
             </a:ln>
             <a:extLst>
               <a:ext uri="{91240B29-F687-4f45-9708-019B960494DF}">
-                <a14:hiddenLine xmlns:a14="http://schemas.microsoft.com/office/drawing/2010/main" xmlns="" w="9525">
+                <a14:hiddenLine xmlns="" xmlns:a14="http://schemas.microsoft.com/office/drawing/2010/main" w="9525">
                   <a:solidFill>
                     <a:srgbClr val="000000"/>
                   </a:solidFill>
@@ -4342,7 +4461,7 @@
             </a:ln>
             <a:extLst>
               <a:ext uri="{91240B29-F687-4f45-9708-019B960494DF}">
-                <a14:hiddenLine xmlns:a14="http://schemas.microsoft.com/office/drawing/2010/main" xmlns="" w="9525">
+                <a14:hiddenLine xmlns="" xmlns:a14="http://schemas.microsoft.com/office/drawing/2010/main" w="9525">
                   <a:solidFill>
                     <a:srgbClr val="000000"/>
                   </a:solidFill>
@@ -4432,7 +4551,7 @@
             </a:ln>
             <a:extLst>
               <a:ext uri="{91240B29-F687-4f45-9708-019B960494DF}">
-                <a14:hiddenLine xmlns:a14="http://schemas.microsoft.com/office/drawing/2010/main" xmlns="" w="9525">
+                <a14:hiddenLine xmlns="" xmlns:a14="http://schemas.microsoft.com/office/drawing/2010/main" w="9525">
                   <a:solidFill>
                     <a:srgbClr val="000000"/>
                   </a:solidFill>
@@ -4494,7 +4613,7 @@
             </a:ln>
             <a:extLst>
               <a:ext uri="{91240B29-F687-4f45-9708-019B960494DF}">
-                <a14:hiddenLine xmlns:a14="http://schemas.microsoft.com/office/drawing/2010/main" xmlns="" w="9525">
+                <a14:hiddenLine xmlns="" xmlns:a14="http://schemas.microsoft.com/office/drawing/2010/main" w="9525">
                   <a:solidFill>
                     <a:srgbClr val="000000"/>
                   </a:solidFill>
@@ -4614,7 +4733,7 @@
             </a:ln>
             <a:extLst>
               <a:ext uri="{91240B29-F687-4f45-9708-019B960494DF}">
-                <a14:hiddenLine xmlns:a14="http://schemas.microsoft.com/office/drawing/2010/main" xmlns="" w="9525">
+                <a14:hiddenLine xmlns="" xmlns:a14="http://schemas.microsoft.com/office/drawing/2010/main" w="9525">
                   <a:solidFill>
                     <a:srgbClr val="000000"/>
                   </a:solidFill>
@@ -4682,7 +4801,7 @@
             </a:ln>
             <a:extLst>
               <a:ext uri="{91240B29-F687-4f45-9708-019B960494DF}">
-                <a14:hiddenLine xmlns:a14="http://schemas.microsoft.com/office/drawing/2010/main" xmlns="" w="9525">
+                <a14:hiddenLine xmlns="" xmlns:a14="http://schemas.microsoft.com/office/drawing/2010/main" w="9525">
                   <a:solidFill>
                     <a:srgbClr val="000000"/>
                   </a:solidFill>
@@ -4772,7 +4891,7 @@
             </a:ln>
             <a:extLst>
               <a:ext uri="{91240B29-F687-4f45-9708-019B960494DF}">
-                <a14:hiddenLine xmlns:a14="http://schemas.microsoft.com/office/drawing/2010/main" xmlns="" w="9525">
+                <a14:hiddenLine xmlns="" xmlns:a14="http://schemas.microsoft.com/office/drawing/2010/main" w="9525">
                   <a:solidFill>
                     <a:srgbClr val="000000"/>
                   </a:solidFill>
@@ -4912,7 +5031,7 @@
           <a:p>
             <a:fld id="{AFFA8E18-38E7-4AF1-A6D2-47C002B4AF53}" type="datetimeFigureOut">
               <a:rPr lang="en-US" smtClean="0"/>
-              <a:t>12/1/2020</a:t>
+              <a:t>12/1/20</a:t>
             </a:fld>
             <a:endParaRPr lang="en-US"/>
           </a:p>
@@ -5179,7 +5298,7 @@
           <a:p>
             <a:fld id="{AFFA8E18-38E7-4AF1-A6D2-47C002B4AF53}" type="datetimeFigureOut">
               <a:rPr lang="en-US" smtClean="0"/>
-              <a:t>12/1/2020</a:t>
+              <a:t>12/1/20</a:t>
             </a:fld>
             <a:endParaRPr lang="en-US"/>
           </a:p>
@@ -5375,7 +5494,7 @@
           <a:p>
             <a:fld id="{AFFA8E18-38E7-4AF1-A6D2-47C002B4AF53}" type="datetimeFigureOut">
               <a:rPr lang="en-US" smtClean="0"/>
-              <a:t>12/1/2020</a:t>
+              <a:t>12/1/20</a:t>
             </a:fld>
             <a:endParaRPr lang="en-US"/>
           </a:p>
@@ -5638,7 +5757,7 @@
           <a:p>
             <a:fld id="{AFFA8E18-38E7-4AF1-A6D2-47C002B4AF53}" type="datetimeFigureOut">
               <a:rPr lang="en-US" smtClean="0"/>
-              <a:t>12/1/2020</a:t>
+              <a:t>12/1/20</a:t>
             </a:fld>
             <a:endParaRPr lang="en-US"/>
           </a:p>
@@ -6072,7 +6191,7 @@
           <a:p>
             <a:fld id="{AFFA8E18-38E7-4AF1-A6D2-47C002B4AF53}" type="datetimeFigureOut">
               <a:rPr lang="en-US" smtClean="0"/>
-              <a:t>12/1/2020</a:t>
+              <a:t>12/1/20</a:t>
             </a:fld>
             <a:endParaRPr lang="en-US"/>
           </a:p>
@@ -6618,7 +6737,7 @@
           <a:p>
             <a:fld id="{AFFA8E18-38E7-4AF1-A6D2-47C002B4AF53}" type="datetimeFigureOut">
               <a:rPr lang="en-US" smtClean="0"/>
-              <a:t>12/1/2020</a:t>
+              <a:t>12/1/20</a:t>
             </a:fld>
             <a:endParaRPr lang="en-US"/>
           </a:p>
@@ -7338,7 +7457,7 @@
           <a:p>
             <a:fld id="{AFFA8E18-38E7-4AF1-A6D2-47C002B4AF53}" type="datetimeFigureOut">
               <a:rPr lang="en-US" smtClean="0"/>
-              <a:t>12/1/2020</a:t>
+              <a:t>12/1/20</a:t>
             </a:fld>
             <a:endParaRPr lang="en-US"/>
           </a:p>
@@ -7508,7 +7627,7 @@
           <a:p>
             <a:fld id="{AFFA8E18-38E7-4AF1-A6D2-47C002B4AF53}" type="datetimeFigureOut">
               <a:rPr lang="en-US" smtClean="0"/>
-              <a:t>12/1/2020</a:t>
+              <a:t>12/1/20</a:t>
             </a:fld>
             <a:endParaRPr lang="en-US"/>
           </a:p>
@@ -7688,7 +7807,7 @@
           <a:p>
             <a:fld id="{AFFA8E18-38E7-4AF1-A6D2-47C002B4AF53}" type="datetimeFigureOut">
               <a:rPr lang="en-US" smtClean="0"/>
-              <a:t>12/1/2020</a:t>
+              <a:t>12/1/20</a:t>
             </a:fld>
             <a:endParaRPr lang="en-US"/>
           </a:p>
@@ -7858,7 +7977,7 @@
           <a:p>
             <a:fld id="{AFFA8E18-38E7-4AF1-A6D2-47C002B4AF53}" type="datetimeFigureOut">
               <a:rPr lang="en-US" smtClean="0"/>
-              <a:t>12/1/2020</a:t>
+              <a:t>12/1/20</a:t>
             </a:fld>
             <a:endParaRPr lang="en-US"/>
           </a:p>
@@ -8108,7 +8227,7 @@
           <a:p>
             <a:fld id="{AFFA8E18-38E7-4AF1-A6D2-47C002B4AF53}" type="datetimeFigureOut">
               <a:rPr lang="en-US" smtClean="0"/>
-              <a:t>12/1/2020</a:t>
+              <a:t>12/1/20</a:t>
             </a:fld>
             <a:endParaRPr lang="en-US"/>
           </a:p>
@@ -8340,7 +8459,7 @@
           <a:p>
             <a:fld id="{AFFA8E18-38E7-4AF1-A6D2-47C002B4AF53}" type="datetimeFigureOut">
               <a:rPr lang="en-US" smtClean="0"/>
-              <a:t>12/1/2020</a:t>
+              <a:t>12/1/20</a:t>
             </a:fld>
             <a:endParaRPr lang="en-US"/>
           </a:p>
@@ -8721,7 +8840,7 @@
           <a:p>
             <a:fld id="{AFFA8E18-38E7-4AF1-A6D2-47C002B4AF53}" type="datetimeFigureOut">
               <a:rPr lang="en-US" smtClean="0"/>
-              <a:t>12/1/2020</a:t>
+              <a:t>12/1/20</a:t>
             </a:fld>
             <a:endParaRPr lang="en-US"/>
           </a:p>
@@ -8839,7 +8958,7 @@
           <a:p>
             <a:fld id="{AFFA8E18-38E7-4AF1-A6D2-47C002B4AF53}" type="datetimeFigureOut">
               <a:rPr lang="en-US" smtClean="0"/>
-              <a:t>12/1/2020</a:t>
+              <a:t>12/1/20</a:t>
             </a:fld>
             <a:endParaRPr lang="en-US"/>
           </a:p>
@@ -8934,7 +9053,7 @@
           <a:p>
             <a:fld id="{AFFA8E18-38E7-4AF1-A6D2-47C002B4AF53}" type="datetimeFigureOut">
               <a:rPr lang="en-US" smtClean="0"/>
-              <a:t>12/1/2020</a:t>
+              <a:t>12/1/20</a:t>
             </a:fld>
             <a:endParaRPr lang="en-US"/>
           </a:p>
@@ -9183,7 +9302,7 @@
           <a:p>
             <a:fld id="{AFFA8E18-38E7-4AF1-A6D2-47C002B4AF53}" type="datetimeFigureOut">
               <a:rPr lang="en-US" smtClean="0"/>
-              <a:t>12/1/2020</a:t>
+              <a:t>12/1/20</a:t>
             </a:fld>
             <a:endParaRPr lang="en-US"/>
           </a:p>
@@ -9463,7 +9582,7 @@
           <a:p>
             <a:fld id="{AFFA8E18-38E7-4AF1-A6D2-47C002B4AF53}" type="datetimeFigureOut">
               <a:rPr lang="en-US" smtClean="0"/>
-              <a:t>12/1/2020</a:t>
+              <a:t>12/1/20</a:t>
             </a:fld>
             <a:endParaRPr lang="en-US"/>
           </a:p>
@@ -9579,7 +9698,7 @@
           <a:noFill/>
           <a:extLst>
             <a:ext uri="{909E8E84-426E-40dd-AFC4-6F175D3DCCD1}">
-              <a14:hiddenFill xmlns:a14="http://schemas.microsoft.com/office/drawing/2010/main" xmlns="">
+              <a14:hiddenFill xmlns="" xmlns:a14="http://schemas.microsoft.com/office/drawing/2010/main">
                 <a:solidFill>
                   <a:srgbClr val="FFFFFF"/>
                 </a:solidFill>
@@ -9653,7 +9772,7 @@
               </a:ln>
               <a:extLst>
                 <a:ext uri="{91240B29-F687-4f45-9708-019B960494DF}">
-                  <a14:hiddenLine xmlns:a14="http://schemas.microsoft.com/office/drawing/2010/main" xmlns="" w="9525">
+                  <a14:hiddenLine xmlns="" xmlns:a14="http://schemas.microsoft.com/office/drawing/2010/main" w="9525">
                     <a:solidFill>
                       <a:srgbClr val="000000"/>
                     </a:solidFill>
@@ -9743,7 +9862,7 @@
               </a:ln>
               <a:extLst>
                 <a:ext uri="{91240B29-F687-4f45-9708-019B960494DF}">
-                  <a14:hiddenLine xmlns:a14="http://schemas.microsoft.com/office/drawing/2010/main" xmlns="" w="9525">
+                  <a14:hiddenLine xmlns="" xmlns:a14="http://schemas.microsoft.com/office/drawing/2010/main" w="9525">
                     <a:solidFill>
                       <a:srgbClr val="000000"/>
                     </a:solidFill>
@@ -9833,7 +9952,7 @@
               </a:ln>
               <a:extLst>
                 <a:ext uri="{91240B29-F687-4f45-9708-019B960494DF}">
-                  <a14:hiddenLine xmlns:a14="http://schemas.microsoft.com/office/drawing/2010/main" xmlns="" w="9525">
+                  <a14:hiddenLine xmlns="" xmlns:a14="http://schemas.microsoft.com/office/drawing/2010/main" w="9525">
                     <a:solidFill>
                       <a:srgbClr val="000000"/>
                     </a:solidFill>
@@ -9895,7 +10014,7 @@
               </a:ln>
               <a:extLst>
                 <a:ext uri="{91240B29-F687-4f45-9708-019B960494DF}">
-                  <a14:hiddenLine xmlns:a14="http://schemas.microsoft.com/office/drawing/2010/main" xmlns="" w="9525">
+                  <a14:hiddenLine xmlns="" xmlns:a14="http://schemas.microsoft.com/office/drawing/2010/main" w="9525">
                     <a:solidFill>
                       <a:srgbClr val="000000"/>
                     </a:solidFill>
@@ -9985,7 +10104,7 @@
               </a:ln>
               <a:extLst>
                 <a:ext uri="{91240B29-F687-4f45-9708-019B960494DF}">
-                  <a14:hiddenLine xmlns:a14="http://schemas.microsoft.com/office/drawing/2010/main" xmlns="" w="9525">
+                  <a14:hiddenLine xmlns="" xmlns:a14="http://schemas.microsoft.com/office/drawing/2010/main" w="9525">
                     <a:solidFill>
                       <a:srgbClr val="000000"/>
                     </a:solidFill>
@@ -10047,7 +10166,7 @@
               </a:ln>
               <a:extLst>
                 <a:ext uri="{91240B29-F687-4f45-9708-019B960494DF}">
-                  <a14:hiddenLine xmlns:a14="http://schemas.microsoft.com/office/drawing/2010/main" xmlns="" w="9525">
+                  <a14:hiddenLine xmlns="" xmlns:a14="http://schemas.microsoft.com/office/drawing/2010/main" w="9525">
                     <a:solidFill>
                       <a:srgbClr val="000000"/>
                     </a:solidFill>
@@ -10109,7 +10228,7 @@
               </a:ln>
               <a:extLst>
                 <a:ext uri="{91240B29-F687-4f45-9708-019B960494DF}">
-                  <a14:hiddenLine xmlns:a14="http://schemas.microsoft.com/office/drawing/2010/main" xmlns="" w="9525">
+                  <a14:hiddenLine xmlns="" xmlns:a14="http://schemas.microsoft.com/office/drawing/2010/main" w="9525">
                     <a:solidFill>
                       <a:srgbClr val="000000"/>
                     </a:solidFill>
@@ -10199,7 +10318,7 @@
               </a:ln>
               <a:extLst>
                 <a:ext uri="{91240B29-F687-4f45-9708-019B960494DF}">
-                  <a14:hiddenLine xmlns:a14="http://schemas.microsoft.com/office/drawing/2010/main" xmlns="" w="9525">
+                  <a14:hiddenLine xmlns="" xmlns:a14="http://schemas.microsoft.com/office/drawing/2010/main" w="9525">
                     <a:solidFill>
                       <a:srgbClr val="000000"/>
                     </a:solidFill>
@@ -10289,7 +10408,7 @@
               </a:ln>
               <a:extLst>
                 <a:ext uri="{91240B29-F687-4f45-9708-019B960494DF}">
-                  <a14:hiddenLine xmlns:a14="http://schemas.microsoft.com/office/drawing/2010/main" xmlns="" w="9525">
+                  <a14:hiddenLine xmlns="" xmlns:a14="http://schemas.microsoft.com/office/drawing/2010/main" w="9525">
                     <a:solidFill>
                       <a:srgbClr val="000000"/>
                     </a:solidFill>
@@ -10351,7 +10470,7 @@
               </a:ln>
               <a:extLst>
                 <a:ext uri="{91240B29-F687-4f45-9708-019B960494DF}">
-                  <a14:hiddenLine xmlns:a14="http://schemas.microsoft.com/office/drawing/2010/main" xmlns="" w="9525">
+                  <a14:hiddenLine xmlns="" xmlns:a14="http://schemas.microsoft.com/office/drawing/2010/main" w="9525">
                     <a:solidFill>
                       <a:srgbClr val="000000"/>
                     </a:solidFill>
@@ -10461,7 +10580,7 @@
               </a:ln>
               <a:extLst>
                 <a:ext uri="{91240B29-F687-4f45-9708-019B960494DF}">
-                  <a14:hiddenLine xmlns:a14="http://schemas.microsoft.com/office/drawing/2010/main" xmlns="" w="9525">
+                  <a14:hiddenLine xmlns="" xmlns:a14="http://schemas.microsoft.com/office/drawing/2010/main" w="9525">
                     <a:solidFill>
                       <a:srgbClr val="000000"/>
                     </a:solidFill>
@@ -10545,7 +10664,7 @@
               </a:ln>
               <a:extLst>
                 <a:ext uri="{91240B29-F687-4f45-9708-019B960494DF}">
-                  <a14:hiddenLine xmlns:a14="http://schemas.microsoft.com/office/drawing/2010/main" xmlns="" w="9525">
+                  <a14:hiddenLine xmlns="" xmlns:a14="http://schemas.microsoft.com/office/drawing/2010/main" w="9525">
                     <a:solidFill>
                       <a:srgbClr val="000000"/>
                     </a:solidFill>
@@ -10607,7 +10726,7 @@
               </a:ln>
               <a:extLst>
                 <a:ext uri="{91240B29-F687-4f45-9708-019B960494DF}">
-                  <a14:hiddenLine xmlns:a14="http://schemas.microsoft.com/office/drawing/2010/main" xmlns="" w="9525">
+                  <a14:hiddenLine xmlns="" xmlns:a14="http://schemas.microsoft.com/office/drawing/2010/main" w="9525">
                     <a:solidFill>
                       <a:srgbClr val="000000"/>
                     </a:solidFill>
@@ -10669,7 +10788,7 @@
               </a:ln>
               <a:extLst>
                 <a:ext uri="{91240B29-F687-4f45-9708-019B960494DF}">
-                  <a14:hiddenLine xmlns:a14="http://schemas.microsoft.com/office/drawing/2010/main" xmlns="" w="9525">
+                  <a14:hiddenLine xmlns="" xmlns:a14="http://schemas.microsoft.com/office/drawing/2010/main" w="9525">
                     <a:solidFill>
                       <a:srgbClr val="000000"/>
                     </a:solidFill>
@@ -10759,7 +10878,7 @@
               </a:ln>
               <a:extLst>
                 <a:ext uri="{91240B29-F687-4f45-9708-019B960494DF}">
-                  <a14:hiddenLine xmlns:a14="http://schemas.microsoft.com/office/drawing/2010/main" xmlns="" w="9525">
+                  <a14:hiddenLine xmlns="" xmlns:a14="http://schemas.microsoft.com/office/drawing/2010/main" w="9525">
                     <a:solidFill>
                       <a:srgbClr val="000000"/>
                     </a:solidFill>
@@ -10793,7 +10912,7 @@
               </a:ln>
               <a:extLst>
                 <a:ext uri="{91240B29-F687-4f45-9708-019B960494DF}">
-                  <a14:hiddenLine xmlns:a14="http://schemas.microsoft.com/office/drawing/2010/main" xmlns="" w="9525">
+                  <a14:hiddenLine xmlns="" xmlns:a14="http://schemas.microsoft.com/office/drawing/2010/main" w="9525">
                     <a:solidFill>
                       <a:srgbClr val="000000"/>
                     </a:solidFill>
@@ -10858,7 +10977,7 @@
               </a:ln>
               <a:extLst>
                 <a:ext uri="{91240B29-F687-4f45-9708-019B960494DF}">
-                  <a14:hiddenLine xmlns:a14="http://schemas.microsoft.com/office/drawing/2010/main" xmlns="" w="9525">
+                  <a14:hiddenLine xmlns="" xmlns:a14="http://schemas.microsoft.com/office/drawing/2010/main" w="9525">
                     <a:solidFill>
                       <a:srgbClr val="000000"/>
                     </a:solidFill>
@@ -10948,7 +11067,7 @@
               </a:ln>
               <a:extLst>
                 <a:ext uri="{91240B29-F687-4f45-9708-019B960494DF}">
-                  <a14:hiddenLine xmlns:a14="http://schemas.microsoft.com/office/drawing/2010/main" xmlns="" w="9525">
+                  <a14:hiddenLine xmlns="" xmlns:a14="http://schemas.microsoft.com/office/drawing/2010/main" w="9525">
                     <a:solidFill>
                       <a:srgbClr val="000000"/>
                     </a:solidFill>
@@ -11010,7 +11129,7 @@
               </a:ln>
               <a:extLst>
                 <a:ext uri="{91240B29-F687-4f45-9708-019B960494DF}">
-                  <a14:hiddenLine xmlns:a14="http://schemas.microsoft.com/office/drawing/2010/main" xmlns="" w="9525">
+                  <a14:hiddenLine xmlns="" xmlns:a14="http://schemas.microsoft.com/office/drawing/2010/main" w="9525">
                     <a:solidFill>
                       <a:srgbClr val="000000"/>
                     </a:solidFill>
@@ -11100,7 +11219,7 @@
               </a:ln>
               <a:extLst>
                 <a:ext uri="{91240B29-F687-4f45-9708-019B960494DF}">
-                  <a14:hiddenLine xmlns:a14="http://schemas.microsoft.com/office/drawing/2010/main" xmlns="" w="9525">
+                  <a14:hiddenLine xmlns="" xmlns:a14="http://schemas.microsoft.com/office/drawing/2010/main" w="9525">
                     <a:solidFill>
                       <a:srgbClr val="000000"/>
                     </a:solidFill>
@@ -11165,7 +11284,7 @@
               </a:ln>
               <a:extLst>
                 <a:ext uri="{91240B29-F687-4f45-9708-019B960494DF}">
-                  <a14:hiddenLine xmlns:a14="http://schemas.microsoft.com/office/drawing/2010/main" xmlns="" w="9525">
+                  <a14:hiddenLine xmlns="" xmlns:a14="http://schemas.microsoft.com/office/drawing/2010/main" w="9525">
                     <a:solidFill>
                       <a:srgbClr val="000000"/>
                     </a:solidFill>
@@ -11227,7 +11346,7 @@
               </a:ln>
               <a:extLst>
                 <a:ext uri="{91240B29-F687-4f45-9708-019B960494DF}">
-                  <a14:hiddenLine xmlns:a14="http://schemas.microsoft.com/office/drawing/2010/main" xmlns="" w="9525">
+                  <a14:hiddenLine xmlns="" xmlns:a14="http://schemas.microsoft.com/office/drawing/2010/main" w="9525">
                     <a:solidFill>
                       <a:srgbClr val="000000"/>
                     </a:solidFill>
@@ -11317,7 +11436,7 @@
               </a:ln>
               <a:extLst>
                 <a:ext uri="{91240B29-F687-4f45-9708-019B960494DF}">
-                  <a14:hiddenLine xmlns:a14="http://schemas.microsoft.com/office/drawing/2010/main" xmlns="" w="9525">
+                  <a14:hiddenLine xmlns="" xmlns:a14="http://schemas.microsoft.com/office/drawing/2010/main" w="9525">
                     <a:solidFill>
                       <a:srgbClr val="000000"/>
                     </a:solidFill>
@@ -11407,7 +11526,7 @@
               </a:ln>
               <a:extLst>
                 <a:ext uri="{91240B29-F687-4f45-9708-019B960494DF}">
-                  <a14:hiddenLine xmlns:a14="http://schemas.microsoft.com/office/drawing/2010/main" xmlns="" w="9525">
+                  <a14:hiddenLine xmlns="" xmlns:a14="http://schemas.microsoft.com/office/drawing/2010/main" w="9525">
                     <a:solidFill>
                       <a:srgbClr val="000000"/>
                     </a:solidFill>
@@ -11472,7 +11591,7 @@
               </a:ln>
               <a:extLst>
                 <a:ext uri="{91240B29-F687-4f45-9708-019B960494DF}">
-                  <a14:hiddenLine xmlns:a14="http://schemas.microsoft.com/office/drawing/2010/main" xmlns="" w="9525">
+                  <a14:hiddenLine xmlns="" xmlns:a14="http://schemas.microsoft.com/office/drawing/2010/main" w="9525">
                     <a:solidFill>
                       <a:srgbClr val="000000"/>
                     </a:solidFill>
@@ -11592,7 +11711,7 @@
               </a:ln>
               <a:extLst>
                 <a:ext uri="{91240B29-F687-4f45-9708-019B960494DF}">
-                  <a14:hiddenLine xmlns:a14="http://schemas.microsoft.com/office/drawing/2010/main" xmlns="" w="9525">
+                  <a14:hiddenLine xmlns="" xmlns:a14="http://schemas.microsoft.com/office/drawing/2010/main" w="9525">
                     <a:solidFill>
                       <a:srgbClr val="000000"/>
                     </a:solidFill>
@@ -11690,7 +11809,7 @@
               </a:ln>
               <a:extLst>
                 <a:ext uri="{91240B29-F687-4f45-9708-019B960494DF}">
-                  <a14:hiddenLine xmlns:a14="http://schemas.microsoft.com/office/drawing/2010/main" xmlns="" w="9525">
+                  <a14:hiddenLine xmlns="" xmlns:a14="http://schemas.microsoft.com/office/drawing/2010/main" w="9525">
                     <a:solidFill>
                       <a:srgbClr val="000000"/>
                     </a:solidFill>
@@ -11805,7 +11924,7 @@
               </a:ln>
               <a:extLst>
                 <a:ext uri="{91240B29-F687-4f45-9708-019B960494DF}">
-                  <a14:hiddenLine xmlns:a14="http://schemas.microsoft.com/office/drawing/2010/main" xmlns="" w="9525">
+                  <a14:hiddenLine xmlns="" xmlns:a14="http://schemas.microsoft.com/office/drawing/2010/main" w="9525">
                     <a:solidFill>
                       <a:srgbClr val="000000"/>
                     </a:solidFill>
@@ -11895,7 +12014,7 @@
               </a:ln>
               <a:extLst>
                 <a:ext uri="{91240B29-F687-4f45-9708-019B960494DF}">
-                  <a14:hiddenLine xmlns:a14="http://schemas.microsoft.com/office/drawing/2010/main" xmlns="" w="9525">
+                  <a14:hiddenLine xmlns="" xmlns:a14="http://schemas.microsoft.com/office/drawing/2010/main" w="9525">
                     <a:solidFill>
                       <a:srgbClr val="000000"/>
                     </a:solidFill>
@@ -11960,7 +12079,7 @@
               </a:ln>
               <a:extLst>
                 <a:ext uri="{91240B29-F687-4f45-9708-019B960494DF}">
-                  <a14:hiddenLine xmlns:a14="http://schemas.microsoft.com/office/drawing/2010/main" xmlns="" w="9525">
+                  <a14:hiddenLine xmlns="" xmlns:a14="http://schemas.microsoft.com/office/drawing/2010/main" w="9525">
                     <a:solidFill>
                       <a:srgbClr val="000000"/>
                     </a:solidFill>
@@ -12050,7 +12169,7 @@
               </a:ln>
               <a:extLst>
                 <a:ext uri="{91240B29-F687-4f45-9708-019B960494DF}">
-                  <a14:hiddenLine xmlns:a14="http://schemas.microsoft.com/office/drawing/2010/main" xmlns="" w="9525">
+                  <a14:hiddenLine xmlns="" xmlns:a14="http://schemas.microsoft.com/office/drawing/2010/main" w="9525">
                     <a:solidFill>
                       <a:srgbClr val="000000"/>
                     </a:solidFill>
@@ -12118,7 +12237,7 @@
               </a:ln>
               <a:extLst>
                 <a:ext uri="{91240B29-F687-4f45-9708-019B960494DF}">
-                  <a14:hiddenLine xmlns:a14="http://schemas.microsoft.com/office/drawing/2010/main" xmlns="" w="9525">
+                  <a14:hiddenLine xmlns="" xmlns:a14="http://schemas.microsoft.com/office/drawing/2010/main" w="9525">
                     <a:solidFill>
                       <a:srgbClr val="000000"/>
                     </a:solidFill>
@@ -12208,7 +12327,7 @@
               </a:ln>
               <a:extLst>
                 <a:ext uri="{91240B29-F687-4f45-9708-019B960494DF}">
-                  <a14:hiddenLine xmlns:a14="http://schemas.microsoft.com/office/drawing/2010/main" xmlns="" w="9525">
+                  <a14:hiddenLine xmlns="" xmlns:a14="http://schemas.microsoft.com/office/drawing/2010/main" w="9525">
                     <a:solidFill>
                       <a:srgbClr val="000000"/>
                     </a:solidFill>
@@ -12276,7 +12395,7 @@
               </a:ln>
               <a:extLst>
                 <a:ext uri="{91240B29-F687-4f45-9708-019B960494DF}">
-                  <a14:hiddenLine xmlns:a14="http://schemas.microsoft.com/office/drawing/2010/main" xmlns="" w="9525">
+                  <a14:hiddenLine xmlns="" xmlns:a14="http://schemas.microsoft.com/office/drawing/2010/main" w="9525">
                     <a:solidFill>
                       <a:srgbClr val="000000"/>
                     </a:solidFill>
@@ -12366,7 +12485,7 @@
               </a:ln>
               <a:extLst>
                 <a:ext uri="{91240B29-F687-4f45-9708-019B960494DF}">
-                  <a14:hiddenLine xmlns:a14="http://schemas.microsoft.com/office/drawing/2010/main" xmlns="" w="9525">
+                  <a14:hiddenLine xmlns="" xmlns:a14="http://schemas.microsoft.com/office/drawing/2010/main" w="9525">
                     <a:solidFill>
                       <a:srgbClr val="000000"/>
                     </a:solidFill>
@@ -12400,7 +12519,7 @@
               </a:ln>
               <a:extLst>
                 <a:ext uri="{91240B29-F687-4f45-9708-019B960494DF}">
-                  <a14:hiddenLine xmlns:a14="http://schemas.microsoft.com/office/drawing/2010/main" xmlns="" w="9525">
+                  <a14:hiddenLine xmlns="" xmlns:a14="http://schemas.microsoft.com/office/drawing/2010/main" w="9525">
                     <a:solidFill>
                       <a:srgbClr val="000000"/>
                     </a:solidFill>
@@ -12540,7 +12659,7 @@
           <a:p>
             <a:fld id="{AFFA8E18-38E7-4AF1-A6D2-47C002B4AF53}" type="datetimeFigureOut">
               <a:rPr lang="en-US" smtClean="0"/>
-              <a:t>12/1/2020</a:t>
+              <a:t>12/1/20</a:t>
             </a:fld>
             <a:endParaRPr lang="en-US"/>
           </a:p>
@@ -13055,7 +13174,7 @@
           <p:cNvPr id="2" name="Tittel 1">
             <a:extLst>
               <a:ext uri="{FF2B5EF4-FFF2-40B4-BE49-F238E27FC236}">
-                <a16:creationId xmlns:a16="http://schemas.microsoft.com/office/drawing/2014/main" id="{1F0C1458-739B-4B27-A4E1-ED4E043C6E66}"/>
+                <a16:creationId xmlns:a16="http://schemas.microsoft.com/office/drawing/2014/main" id="{05393AF7-A346-704E-878A-BEE346461D6E}"/>
               </a:ext>
             </a:extLst>
           </p:cNvPr>
@@ -13072,24 +13191,14 @@
           <a:lstStyle/>
           <a:p>
             <a:r>
-              <a:rPr lang="nb-NO" dirty="0" err="1"/>
-              <a:t>Quinizarin</a:t>
-            </a:r>
-            <a:r>
               <a:rPr lang="nb-NO" dirty="0"/>
-              <a:t> med </a:t>
+              <a:t>Konvergens for </a:t>
             </a:r>
             <a:r>
               <a:rPr lang="nb-NO" dirty="0" err="1"/>
-              <a:t>Y</a:t>
+              <a:t>quinizarin</a:t>
             </a:r>
-            <a:r>
-              <a:rPr lang="nb-NO" sz="2800" dirty="0" err="1"/>
-              <a:t>b</a:t>
-            </a:r>
-            <a:endParaRPr lang="en-US" dirty="0">
-              <a:latin typeface="+mn-lt"/>
-            </a:endParaRPr>
+            <a:endParaRPr lang="nb-NO" dirty="0"/>
           </a:p>
         </p:txBody>
       </p:sp>
@@ -13098,7 +13207,7 @@
           <p:cNvPr id="3" name="Plassholder for innhold 2">
             <a:extLst>
               <a:ext uri="{FF2B5EF4-FFF2-40B4-BE49-F238E27FC236}">
-                <a16:creationId xmlns:a16="http://schemas.microsoft.com/office/drawing/2014/main" id="{AA02D2DE-9920-4E2D-80C7-CB0CDDDDA406}"/>
+                <a16:creationId xmlns:a16="http://schemas.microsoft.com/office/drawing/2014/main" id="{5062EBB3-060F-264E-BFBB-CD1271629D94}"/>
               </a:ext>
             </a:extLst>
           </p:cNvPr>
@@ -13109,15 +13218,389 @@
             <p:ph idx="1"/>
           </p:nvPr>
         </p:nvSpPr>
+        <p:spPr>
+          <a:xfrm>
+            <a:off x="1141413" y="1795191"/>
+            <a:ext cx="1445377" cy="603794"/>
+          </a:xfrm>
+        </p:spPr>
+        <p:txBody>
+          <a:bodyPr/>
+          <a:lstStyle/>
+          <a:p>
+            <a:r>
+              <a:rPr lang="nb-NO" dirty="0"/>
+              <a:t>k-</a:t>
+            </a:r>
+            <a:r>
+              <a:rPr lang="nb-NO" dirty="0" err="1"/>
+              <a:t>point</a:t>
+            </a:r>
+            <a:endParaRPr lang="nb-NO" dirty="0"/>
+          </a:p>
+        </p:txBody>
+      </p:sp>
+      <p:pic>
+        <p:nvPicPr>
+          <p:cNvPr id="7" name="Bilde 6">
+            <a:extLst>
+              <a:ext uri="{FF2B5EF4-FFF2-40B4-BE49-F238E27FC236}">
+                <a16:creationId xmlns:a16="http://schemas.microsoft.com/office/drawing/2014/main" id="{FD65437B-5D52-D644-B463-A1E42F1AE92A}"/>
+              </a:ext>
+            </a:extLst>
+          </p:cNvPr>
+          <p:cNvPicPr>
+            <a:picLocks noChangeAspect="1"/>
+          </p:cNvPicPr>
+          <p:nvPr/>
+        </p:nvPicPr>
+        <p:blipFill>
+          <a:blip r:embed="rId2">
+            <a:extLst>
+              <a:ext uri="{28A0092B-C50C-407E-A947-70E740481C1C}">
+                <a14:useLocalDpi xmlns:a14="http://schemas.microsoft.com/office/drawing/2010/main" val="0"/>
+              </a:ext>
+            </a:extLst>
+          </a:blip>
+          <a:stretch>
+            <a:fillRect/>
+          </a:stretch>
+        </p:blipFill>
+        <p:spPr>
+          <a:xfrm>
+            <a:off x="6465218" y="2636764"/>
+            <a:ext cx="5140244" cy="3855183"/>
+          </a:xfrm>
+          <a:prstGeom prst="rect">
+            <a:avLst/>
+          </a:prstGeom>
+        </p:spPr>
+      </p:pic>
+      <p:pic>
+        <p:nvPicPr>
+          <p:cNvPr id="9" name="Bilde 8">
+            <a:extLst>
+              <a:ext uri="{FF2B5EF4-FFF2-40B4-BE49-F238E27FC236}">
+                <a16:creationId xmlns:a16="http://schemas.microsoft.com/office/drawing/2014/main" id="{F6E2D91D-164B-5242-9531-C6469B6D60E1}"/>
+              </a:ext>
+            </a:extLst>
+          </p:cNvPr>
+          <p:cNvPicPr>
+            <a:picLocks noChangeAspect="1"/>
+          </p:cNvPicPr>
+          <p:nvPr/>
+        </p:nvPicPr>
+        <p:blipFill>
+          <a:blip r:embed="rId3">
+            <a:extLst>
+              <a:ext uri="{28A0092B-C50C-407E-A947-70E740481C1C}">
+                <a14:useLocalDpi xmlns:a14="http://schemas.microsoft.com/office/drawing/2010/main" val="0"/>
+              </a:ext>
+            </a:extLst>
+          </a:blip>
+          <a:stretch>
+            <a:fillRect/>
+          </a:stretch>
+        </p:blipFill>
+        <p:spPr>
+          <a:xfrm>
+            <a:off x="1000125" y="2636764"/>
+            <a:ext cx="5140241" cy="3855181"/>
+          </a:xfrm>
+          <a:prstGeom prst="rect">
+            <a:avLst/>
+          </a:prstGeom>
+        </p:spPr>
+      </p:pic>
+    </p:spTree>
+    <p:extLst>
+      <p:ext uri="{BB962C8B-B14F-4D97-AF65-F5344CB8AC3E}">
+        <p14:creationId xmlns:p14="http://schemas.microsoft.com/office/powerpoint/2010/main" val="1930082410"/>
+      </p:ext>
+    </p:extLst>
+  </p:cSld>
+  <p:clrMapOvr>
+    <a:masterClrMapping/>
+  </p:clrMapOvr>
+</p:sld>
+</file>
+
+<file path=ppt/slides/slide11.xml><?xml version="1.0" encoding="utf-8"?>
+<p:sld xmlns:a="http://schemas.openxmlformats.org/drawingml/2006/main" xmlns:r="http://schemas.openxmlformats.org/officeDocument/2006/relationships" xmlns:p="http://schemas.openxmlformats.org/presentationml/2006/main">
+  <p:cSld>
+    <p:spTree>
+      <p:nvGrpSpPr>
+        <p:cNvPr id="1" name=""/>
+        <p:cNvGrpSpPr/>
+        <p:nvPr/>
+      </p:nvGrpSpPr>
+      <p:grpSpPr>
+        <a:xfrm>
+          <a:off x="0" y="0"/>
+          <a:ext cx="0" cy="0"/>
+          <a:chOff x="0" y="0"/>
+          <a:chExt cx="0" cy="0"/>
+        </a:xfrm>
+      </p:grpSpPr>
+      <p:sp>
+        <p:nvSpPr>
+          <p:cNvPr id="2" name="Tittel 1">
+            <a:extLst>
+              <a:ext uri="{FF2B5EF4-FFF2-40B4-BE49-F238E27FC236}">
+                <a16:creationId xmlns:a16="http://schemas.microsoft.com/office/drawing/2014/main" id="{8D530E9B-6FE2-4B02-8B3B-271AB2DBBE6C}"/>
+              </a:ext>
+            </a:extLst>
+          </p:cNvPr>
+          <p:cNvSpPr>
+            <a:spLocks noGrp="1"/>
+          </p:cNvSpPr>
+          <p:nvPr>
+            <p:ph type="title"/>
+          </p:nvPr>
+        </p:nvSpPr>
         <p:spPr/>
         <p:txBody>
           <a:bodyPr/>
           <a:lstStyle/>
           <a:p>
-            <a:endParaRPr lang="en-US"/>
+            <a:r>
+              <a:rPr lang="nb-NO"/>
+              <a:t>Quinizarin med Y</a:t>
+            </a:r>
+            <a:endParaRPr lang="en-US" dirty="0"/>
           </a:p>
         </p:txBody>
       </p:sp>
+      <p:pic>
+        <p:nvPicPr>
+          <p:cNvPr id="9" name="Plassholder for innhold 8">
+            <a:extLst>
+              <a:ext uri="{FF2B5EF4-FFF2-40B4-BE49-F238E27FC236}">
+                <a16:creationId xmlns:a16="http://schemas.microsoft.com/office/drawing/2014/main" id="{184A3803-A0E1-5744-9F6F-BBBA15B2D1A5}"/>
+              </a:ext>
+            </a:extLst>
+          </p:cNvPr>
+          <p:cNvPicPr>
+            <a:picLocks noGrp="1" noChangeAspect="1"/>
+          </p:cNvPicPr>
+          <p:nvPr>
+            <p:ph idx="1"/>
+          </p:nvPr>
+        </p:nvPicPr>
+        <p:blipFill rotWithShape="1">
+          <a:blip r:embed="rId2">
+            <a:extLst>
+              <a:ext uri="{28A0092B-C50C-407E-A947-70E740481C1C}">
+                <a14:useLocalDpi xmlns:a14="http://schemas.microsoft.com/office/drawing/2010/main" val="0"/>
+              </a:ext>
+            </a:extLst>
+          </a:blip>
+          <a:srcRect l="6064" r="26844"/>
+          <a:stretch/>
+        </p:blipFill>
+        <p:spPr>
+          <a:xfrm>
+            <a:off x="6292895" y="2318544"/>
+            <a:ext cx="5498408" cy="3810793"/>
+          </a:xfrm>
+        </p:spPr>
+      </p:pic>
+      <p:pic>
+        <p:nvPicPr>
+          <p:cNvPr id="11" name="Bilde 10" descr="Et bilde som inneholder tilbehør&#10;&#10;Automatisk generert beskrivelse">
+            <a:extLst>
+              <a:ext uri="{FF2B5EF4-FFF2-40B4-BE49-F238E27FC236}">
+                <a16:creationId xmlns:a16="http://schemas.microsoft.com/office/drawing/2014/main" id="{B471FF15-059D-7A41-B963-7748FDBB0C47}"/>
+              </a:ext>
+            </a:extLst>
+          </p:cNvPr>
+          <p:cNvPicPr>
+            <a:picLocks noChangeAspect="1"/>
+          </p:cNvPicPr>
+          <p:nvPr/>
+        </p:nvPicPr>
+        <p:blipFill rotWithShape="1">
+          <a:blip r:embed="rId3">
+            <a:extLst>
+              <a:ext uri="{28A0092B-C50C-407E-A947-70E740481C1C}">
+                <a14:useLocalDpi xmlns:a14="http://schemas.microsoft.com/office/drawing/2010/main" val="0"/>
+              </a:ext>
+            </a:extLst>
+          </a:blip>
+          <a:srcRect l="5626" r="27281"/>
+          <a:stretch/>
+        </p:blipFill>
+        <p:spPr>
+          <a:xfrm>
+            <a:off x="359471" y="2289969"/>
+            <a:ext cx="5539636" cy="3839368"/>
+          </a:xfrm>
+          <a:prstGeom prst="rect">
+            <a:avLst/>
+          </a:prstGeom>
+        </p:spPr>
+      </p:pic>
+    </p:spTree>
+    <p:extLst>
+      <p:ext uri="{BB962C8B-B14F-4D97-AF65-F5344CB8AC3E}">
+        <p14:creationId xmlns:p14="http://schemas.microsoft.com/office/powerpoint/2010/main" val="1244725794"/>
+      </p:ext>
+    </p:extLst>
+  </p:cSld>
+  <p:clrMapOvr>
+    <a:masterClrMapping/>
+  </p:clrMapOvr>
+</p:sld>
+</file>
+
+<file path=ppt/slides/slide12.xml><?xml version="1.0" encoding="utf-8"?>
+<p:sld xmlns:a="http://schemas.openxmlformats.org/drawingml/2006/main" xmlns:r="http://schemas.openxmlformats.org/officeDocument/2006/relationships" xmlns:p="http://schemas.openxmlformats.org/presentationml/2006/main">
+  <p:cSld>
+    <p:spTree>
+      <p:nvGrpSpPr>
+        <p:cNvPr id="1" name=""/>
+        <p:cNvGrpSpPr/>
+        <p:nvPr/>
+      </p:nvGrpSpPr>
+      <p:grpSpPr>
+        <a:xfrm>
+          <a:off x="0" y="0"/>
+          <a:ext cx="0" cy="0"/>
+          <a:chOff x="0" y="0"/>
+          <a:chExt cx="0" cy="0"/>
+        </a:xfrm>
+      </p:grpSpPr>
+      <p:sp>
+        <p:nvSpPr>
+          <p:cNvPr id="2" name="Tittel 1">
+            <a:extLst>
+              <a:ext uri="{FF2B5EF4-FFF2-40B4-BE49-F238E27FC236}">
+                <a16:creationId xmlns:a16="http://schemas.microsoft.com/office/drawing/2014/main" id="{1F0C1458-739B-4B27-A4E1-ED4E043C6E66}"/>
+              </a:ext>
+            </a:extLst>
+          </p:cNvPr>
+          <p:cNvSpPr>
+            <a:spLocks noGrp="1"/>
+          </p:cNvSpPr>
+          <p:nvPr>
+            <p:ph type="title"/>
+          </p:nvPr>
+        </p:nvSpPr>
+        <p:spPr>
+          <a:xfrm>
+            <a:off x="1141413" y="618518"/>
+            <a:ext cx="9905998" cy="1366694"/>
+          </a:xfrm>
+        </p:spPr>
+        <p:txBody>
+          <a:bodyPr>
+            <a:normAutofit/>
+          </a:bodyPr>
+          <a:lstStyle/>
+          <a:p>
+            <a:pPr lvl="0">
+              <a:lnSpc>
+                <a:spcPct val="120000"/>
+              </a:lnSpc>
+              <a:spcBef>
+                <a:spcPts val="1000"/>
+              </a:spcBef>
+              <a:buSzPct val="125000"/>
+            </a:pPr>
+            <a:r>
+              <a:rPr lang="nb-NO" dirty="0" err="1"/>
+              <a:t>Quinizarin</a:t>
+            </a:r>
+            <a:r>
+              <a:rPr lang="nb-NO" dirty="0"/>
+              <a:t> med Y</a:t>
+            </a:r>
+            <a:r>
+              <a:rPr lang="en-US" cap="none" dirty="0">
+                <a:solidFill>
+                  <a:prstClr val="white"/>
+                </a:solidFill>
+                <a:ea typeface="+mn-ea"/>
+                <a:cs typeface="+mn-cs"/>
+              </a:rPr>
+              <a:t>b</a:t>
+            </a:r>
+            <a:endParaRPr lang="en-US" dirty="0">
+              <a:latin typeface="+mn-lt"/>
+            </a:endParaRPr>
+          </a:p>
+        </p:txBody>
+      </p:sp>
+      <p:pic>
+        <p:nvPicPr>
+          <p:cNvPr id="6" name="Bilde 5">
+            <a:extLst>
+              <a:ext uri="{FF2B5EF4-FFF2-40B4-BE49-F238E27FC236}">
+                <a16:creationId xmlns:a16="http://schemas.microsoft.com/office/drawing/2014/main" id="{41D970AC-6BE2-804A-8F44-CFE890DC815D}"/>
+              </a:ext>
+            </a:extLst>
+          </p:cNvPr>
+          <p:cNvPicPr>
+            <a:picLocks noChangeAspect="1"/>
+          </p:cNvPicPr>
+          <p:nvPr/>
+        </p:nvPicPr>
+        <p:blipFill rotWithShape="1">
+          <a:blip r:embed="rId2">
+            <a:extLst>
+              <a:ext uri="{28A0092B-C50C-407E-A947-70E740481C1C}">
+                <a14:useLocalDpi xmlns:a14="http://schemas.microsoft.com/office/drawing/2010/main" val="0"/>
+              </a:ext>
+            </a:extLst>
+          </a:blip>
+          <a:srcRect l="6461" r="26987"/>
+          <a:stretch/>
+        </p:blipFill>
+        <p:spPr>
+          <a:xfrm>
+            <a:off x="541421" y="2406315"/>
+            <a:ext cx="5440911" cy="3801537"/>
+          </a:xfrm>
+          <a:prstGeom prst="rect">
+            <a:avLst/>
+          </a:prstGeom>
+        </p:spPr>
+      </p:pic>
+      <p:pic>
+        <p:nvPicPr>
+          <p:cNvPr id="8" name="Bilde 7">
+            <a:extLst>
+              <a:ext uri="{FF2B5EF4-FFF2-40B4-BE49-F238E27FC236}">
+                <a16:creationId xmlns:a16="http://schemas.microsoft.com/office/drawing/2014/main" id="{E515D3A9-B236-FC4C-8BCC-4C1BD3781647}"/>
+              </a:ext>
+            </a:extLst>
+          </p:cNvPr>
+          <p:cNvPicPr>
+            <a:picLocks noChangeAspect="1"/>
+          </p:cNvPicPr>
+          <p:nvPr/>
+        </p:nvPicPr>
+        <p:blipFill rotWithShape="1">
+          <a:blip r:embed="rId3">
+            <a:extLst>
+              <a:ext uri="{28A0092B-C50C-407E-A947-70E740481C1C}">
+                <a14:useLocalDpi xmlns:a14="http://schemas.microsoft.com/office/drawing/2010/main" val="0"/>
+              </a:ext>
+            </a:extLst>
+          </a:blip>
+          <a:srcRect l="7289" r="27343"/>
+          <a:stretch/>
+        </p:blipFill>
+        <p:spPr>
+          <a:xfrm>
+            <a:off x="6306484" y="2406315"/>
+            <a:ext cx="5344095" cy="3801537"/>
+          </a:xfrm>
+          <a:prstGeom prst="rect">
+            <a:avLst/>
+          </a:prstGeom>
+        </p:spPr>
+      </p:pic>
     </p:spTree>
     <p:extLst>
       <p:ext uri="{BB962C8B-B14F-4D97-AF65-F5344CB8AC3E}">
@@ -13131,7 +13614,7 @@
 </p:sld>
 </file>
 
-<file path=ppt/slides/slide11.xml><?xml version="1.0" encoding="utf-8"?>
+<file path=ppt/slides/slide13.xml><?xml version="1.0" encoding="utf-8"?>
 <p:sld xmlns:a="http://schemas.openxmlformats.org/drawingml/2006/main" xmlns:r="http://schemas.openxmlformats.org/officeDocument/2006/relationships" xmlns:p="http://schemas.openxmlformats.org/presentationml/2006/main">
   <p:cSld>
     <p:spTree>
@@ -13164,64 +13647,137 @@
             <p:ph type="title"/>
           </p:nvPr>
         </p:nvSpPr>
-        <p:spPr/>
+        <p:spPr>
+          <a:xfrm>
+            <a:off x="1141413" y="618518"/>
+            <a:ext cx="9905998" cy="1390756"/>
+          </a:xfrm>
+        </p:spPr>
         <p:txBody>
           <a:bodyPr/>
           <a:lstStyle/>
           <a:p>
+            <a:pPr>
+              <a:lnSpc>
+                <a:spcPct val="120000"/>
+              </a:lnSpc>
+              <a:spcBef>
+                <a:spcPts val="1000"/>
+              </a:spcBef>
+              <a:buSzPct val="125000"/>
+            </a:pPr>
             <a:r>
               <a:rPr lang="nb-NO" dirty="0"/>
-              <a:t>Notat om </a:t>
+              <a:t>Notat om N</a:t>
             </a:r>
             <a:r>
-              <a:rPr lang="nb-NO" dirty="0" err="1"/>
-              <a:t>N</a:t>
-            </a:r>
-            <a:r>
-              <a:rPr lang="nb-NO" sz="2800" dirty="0" err="1"/>
+              <a:rPr lang="en-US" cap="none" dirty="0">
+                <a:solidFill>
+                  <a:prstClr val="white"/>
+                </a:solidFill>
+                <a:ea typeface="+mn-ea"/>
+                <a:cs typeface="+mn-cs"/>
+              </a:rPr>
               <a:t>d</a:t>
             </a:r>
             <a:r>
-              <a:rPr lang="nb-NO" dirty="0"/>
-              <a:t> og </a:t>
+              <a:rPr lang="en-US" sz="2400" cap="none" dirty="0">
+                <a:solidFill>
+                  <a:prstClr val="white"/>
+                </a:solidFill>
+                <a:ea typeface="+mn-ea"/>
+                <a:cs typeface="+mn-cs"/>
+              </a:rPr>
+              <a:t> </a:t>
             </a:r>
             <a:r>
-              <a:rPr lang="nb-NO" dirty="0" err="1"/>
-              <a:t>T</a:t>
+              <a:rPr lang="nb-NO" dirty="0"/>
+              <a:t>og T</a:t>
             </a:r>
             <a:r>
-              <a:rPr lang="nb-NO" sz="2800" dirty="0" err="1"/>
+              <a:rPr lang="en-US" cap="none" dirty="0">
+                <a:solidFill>
+                  <a:prstClr val="white"/>
+                </a:solidFill>
+                <a:ea typeface="+mn-ea"/>
+                <a:cs typeface="+mn-cs"/>
+              </a:rPr>
               <a:t>m</a:t>
             </a:r>
             <a:endParaRPr lang="en-US" dirty="0"/>
           </a:p>
         </p:txBody>
       </p:sp>
-      <p:sp>
-        <p:nvSpPr>
-          <p:cNvPr id="3" name="Plassholder for innhold 2">
+      <p:pic>
+        <p:nvPicPr>
+          <p:cNvPr id="8" name="Bilde 7" descr="Et bilde som inneholder tekst, transport&#10;&#10;Automatisk generert beskrivelse">
             <a:extLst>
               <a:ext uri="{FF2B5EF4-FFF2-40B4-BE49-F238E27FC236}">
-                <a16:creationId xmlns:a16="http://schemas.microsoft.com/office/drawing/2014/main" id="{48FA9FA1-D6AE-4D58-9DB5-7BF6727457A0}"/>
+                <a16:creationId xmlns:a16="http://schemas.microsoft.com/office/drawing/2014/main" id="{D755535D-96AA-8E4A-9682-29E45419FDCB}"/>
               </a:ext>
             </a:extLst>
           </p:cNvPr>
-          <p:cNvSpPr>
-            <a:spLocks noGrp="1"/>
-          </p:cNvSpPr>
-          <p:nvPr>
-            <p:ph idx="1"/>
-          </p:nvPr>
-        </p:nvSpPr>
-        <p:spPr/>
-        <p:txBody>
-          <a:bodyPr/>
-          <a:lstStyle/>
-          <a:p>
-            <a:endParaRPr lang="en-US" dirty="0"/>
-          </a:p>
-        </p:txBody>
-      </p:sp>
+          <p:cNvPicPr>
+            <a:picLocks noChangeAspect="1"/>
+          </p:cNvPicPr>
+          <p:nvPr/>
+        </p:nvPicPr>
+        <p:blipFill rotWithShape="1">
+          <a:blip r:embed="rId3">
+            <a:extLst>
+              <a:ext uri="{28A0092B-C50C-407E-A947-70E740481C1C}">
+                <a14:useLocalDpi xmlns:a14="http://schemas.microsoft.com/office/drawing/2010/main" val="0"/>
+              </a:ext>
+            </a:extLst>
+          </a:blip>
+          <a:srcRect l="31847" t="16431" r="30125" b="15222"/>
+          <a:stretch/>
+        </p:blipFill>
+        <p:spPr>
+          <a:xfrm>
+            <a:off x="6651625" y="1989685"/>
+            <a:ext cx="5085092" cy="4249797"/>
+          </a:xfrm>
+          <a:prstGeom prst="rect">
+            <a:avLst/>
+          </a:prstGeom>
+        </p:spPr>
+      </p:pic>
+      <p:pic>
+        <p:nvPicPr>
+          <p:cNvPr id="10" name="Bilde 9">
+            <a:extLst>
+              <a:ext uri="{FF2B5EF4-FFF2-40B4-BE49-F238E27FC236}">
+                <a16:creationId xmlns:a16="http://schemas.microsoft.com/office/drawing/2014/main" id="{8827B425-8B28-C345-8C4B-D00AC149D8D6}"/>
+              </a:ext>
+            </a:extLst>
+          </p:cNvPr>
+          <p:cNvPicPr>
+            <a:picLocks noChangeAspect="1"/>
+          </p:cNvPicPr>
+          <p:nvPr/>
+        </p:nvPicPr>
+        <p:blipFill rotWithShape="1">
+          <a:blip r:embed="rId4">
+            <a:extLst>
+              <a:ext uri="{28A0092B-C50C-407E-A947-70E740481C1C}">
+                <a14:useLocalDpi xmlns:a14="http://schemas.microsoft.com/office/drawing/2010/main" val="0"/>
+              </a:ext>
+            </a:extLst>
+          </a:blip>
+          <a:srcRect l="35978" t="18407" r="36024" b="17252"/>
+          <a:stretch/>
+        </p:blipFill>
+        <p:spPr>
+          <a:xfrm>
+            <a:off x="807229" y="2071194"/>
+            <a:ext cx="5169903" cy="4015282"/>
+          </a:xfrm>
+          <a:prstGeom prst="rect">
+            <a:avLst/>
+          </a:prstGeom>
+        </p:spPr>
+      </p:pic>
     </p:spTree>
     <p:extLst>
       <p:ext uri="{BB962C8B-B14F-4D97-AF65-F5344CB8AC3E}">
@@ -13232,6 +13788,264 @@
   <p:clrMapOvr>
     <a:masterClrMapping/>
   </p:clrMapOvr>
+</p:sld>
+</file>
+
+<file path=ppt/slides/slide14.xml><?xml version="1.0" encoding="utf-8"?>
+<p:sld xmlns:a="http://schemas.openxmlformats.org/drawingml/2006/main" xmlns:r="http://schemas.openxmlformats.org/officeDocument/2006/relationships" xmlns:p="http://schemas.openxmlformats.org/presentationml/2006/main">
+  <p:cSld>
+    <p:spTree>
+      <p:nvGrpSpPr>
+        <p:cNvPr id="1" name=""/>
+        <p:cNvGrpSpPr/>
+        <p:nvPr/>
+      </p:nvGrpSpPr>
+      <p:grpSpPr>
+        <a:xfrm>
+          <a:off x="0" y="0"/>
+          <a:ext cx="0" cy="0"/>
+          <a:chOff x="0" y="0"/>
+          <a:chExt cx="0" cy="0"/>
+        </a:xfrm>
+      </p:grpSpPr>
+      <p:sp>
+        <p:nvSpPr>
+          <p:cNvPr id="2" name="Tittel 1">
+            <a:extLst>
+              <a:ext uri="{FF2B5EF4-FFF2-40B4-BE49-F238E27FC236}">
+                <a16:creationId xmlns:a16="http://schemas.microsoft.com/office/drawing/2014/main" id="{F0AC731E-0AC9-F44D-B6EC-D5776CBDA38A}"/>
+              </a:ext>
+            </a:extLst>
+          </p:cNvPr>
+          <p:cNvSpPr>
+            <a:spLocks noGrp="1"/>
+          </p:cNvSpPr>
+          <p:nvPr>
+            <p:ph type="title"/>
+          </p:nvPr>
+        </p:nvSpPr>
+        <p:spPr/>
+        <p:txBody>
+          <a:bodyPr/>
+          <a:lstStyle/>
+          <a:p>
+            <a:r>
+              <a:rPr lang="nb-NO" dirty="0" err="1"/>
+              <a:t>Density</a:t>
+            </a:r>
+            <a:r>
+              <a:rPr lang="nb-NO" dirty="0"/>
+              <a:t> </a:t>
+            </a:r>
+            <a:r>
+              <a:rPr lang="nb-NO" dirty="0" err="1"/>
+              <a:t>of</a:t>
+            </a:r>
+            <a:r>
+              <a:rPr lang="nb-NO" dirty="0"/>
+              <a:t> </a:t>
+            </a:r>
+            <a:r>
+              <a:rPr lang="nb-NO" dirty="0" err="1"/>
+              <a:t>states</a:t>
+            </a:r>
+            <a:endParaRPr lang="nb-NO" dirty="0"/>
+          </a:p>
+        </p:txBody>
+      </p:sp>
+      <p:pic>
+        <p:nvPicPr>
+          <p:cNvPr id="5" name="Bilde 4">
+            <a:extLst>
+              <a:ext uri="{FF2B5EF4-FFF2-40B4-BE49-F238E27FC236}">
+                <a16:creationId xmlns:a16="http://schemas.microsoft.com/office/drawing/2014/main" id="{02DE60CD-8C83-9645-8379-A17836163AEC}"/>
+              </a:ext>
+            </a:extLst>
+          </p:cNvPr>
+          <p:cNvPicPr>
+            <a:picLocks noChangeAspect="1"/>
+          </p:cNvPicPr>
+          <p:nvPr/>
+        </p:nvPicPr>
+        <p:blipFill>
+          <a:blip r:embed="rId2">
+            <a:extLst>
+              <a:ext uri="{28A0092B-C50C-407E-A947-70E740481C1C}">
+                <a14:useLocalDpi xmlns:a14="http://schemas.microsoft.com/office/drawing/2010/main" val="0"/>
+              </a:ext>
+            </a:extLst>
+          </a:blip>
+          <a:stretch>
+            <a:fillRect/>
+          </a:stretch>
+        </p:blipFill>
+        <p:spPr>
+          <a:xfrm>
+            <a:off x="273211" y="2120279"/>
+            <a:ext cx="5821201" cy="3880800"/>
+          </a:xfrm>
+          <a:prstGeom prst="rect">
+            <a:avLst/>
+          </a:prstGeom>
+        </p:spPr>
+      </p:pic>
+      <p:pic>
+        <p:nvPicPr>
+          <p:cNvPr id="7" name="Bilde 6">
+            <a:extLst>
+              <a:ext uri="{FF2B5EF4-FFF2-40B4-BE49-F238E27FC236}">
+                <a16:creationId xmlns:a16="http://schemas.microsoft.com/office/drawing/2014/main" id="{4F9555E5-3C83-A747-8868-5F317FAA7555}"/>
+              </a:ext>
+            </a:extLst>
+          </p:cNvPr>
+          <p:cNvPicPr>
+            <a:picLocks noChangeAspect="1"/>
+          </p:cNvPicPr>
+          <p:nvPr/>
+        </p:nvPicPr>
+        <p:blipFill>
+          <a:blip r:embed="rId3">
+            <a:extLst>
+              <a:ext uri="{28A0092B-C50C-407E-A947-70E740481C1C}">
+                <a14:useLocalDpi xmlns:a14="http://schemas.microsoft.com/office/drawing/2010/main" val="0"/>
+              </a:ext>
+            </a:extLst>
+          </a:blip>
+          <a:stretch>
+            <a:fillRect/>
+          </a:stretch>
+        </p:blipFill>
+        <p:spPr>
+          <a:xfrm>
+            <a:off x="6154825" y="2136938"/>
+            <a:ext cx="5821201" cy="3880800"/>
+          </a:xfrm>
+          <a:prstGeom prst="rect">
+            <a:avLst/>
+          </a:prstGeom>
+        </p:spPr>
+      </p:pic>
+      <p:pic>
+        <p:nvPicPr>
+          <p:cNvPr id="9" name="Bilde 8">
+            <a:extLst>
+              <a:ext uri="{FF2B5EF4-FFF2-40B4-BE49-F238E27FC236}">
+                <a16:creationId xmlns:a16="http://schemas.microsoft.com/office/drawing/2014/main" id="{79B27318-87B5-6144-A6CE-B6E8F38A717B}"/>
+              </a:ext>
+            </a:extLst>
+          </p:cNvPr>
+          <p:cNvPicPr>
+            <a:picLocks noChangeAspect="1"/>
+          </p:cNvPicPr>
+          <p:nvPr/>
+        </p:nvPicPr>
+        <p:blipFill>
+          <a:blip r:embed="rId4">
+            <a:extLst>
+              <a:ext uri="{28A0092B-C50C-407E-A947-70E740481C1C}">
+                <a14:useLocalDpi xmlns:a14="http://schemas.microsoft.com/office/drawing/2010/main" val="0"/>
+              </a:ext>
+            </a:extLst>
+          </a:blip>
+          <a:stretch>
+            <a:fillRect/>
+          </a:stretch>
+        </p:blipFill>
+        <p:spPr>
+          <a:xfrm>
+            <a:off x="2822769" y="1879584"/>
+            <a:ext cx="6543285" cy="4362190"/>
+          </a:xfrm>
+          <a:prstGeom prst="rect">
+            <a:avLst/>
+          </a:prstGeom>
+        </p:spPr>
+      </p:pic>
+    </p:spTree>
+    <p:extLst>
+      <p:ext uri="{BB962C8B-B14F-4D97-AF65-F5344CB8AC3E}">
+        <p14:creationId xmlns:p14="http://schemas.microsoft.com/office/powerpoint/2010/main" val="777697386"/>
+      </p:ext>
+    </p:extLst>
+  </p:cSld>
+  <p:clrMapOvr>
+    <a:masterClrMapping/>
+  </p:clrMapOvr>
+  <p:timing>
+    <p:tnLst>
+      <p:par>
+        <p:cTn id="1" dur="indefinite" restart="never" nodeType="tmRoot">
+          <p:childTnLst>
+            <p:seq concurrent="1" nextAc="seek">
+              <p:cTn id="2" dur="indefinite" nodeType="mainSeq">
+                <p:childTnLst>
+                  <p:par>
+                    <p:cTn id="3" fill="hold">
+                      <p:stCondLst>
+                        <p:cond delay="indefinite"/>
+                      </p:stCondLst>
+                      <p:childTnLst>
+                        <p:par>
+                          <p:cTn id="4" fill="hold">
+                            <p:stCondLst>
+                              <p:cond delay="0"/>
+                            </p:stCondLst>
+                            <p:childTnLst>
+                              <p:par>
+                                <p:cTn id="5" presetID="1" presetClass="entr" presetSubtype="0" fill="hold" nodeType="clickEffect">
+                                  <p:stCondLst>
+                                    <p:cond delay="0"/>
+                                  </p:stCondLst>
+                                  <p:childTnLst>
+                                    <p:set>
+                                      <p:cBhvr>
+                                        <p:cTn id="6" dur="1" fill="hold">
+                                          <p:stCondLst>
+                                            <p:cond delay="0"/>
+                                          </p:stCondLst>
+                                        </p:cTn>
+                                        <p:tgtEl>
+                                          <p:spTgt spid="9"/>
+                                        </p:tgtEl>
+                                        <p:attrNameLst>
+                                          <p:attrName>style.visibility</p:attrName>
+                                        </p:attrNameLst>
+                                      </p:cBhvr>
+                                      <p:to>
+                                        <p:strVal val="visible"/>
+                                      </p:to>
+                                    </p:set>
+                                  </p:childTnLst>
+                                </p:cTn>
+                              </p:par>
+                            </p:childTnLst>
+                          </p:cTn>
+                        </p:par>
+                      </p:childTnLst>
+                    </p:cTn>
+                  </p:par>
+                </p:childTnLst>
+              </p:cTn>
+              <p:prevCondLst>
+                <p:cond evt="onPrev" delay="0">
+                  <p:tgtEl>
+                    <p:sldTgt/>
+                  </p:tgtEl>
+                </p:cond>
+              </p:prevCondLst>
+              <p:nextCondLst>
+                <p:cond evt="onNext" delay="0">
+                  <p:tgtEl>
+                    <p:sldTgt/>
+                  </p:tgtEl>
+                </p:cond>
+              </p:nextCondLst>
+            </p:seq>
+          </p:childTnLst>
+        </p:cTn>
+      </p:par>
+    </p:tnLst>
+  </p:timing>
 </p:sld>
 </file>
 
@@ -13371,15 +14185,7 @@
           <a:p>
             <a:r>
               <a:rPr lang="nb-NO" dirty="0"/>
-              <a:t>hva er </a:t>
-            </a:r>
-            <a:r>
-              <a:rPr lang="nb-NO" dirty="0" err="1"/>
-              <a:t>upp</a:t>
-            </a:r>
-            <a:r>
-              <a:rPr lang="nb-NO" dirty="0"/>
-              <a:t>-konvertering</a:t>
+              <a:t>hva er oppkonvertering</a:t>
             </a:r>
             <a:endParaRPr lang="en-US" dirty="0"/>
           </a:p>
@@ -14570,31 +15376,76 @@
           </a:p>
         </p:txBody>
       </p:sp>
-      <p:sp>
-        <p:nvSpPr>
-          <p:cNvPr id="3" name="Plassholder for innhold 2">
+      <p:pic>
+        <p:nvPicPr>
+          <p:cNvPr id="5" name="Bilde 4" descr="Et bilde som inneholder dag&#10;&#10;Automatisk generert beskrivelse">
             <a:extLst>
               <a:ext uri="{FF2B5EF4-FFF2-40B4-BE49-F238E27FC236}">
-                <a16:creationId xmlns:a16="http://schemas.microsoft.com/office/drawing/2014/main" id="{67851FC3-8745-4072-A2CB-B074E10CCACA}"/>
+                <a16:creationId xmlns:a16="http://schemas.microsoft.com/office/drawing/2014/main" id="{A157F21A-0466-C845-9A30-27E9A58EA9B4}"/>
               </a:ext>
             </a:extLst>
           </p:cNvPr>
-          <p:cNvSpPr>
-            <a:spLocks noGrp="1"/>
-          </p:cNvSpPr>
-          <p:nvPr>
-            <p:ph idx="1"/>
-          </p:nvPr>
-        </p:nvSpPr>
-        <p:spPr/>
-        <p:txBody>
-          <a:bodyPr/>
-          <a:lstStyle/>
-          <a:p>
-            <a:endParaRPr lang="en-US"/>
-          </a:p>
-        </p:txBody>
-      </p:sp>
+          <p:cNvPicPr>
+            <a:picLocks noChangeAspect="1"/>
+          </p:cNvPicPr>
+          <p:nvPr/>
+        </p:nvPicPr>
+        <p:blipFill rotWithShape="1">
+          <a:blip r:embed="rId2">
+            <a:extLst>
+              <a:ext uri="{28A0092B-C50C-407E-A947-70E740481C1C}">
+                <a14:useLocalDpi xmlns:a14="http://schemas.microsoft.com/office/drawing/2010/main" val="0"/>
+              </a:ext>
+            </a:extLst>
+          </a:blip>
+          <a:srcRect l="7298" t="8472" r="27452" b="7582"/>
+          <a:stretch/>
+        </p:blipFill>
+        <p:spPr>
+          <a:xfrm>
+            <a:off x="372107" y="2571750"/>
+            <a:ext cx="5612470" cy="3357562"/>
+          </a:xfrm>
+          <a:prstGeom prst="rect">
+            <a:avLst/>
+          </a:prstGeom>
+        </p:spPr>
+      </p:pic>
+      <p:pic>
+        <p:nvPicPr>
+          <p:cNvPr id="7" name="Bilde 6" descr="Et bilde som inneholder dag&#10;&#10;Automatisk generert beskrivelse">
+            <a:extLst>
+              <a:ext uri="{FF2B5EF4-FFF2-40B4-BE49-F238E27FC236}">
+                <a16:creationId xmlns:a16="http://schemas.microsoft.com/office/drawing/2014/main" id="{960DEAEE-7B05-D74B-A21E-22506FCC86C1}"/>
+              </a:ext>
+            </a:extLst>
+          </p:cNvPr>
+          <p:cNvPicPr>
+            <a:picLocks noChangeAspect="1"/>
+          </p:cNvPicPr>
+          <p:nvPr/>
+        </p:nvPicPr>
+        <p:blipFill rotWithShape="1">
+          <a:blip r:embed="rId3">
+            <a:extLst>
+              <a:ext uri="{28A0092B-C50C-407E-A947-70E740481C1C}">
+                <a14:useLocalDpi xmlns:a14="http://schemas.microsoft.com/office/drawing/2010/main" val="0"/>
+              </a:ext>
+            </a:extLst>
+          </a:blip>
+          <a:srcRect l="7298" t="8662" r="27452" b="7299"/>
+          <a:stretch/>
+        </p:blipFill>
+        <p:spPr>
+          <a:xfrm>
+            <a:off x="6213625" y="2571750"/>
+            <a:ext cx="5606268" cy="3357562"/>
+          </a:xfrm>
+          <a:prstGeom prst="rect">
+            <a:avLst/>
+          </a:prstGeom>
+        </p:spPr>
+      </p:pic>
     </p:spTree>
     <p:extLst>
       <p:ext uri="{BB962C8B-B14F-4D97-AF65-F5344CB8AC3E}">
@@ -14630,7 +15481,7 @@
           <p:cNvPr id="2" name="Tittel 1">
             <a:extLst>
               <a:ext uri="{FF2B5EF4-FFF2-40B4-BE49-F238E27FC236}">
-                <a16:creationId xmlns:a16="http://schemas.microsoft.com/office/drawing/2014/main" id="{8D530E9B-6FE2-4B02-8B3B-271AB2DBBE6C}"/>
+                <a16:creationId xmlns:a16="http://schemas.microsoft.com/office/drawing/2014/main" id="{05393AF7-A346-704E-878A-BEE346461D6E}"/>
               </a:ext>
             </a:extLst>
           </p:cNvPr>
@@ -14647,14 +15498,14 @@
           <a:lstStyle/>
           <a:p>
             <a:r>
-              <a:rPr lang="nb-NO" dirty="0" err="1"/>
-              <a:t>Quinizarin</a:t>
+              <a:rPr lang="nb-NO" dirty="0"/>
+              <a:t>Konvergens for </a:t>
             </a:r>
             <a:r>
-              <a:rPr lang="nb-NO" dirty="0"/>
-              <a:t> med Y</a:t>
+              <a:rPr lang="nb-NO" dirty="0" err="1"/>
+              <a:t>quinizarin</a:t>
             </a:r>
-            <a:endParaRPr lang="en-US" dirty="0"/>
+            <a:endParaRPr lang="nb-NO" dirty="0"/>
           </a:p>
         </p:txBody>
       </p:sp>
@@ -14663,7 +15514,7 @@
           <p:cNvPr id="3" name="Plassholder for innhold 2">
             <a:extLst>
               <a:ext uri="{FF2B5EF4-FFF2-40B4-BE49-F238E27FC236}">
-                <a16:creationId xmlns:a16="http://schemas.microsoft.com/office/drawing/2014/main" id="{D580BE3D-9CC7-49A1-A0D3-ACC61BE045EF}"/>
+                <a16:creationId xmlns:a16="http://schemas.microsoft.com/office/drawing/2014/main" id="{5062EBB3-060F-264E-BFBB-CD1271629D94}"/>
               </a:ext>
             </a:extLst>
           </p:cNvPr>
@@ -14674,19 +15525,102 @@
             <p:ph idx="1"/>
           </p:nvPr>
         </p:nvSpPr>
-        <p:spPr/>
+        <p:spPr>
+          <a:xfrm>
+            <a:off x="1141413" y="1820152"/>
+            <a:ext cx="1625851" cy="553871"/>
+          </a:xfrm>
+        </p:spPr>
         <p:txBody>
           <a:bodyPr/>
           <a:lstStyle/>
           <a:p>
-            <a:endParaRPr lang="en-US"/>
+            <a:r>
+              <a:rPr lang="nb-NO" dirty="0"/>
+              <a:t>ENCUT</a:t>
+            </a:r>
+          </a:p>
+          <a:p>
+            <a:endParaRPr lang="nb-NO" dirty="0"/>
           </a:p>
         </p:txBody>
       </p:sp>
+      <p:pic>
+        <p:nvPicPr>
+          <p:cNvPr id="5" name="Bilde 4">
+            <a:extLst>
+              <a:ext uri="{FF2B5EF4-FFF2-40B4-BE49-F238E27FC236}">
+                <a16:creationId xmlns:a16="http://schemas.microsoft.com/office/drawing/2014/main" id="{0C16FF0F-2F14-F64C-B2E5-FD1B2F157BB7}"/>
+              </a:ext>
+            </a:extLst>
+          </p:cNvPr>
+          <p:cNvPicPr>
+            <a:picLocks noChangeAspect="1"/>
+          </p:cNvPicPr>
+          <p:nvPr/>
+        </p:nvPicPr>
+        <p:blipFill>
+          <a:blip r:embed="rId2">
+            <a:extLst>
+              <a:ext uri="{28A0092B-C50C-407E-A947-70E740481C1C}">
+                <a14:useLocalDpi xmlns:a14="http://schemas.microsoft.com/office/drawing/2010/main" val="0"/>
+              </a:ext>
+            </a:extLst>
+          </a:blip>
+          <a:stretch>
+            <a:fillRect/>
+          </a:stretch>
+        </p:blipFill>
+        <p:spPr>
+          <a:xfrm>
+            <a:off x="6494990" y="2695074"/>
+            <a:ext cx="5092478" cy="3819358"/>
+          </a:xfrm>
+          <a:prstGeom prst="rect">
+            <a:avLst/>
+          </a:prstGeom>
+        </p:spPr>
+      </p:pic>
+      <p:pic>
+        <p:nvPicPr>
+          <p:cNvPr id="7" name="Bilde 6">
+            <a:extLst>
+              <a:ext uri="{FF2B5EF4-FFF2-40B4-BE49-F238E27FC236}">
+                <a16:creationId xmlns:a16="http://schemas.microsoft.com/office/drawing/2014/main" id="{6DB5B2D0-C328-FF4B-9E99-75B2316A264D}"/>
+              </a:ext>
+            </a:extLst>
+          </p:cNvPr>
+          <p:cNvPicPr>
+            <a:picLocks noChangeAspect="1"/>
+          </p:cNvPicPr>
+          <p:nvPr/>
+        </p:nvPicPr>
+        <p:blipFill>
+          <a:blip r:embed="rId3">
+            <a:extLst>
+              <a:ext uri="{28A0092B-C50C-407E-A947-70E740481C1C}">
+                <a14:useLocalDpi xmlns:a14="http://schemas.microsoft.com/office/drawing/2010/main" val="0"/>
+              </a:ext>
+            </a:extLst>
+          </a:blip>
+          <a:stretch>
+            <a:fillRect/>
+          </a:stretch>
+        </p:blipFill>
+        <p:spPr>
+          <a:xfrm>
+            <a:off x="1001935" y="2695074"/>
+            <a:ext cx="5092477" cy="3819358"/>
+          </a:xfrm>
+          <a:prstGeom prst="rect">
+            <a:avLst/>
+          </a:prstGeom>
+        </p:spPr>
+      </p:pic>
     </p:spTree>
     <p:extLst>
       <p:ext uri="{BB962C8B-B14F-4D97-AF65-F5344CB8AC3E}">
-        <p14:creationId xmlns:p14="http://schemas.microsoft.com/office/powerpoint/2010/main" val="1244725794"/>
+        <p14:creationId xmlns:p14="http://schemas.microsoft.com/office/powerpoint/2010/main" val="248458425"/>
       </p:ext>
     </p:extLst>
   </p:cSld>

</xml_diff>

<commit_message>
Update Quinizarin som en organisk sensitizer I et tynnfilm.pptx
</commit_message>
<xml_diff>
--- a/Quinizarin som en organisk sensitizer I et tynnfilm.pptx
+++ b/Quinizarin som en organisk sensitizer I et tynnfilm.pptx
@@ -217,7 +217,7 @@
           <a:p>
             <a:fld id="{777B9218-BA03-4DAA-9319-CAA116347D98}" type="datetimeFigureOut">
               <a:rPr lang="en-US" smtClean="0"/>
-              <a:t>12/2/2020</a:t>
+              <a:t>12/2/20</a:t>
             </a:fld>
             <a:endParaRPr lang="en-US"/>
           </a:p>
@@ -762,6 +762,90 @@
 </p:notes>
 </file>
 
+<file path=ppt/notesSlides/notesSlide3.xml><?xml version="1.0" encoding="utf-8"?>
+<p:notes xmlns:a="http://schemas.openxmlformats.org/drawingml/2006/main" xmlns:r="http://schemas.openxmlformats.org/officeDocument/2006/relationships" xmlns:p="http://schemas.openxmlformats.org/presentationml/2006/main">
+  <p:cSld>
+    <p:spTree>
+      <p:nvGrpSpPr>
+        <p:cNvPr id="1" name=""/>
+        <p:cNvGrpSpPr/>
+        <p:nvPr/>
+      </p:nvGrpSpPr>
+      <p:grpSpPr>
+        <a:xfrm>
+          <a:off x="0" y="0"/>
+          <a:ext cx="0" cy="0"/>
+          <a:chOff x="0" y="0"/>
+          <a:chExt cx="0" cy="0"/>
+        </a:xfrm>
+      </p:grpSpPr>
+      <p:sp>
+        <p:nvSpPr>
+          <p:cNvPr id="2" name="Plassholder for lysbilde 1"/>
+          <p:cNvSpPr>
+            <a:spLocks noGrp="1" noRot="1" noChangeAspect="1"/>
+          </p:cNvSpPr>
+          <p:nvPr>
+            <p:ph type="sldImg"/>
+          </p:nvPr>
+        </p:nvSpPr>
+        <p:spPr/>
+      </p:sp>
+      <p:sp>
+        <p:nvSpPr>
+          <p:cNvPr id="3" name="Plassholder for notater 2"/>
+          <p:cNvSpPr>
+            <a:spLocks noGrp="1"/>
+          </p:cNvSpPr>
+          <p:nvPr>
+            <p:ph type="body" idx="1"/>
+          </p:nvPr>
+        </p:nvSpPr>
+        <p:spPr/>
+        <p:txBody>
+          <a:bodyPr/>
+          <a:lstStyle/>
+          <a:p>
+            <a:endParaRPr lang="nb-NO" dirty="0"/>
+          </a:p>
+        </p:txBody>
+      </p:sp>
+      <p:sp>
+        <p:nvSpPr>
+          <p:cNvPr id="4" name="Plassholder for lysbildenummer 3"/>
+          <p:cNvSpPr>
+            <a:spLocks noGrp="1"/>
+          </p:cNvSpPr>
+          <p:nvPr>
+            <p:ph type="sldNum" sz="quarter" idx="5"/>
+          </p:nvPr>
+        </p:nvSpPr>
+        <p:spPr/>
+        <p:txBody>
+          <a:bodyPr/>
+          <a:lstStyle/>
+          <a:p>
+            <a:fld id="{8D788C1A-5050-4824-90DC-C83F32F96AFC}" type="slidenum">
+              <a:rPr lang="en-US" smtClean="0"/>
+              <a:t>14</a:t>
+            </a:fld>
+            <a:endParaRPr lang="en-US"/>
+          </a:p>
+        </p:txBody>
+      </p:sp>
+    </p:spTree>
+    <p:extLst>
+      <p:ext uri="{BB962C8B-B14F-4D97-AF65-F5344CB8AC3E}">
+        <p14:creationId xmlns:p14="http://schemas.microsoft.com/office/powerpoint/2010/main" val="3292106992"/>
+      </p:ext>
+    </p:extLst>
+  </p:cSld>
+  <p:clrMapOvr>
+    <a:masterClrMapping/>
+  </p:clrMapOvr>
+</p:notes>
+</file>
+
 <file path=ppt/slideLayouts/slideLayout1.xml><?xml version="1.0" encoding="utf-8"?>
 <p:sldLayout xmlns:a="http://schemas.openxmlformats.org/drawingml/2006/main" xmlns:r="http://schemas.openxmlformats.org/officeDocument/2006/relationships" xmlns:p="http://schemas.openxmlformats.org/presentationml/2006/main" showMasterSp="0" type="title" preserve="1">
   <p:cSld name="Tittellysbilde">
@@ -812,7 +896,7 @@
           <a:noFill/>
           <a:extLst>
             <a:ext uri="{909E8E84-426E-40dd-AFC4-6F175D3DCCD1}">
-              <a14:hiddenFill xmlns:a14="http://schemas.microsoft.com/office/drawing/2010/main" xmlns="">
+              <a14:hiddenFill xmlns="" xmlns:a14="http://schemas.microsoft.com/office/drawing/2010/main">
                 <a:solidFill>
                   <a:srgbClr val="FFFFFF"/>
                 </a:solidFill>
@@ -872,7 +956,7 @@
             </a:ln>
             <a:extLst>
               <a:ext uri="{91240B29-F687-4f45-9708-019B960494DF}">
-                <a14:hiddenLine xmlns:a14="http://schemas.microsoft.com/office/drawing/2010/main" xmlns="" w="9525">
+                <a14:hiddenLine xmlns="" xmlns:a14="http://schemas.microsoft.com/office/drawing/2010/main" w="9525">
                   <a:solidFill>
                     <a:srgbClr val="000000"/>
                   </a:solidFill>
@@ -962,7 +1046,7 @@
             </a:ln>
             <a:extLst>
               <a:ext uri="{91240B29-F687-4f45-9708-019B960494DF}">
-                <a14:hiddenLine xmlns:a14="http://schemas.microsoft.com/office/drawing/2010/main" xmlns="" w="9525">
+                <a14:hiddenLine xmlns="" xmlns:a14="http://schemas.microsoft.com/office/drawing/2010/main" w="9525">
                   <a:solidFill>
                     <a:srgbClr val="000000"/>
                   </a:solidFill>
@@ -1052,7 +1136,7 @@
             </a:ln>
             <a:extLst>
               <a:ext uri="{91240B29-F687-4f45-9708-019B960494DF}">
-                <a14:hiddenLine xmlns:a14="http://schemas.microsoft.com/office/drawing/2010/main" xmlns="" w="9525">
+                <a14:hiddenLine xmlns="" xmlns:a14="http://schemas.microsoft.com/office/drawing/2010/main" w="9525">
                   <a:solidFill>
                     <a:srgbClr val="000000"/>
                   </a:solidFill>
@@ -1086,7 +1170,7 @@
             </a:ln>
             <a:extLst>
               <a:ext uri="{91240B29-F687-4f45-9708-019B960494DF}">
-                <a14:hiddenLine xmlns:a14="http://schemas.microsoft.com/office/drawing/2010/main" xmlns="" w="9525">
+                <a14:hiddenLine xmlns="" xmlns:a14="http://schemas.microsoft.com/office/drawing/2010/main" w="9525">
                   <a:solidFill>
                     <a:srgbClr val="000000"/>
                   </a:solidFill>
@@ -1176,7 +1260,7 @@
             </a:ln>
             <a:extLst>
               <a:ext uri="{91240B29-F687-4f45-9708-019B960494DF}">
-                <a14:hiddenLine xmlns:a14="http://schemas.microsoft.com/office/drawing/2010/main" xmlns="" w="9525">
+                <a14:hiddenLine xmlns="" xmlns:a14="http://schemas.microsoft.com/office/drawing/2010/main" w="9525">
                   <a:solidFill>
                     <a:srgbClr val="000000"/>
                   </a:solidFill>
@@ -1238,7 +1322,7 @@
             </a:ln>
             <a:extLst>
               <a:ext uri="{91240B29-F687-4f45-9708-019B960494DF}">
-                <a14:hiddenLine xmlns:a14="http://schemas.microsoft.com/office/drawing/2010/main" xmlns="" w="9525">
+                <a14:hiddenLine xmlns="" xmlns:a14="http://schemas.microsoft.com/office/drawing/2010/main" w="9525">
                   <a:solidFill>
                     <a:srgbClr val="000000"/>
                   </a:solidFill>
@@ -1300,7 +1384,7 @@
             </a:ln>
             <a:extLst>
               <a:ext uri="{91240B29-F687-4f45-9708-019B960494DF}">
-                <a14:hiddenLine xmlns:a14="http://schemas.microsoft.com/office/drawing/2010/main" xmlns="" w="9525">
+                <a14:hiddenLine xmlns="" xmlns:a14="http://schemas.microsoft.com/office/drawing/2010/main" w="9525">
                   <a:solidFill>
                     <a:srgbClr val="000000"/>
                   </a:solidFill>
@@ -1390,7 +1474,7 @@
             </a:ln>
             <a:extLst>
               <a:ext uri="{91240B29-F687-4f45-9708-019B960494DF}">
-                <a14:hiddenLine xmlns:a14="http://schemas.microsoft.com/office/drawing/2010/main" xmlns="" w="9525">
+                <a14:hiddenLine xmlns="" xmlns:a14="http://schemas.microsoft.com/office/drawing/2010/main" w="9525">
                   <a:solidFill>
                     <a:srgbClr val="000000"/>
                   </a:solidFill>
@@ -1452,7 +1536,7 @@
             </a:ln>
             <a:extLst>
               <a:ext uri="{91240B29-F687-4f45-9708-019B960494DF}">
-                <a14:hiddenLine xmlns:a14="http://schemas.microsoft.com/office/drawing/2010/main" xmlns="" w="9525">
+                <a14:hiddenLine xmlns="" xmlns:a14="http://schemas.microsoft.com/office/drawing/2010/main" w="9525">
                   <a:solidFill>
                     <a:srgbClr val="000000"/>
                   </a:solidFill>
@@ -1514,7 +1598,7 @@
             </a:ln>
             <a:extLst>
               <a:ext uri="{91240B29-F687-4f45-9708-019B960494DF}">
-                <a14:hiddenLine xmlns:a14="http://schemas.microsoft.com/office/drawing/2010/main" xmlns="" w="9525">
+                <a14:hiddenLine xmlns="" xmlns:a14="http://schemas.microsoft.com/office/drawing/2010/main" w="9525">
                   <a:solidFill>
                     <a:srgbClr val="000000"/>
                   </a:solidFill>
@@ -1604,7 +1688,7 @@
             </a:ln>
             <a:extLst>
               <a:ext uri="{91240B29-F687-4f45-9708-019B960494DF}">
-                <a14:hiddenLine xmlns:a14="http://schemas.microsoft.com/office/drawing/2010/main" xmlns="" w="9525">
+                <a14:hiddenLine xmlns="" xmlns:a14="http://schemas.microsoft.com/office/drawing/2010/main" w="9525">
                   <a:solidFill>
                     <a:srgbClr val="000000"/>
                   </a:solidFill>
@@ -1694,7 +1778,7 @@
             </a:ln>
             <a:extLst>
               <a:ext uri="{91240B29-F687-4f45-9708-019B960494DF}">
-                <a14:hiddenLine xmlns:a14="http://schemas.microsoft.com/office/drawing/2010/main" xmlns="" w="9525">
+                <a14:hiddenLine xmlns="" xmlns:a14="http://schemas.microsoft.com/office/drawing/2010/main" w="9525">
                   <a:solidFill>
                     <a:srgbClr val="000000"/>
                   </a:solidFill>
@@ -1756,7 +1840,7 @@
             </a:ln>
             <a:extLst>
               <a:ext uri="{91240B29-F687-4f45-9708-019B960494DF}">
-                <a14:hiddenLine xmlns:a14="http://schemas.microsoft.com/office/drawing/2010/main" xmlns="" w="9525">
+                <a14:hiddenLine xmlns="" xmlns:a14="http://schemas.microsoft.com/office/drawing/2010/main" w="9525">
                   <a:solidFill>
                     <a:srgbClr val="000000"/>
                   </a:solidFill>
@@ -1866,7 +1950,7 @@
             </a:ln>
             <a:extLst>
               <a:ext uri="{91240B29-F687-4f45-9708-019B960494DF}">
-                <a14:hiddenLine xmlns:a14="http://schemas.microsoft.com/office/drawing/2010/main" xmlns="" w="9525">
+                <a14:hiddenLine xmlns="" xmlns:a14="http://schemas.microsoft.com/office/drawing/2010/main" w="9525">
                   <a:solidFill>
                     <a:srgbClr val="000000"/>
                   </a:solidFill>
@@ -1928,7 +2012,7 @@
             </a:ln>
             <a:extLst>
               <a:ext uri="{91240B29-F687-4f45-9708-019B960494DF}">
-                <a14:hiddenLine xmlns:a14="http://schemas.microsoft.com/office/drawing/2010/main" xmlns="" w="9525">
+                <a14:hiddenLine xmlns="" xmlns:a14="http://schemas.microsoft.com/office/drawing/2010/main" w="9525">
                   <a:solidFill>
                     <a:srgbClr val="000000"/>
                   </a:solidFill>
@@ -2018,7 +2102,7 @@
             </a:ln>
             <a:extLst>
               <a:ext uri="{91240B29-F687-4f45-9708-019B960494DF}">
-                <a14:hiddenLine xmlns:a14="http://schemas.microsoft.com/office/drawing/2010/main" xmlns="" w="9525">
+                <a14:hiddenLine xmlns="" xmlns:a14="http://schemas.microsoft.com/office/drawing/2010/main" w="9525">
                   <a:solidFill>
                     <a:srgbClr val="000000"/>
                   </a:solidFill>
@@ -2108,7 +2192,7 @@
             </a:ln>
             <a:extLst>
               <a:ext uri="{91240B29-F687-4f45-9708-019B960494DF}">
-                <a14:hiddenLine xmlns:a14="http://schemas.microsoft.com/office/drawing/2010/main" xmlns="" w="9525">
+                <a14:hiddenLine xmlns="" xmlns:a14="http://schemas.microsoft.com/office/drawing/2010/main" w="9525">
                   <a:solidFill>
                     <a:srgbClr val="000000"/>
                   </a:solidFill>
@@ -2170,7 +2254,7 @@
             </a:ln>
             <a:extLst>
               <a:ext uri="{91240B29-F687-4f45-9708-019B960494DF}">
-                <a14:hiddenLine xmlns:a14="http://schemas.microsoft.com/office/drawing/2010/main" xmlns="" w="9525">
+                <a14:hiddenLine xmlns="" xmlns:a14="http://schemas.microsoft.com/office/drawing/2010/main" w="9525">
                   <a:solidFill>
                     <a:srgbClr val="000000"/>
                   </a:solidFill>
@@ -2260,7 +2344,7 @@
             </a:ln>
             <a:extLst>
               <a:ext uri="{91240B29-F687-4f45-9708-019B960494DF}">
-                <a14:hiddenLine xmlns:a14="http://schemas.microsoft.com/office/drawing/2010/main" xmlns="" w="9525">
+                <a14:hiddenLine xmlns="" xmlns:a14="http://schemas.microsoft.com/office/drawing/2010/main" w="9525">
                   <a:solidFill>
                     <a:srgbClr val="000000"/>
                   </a:solidFill>
@@ -2350,7 +2434,7 @@
             </a:ln>
             <a:extLst>
               <a:ext uri="{91240B29-F687-4f45-9708-019B960494DF}">
-                <a14:hiddenLine xmlns:a14="http://schemas.microsoft.com/office/drawing/2010/main" xmlns="" w="9525">
+                <a14:hiddenLine xmlns="" xmlns:a14="http://schemas.microsoft.com/office/drawing/2010/main" w="9525">
                   <a:solidFill>
                     <a:srgbClr val="000000"/>
                   </a:solidFill>
@@ -2406,7 +2490,7 @@
             </a:ln>
             <a:extLst>
               <a:ext uri="{91240B29-F687-4f45-9708-019B960494DF}">
-                <a14:hiddenLine xmlns:a14="http://schemas.microsoft.com/office/drawing/2010/main" xmlns="" w="9525">
+                <a14:hiddenLine xmlns="" xmlns:a14="http://schemas.microsoft.com/office/drawing/2010/main" w="9525">
                   <a:solidFill>
                     <a:srgbClr val="000000"/>
                   </a:solidFill>
@@ -2496,7 +2580,7 @@
             </a:ln>
             <a:extLst>
               <a:ext uri="{91240B29-F687-4f45-9708-019B960494DF}">
-                <a14:hiddenLine xmlns:a14="http://schemas.microsoft.com/office/drawing/2010/main" xmlns="" w="9525">
+                <a14:hiddenLine xmlns="" xmlns:a14="http://schemas.microsoft.com/office/drawing/2010/main" w="9525">
                   <a:solidFill>
                     <a:srgbClr val="000000"/>
                   </a:solidFill>
@@ -2552,7 +2636,7 @@
             </a:ln>
             <a:extLst>
               <a:ext uri="{91240B29-F687-4f45-9708-019B960494DF}">
-                <a14:hiddenLine xmlns:a14="http://schemas.microsoft.com/office/drawing/2010/main" xmlns="" w="9525">
+                <a14:hiddenLine xmlns="" xmlns:a14="http://schemas.microsoft.com/office/drawing/2010/main" w="9525">
                   <a:solidFill>
                     <a:srgbClr val="000000"/>
                   </a:solidFill>
@@ -2642,7 +2726,7 @@
             </a:ln>
             <a:extLst>
               <a:ext uri="{91240B29-F687-4f45-9708-019B960494DF}">
-                <a14:hiddenLine xmlns:a14="http://schemas.microsoft.com/office/drawing/2010/main" xmlns="" w="9525">
+                <a14:hiddenLine xmlns="" xmlns:a14="http://schemas.microsoft.com/office/drawing/2010/main" w="9525">
                   <a:solidFill>
                     <a:srgbClr val="000000"/>
                   </a:solidFill>
@@ -2710,7 +2794,7 @@
             </a:ln>
             <a:extLst>
               <a:ext uri="{91240B29-F687-4f45-9708-019B960494DF}">
-                <a14:hiddenLine xmlns:a14="http://schemas.microsoft.com/office/drawing/2010/main" xmlns="" w="9525">
+                <a14:hiddenLine xmlns="" xmlns:a14="http://schemas.microsoft.com/office/drawing/2010/main" w="9525">
                   <a:solidFill>
                     <a:srgbClr val="000000"/>
                   </a:solidFill>
@@ -2800,7 +2884,7 @@
             </a:ln>
             <a:extLst>
               <a:ext uri="{91240B29-F687-4f45-9708-019B960494DF}">
-                <a14:hiddenLine xmlns:a14="http://schemas.microsoft.com/office/drawing/2010/main" xmlns="" w="9525">
+                <a14:hiddenLine xmlns="" xmlns:a14="http://schemas.microsoft.com/office/drawing/2010/main" w="9525">
                   <a:solidFill>
                     <a:srgbClr val="000000"/>
                   </a:solidFill>
@@ -2868,7 +2952,7 @@
             </a:ln>
             <a:extLst>
               <a:ext uri="{91240B29-F687-4f45-9708-019B960494DF}">
-                <a14:hiddenLine xmlns:a14="http://schemas.microsoft.com/office/drawing/2010/main" xmlns="" w="9525">
+                <a14:hiddenLine xmlns="" xmlns:a14="http://schemas.microsoft.com/office/drawing/2010/main" w="9525">
                   <a:solidFill>
                     <a:srgbClr val="000000"/>
                   </a:solidFill>
@@ -2958,7 +3042,7 @@
             </a:ln>
             <a:extLst>
               <a:ext uri="{91240B29-F687-4f45-9708-019B960494DF}">
-                <a14:hiddenLine xmlns:a14="http://schemas.microsoft.com/office/drawing/2010/main" xmlns="" w="9525">
+                <a14:hiddenLine xmlns="" xmlns:a14="http://schemas.microsoft.com/office/drawing/2010/main" w="9525">
                   <a:solidFill>
                     <a:srgbClr val="000000"/>
                   </a:solidFill>
@@ -2992,7 +3076,7 @@
             </a:ln>
             <a:extLst>
               <a:ext uri="{91240B29-F687-4f45-9708-019B960494DF}">
-                <a14:hiddenLine xmlns:a14="http://schemas.microsoft.com/office/drawing/2010/main" xmlns="" w="9525">
+                <a14:hiddenLine xmlns="" xmlns:a14="http://schemas.microsoft.com/office/drawing/2010/main" w="9525">
                   <a:solidFill>
                     <a:srgbClr val="000000"/>
                   </a:solidFill>
@@ -3082,7 +3166,7 @@
             </a:ln>
             <a:extLst>
               <a:ext uri="{91240B29-F687-4f45-9708-019B960494DF}">
-                <a14:hiddenLine xmlns:a14="http://schemas.microsoft.com/office/drawing/2010/main" xmlns="" w="9525">
+                <a14:hiddenLine xmlns="" xmlns:a14="http://schemas.microsoft.com/office/drawing/2010/main" w="9525">
                   <a:solidFill>
                     <a:srgbClr val="000000"/>
                   </a:solidFill>
@@ -3144,7 +3228,7 @@
             </a:ln>
             <a:extLst>
               <a:ext uri="{91240B29-F687-4f45-9708-019B960494DF}">
-                <a14:hiddenLine xmlns:a14="http://schemas.microsoft.com/office/drawing/2010/main" xmlns="" w="9525">
+                <a14:hiddenLine xmlns="" xmlns:a14="http://schemas.microsoft.com/office/drawing/2010/main" w="9525">
                   <a:solidFill>
                     <a:srgbClr val="000000"/>
                   </a:solidFill>
@@ -3206,7 +3290,7 @@
             </a:ln>
             <a:extLst>
               <a:ext uri="{91240B29-F687-4f45-9708-019B960494DF}">
-                <a14:hiddenLine xmlns:a14="http://schemas.microsoft.com/office/drawing/2010/main" xmlns="" w="9525">
+                <a14:hiddenLine xmlns="" xmlns:a14="http://schemas.microsoft.com/office/drawing/2010/main" w="9525">
                   <a:solidFill>
                     <a:srgbClr val="000000"/>
                   </a:solidFill>
@@ -3296,7 +3380,7 @@
             </a:ln>
             <a:extLst>
               <a:ext uri="{91240B29-F687-4f45-9708-019B960494DF}">
-                <a14:hiddenLine xmlns:a14="http://schemas.microsoft.com/office/drawing/2010/main" xmlns="" w="9525">
+                <a14:hiddenLine xmlns="" xmlns:a14="http://schemas.microsoft.com/office/drawing/2010/main" w="9525">
                   <a:solidFill>
                     <a:srgbClr val="000000"/>
                   </a:solidFill>
@@ -3364,7 +3448,7 @@
             </a:ln>
             <a:extLst>
               <a:ext uri="{91240B29-F687-4f45-9708-019B960494DF}">
-                <a14:hiddenLine xmlns:a14="http://schemas.microsoft.com/office/drawing/2010/main" xmlns="" w="9525">
+                <a14:hiddenLine xmlns="" xmlns:a14="http://schemas.microsoft.com/office/drawing/2010/main" w="9525">
                   <a:solidFill>
                     <a:srgbClr val="000000"/>
                   </a:solidFill>
@@ -3426,7 +3510,7 @@
             </a:ln>
             <a:extLst>
               <a:ext uri="{91240B29-F687-4f45-9708-019B960494DF}">
-                <a14:hiddenLine xmlns:a14="http://schemas.microsoft.com/office/drawing/2010/main" xmlns="" w="9525">
+                <a14:hiddenLine xmlns="" xmlns:a14="http://schemas.microsoft.com/office/drawing/2010/main" w="9525">
                   <a:solidFill>
                     <a:srgbClr val="000000"/>
                   </a:solidFill>
@@ -3516,7 +3600,7 @@
             </a:ln>
             <a:extLst>
               <a:ext uri="{91240B29-F687-4f45-9708-019B960494DF}">
-                <a14:hiddenLine xmlns:a14="http://schemas.microsoft.com/office/drawing/2010/main" xmlns="" w="9525">
+                <a14:hiddenLine xmlns="" xmlns:a14="http://schemas.microsoft.com/office/drawing/2010/main" w="9525">
                   <a:solidFill>
                     <a:srgbClr val="000000"/>
                   </a:solidFill>
@@ -3578,7 +3662,7 @@
             </a:ln>
             <a:extLst>
               <a:ext uri="{91240B29-F687-4f45-9708-019B960494DF}">
-                <a14:hiddenLine xmlns:a14="http://schemas.microsoft.com/office/drawing/2010/main" xmlns="" w="9525">
+                <a14:hiddenLine xmlns="" xmlns:a14="http://schemas.microsoft.com/office/drawing/2010/main" w="9525">
                   <a:solidFill>
                     <a:srgbClr val="000000"/>
                   </a:solidFill>
@@ -3668,7 +3752,7 @@
             </a:ln>
             <a:extLst>
               <a:ext uri="{91240B29-F687-4f45-9708-019B960494DF}">
-                <a14:hiddenLine xmlns:a14="http://schemas.microsoft.com/office/drawing/2010/main" xmlns="" w="9525">
+                <a14:hiddenLine xmlns="" xmlns:a14="http://schemas.microsoft.com/office/drawing/2010/main" w="9525">
                   <a:solidFill>
                     <a:srgbClr val="000000"/>
                   </a:solidFill>
@@ -3730,7 +3814,7 @@
             </a:ln>
             <a:extLst>
               <a:ext uri="{91240B29-F687-4f45-9708-019B960494DF}">
-                <a14:hiddenLine xmlns:a14="http://schemas.microsoft.com/office/drawing/2010/main" xmlns="" w="9525">
+                <a14:hiddenLine xmlns="" xmlns:a14="http://schemas.microsoft.com/office/drawing/2010/main" w="9525">
                   <a:solidFill>
                     <a:srgbClr val="000000"/>
                   </a:solidFill>
@@ -3820,7 +3904,7 @@
             </a:ln>
             <a:extLst>
               <a:ext uri="{91240B29-F687-4f45-9708-019B960494DF}">
-                <a14:hiddenLine xmlns:a14="http://schemas.microsoft.com/office/drawing/2010/main" xmlns="" w="9525">
+                <a14:hiddenLine xmlns="" xmlns:a14="http://schemas.microsoft.com/office/drawing/2010/main" w="9525">
                   <a:solidFill>
                     <a:srgbClr val="000000"/>
                   </a:solidFill>
@@ -3854,7 +3938,7 @@
             </a:ln>
             <a:extLst>
               <a:ext uri="{91240B29-F687-4f45-9708-019B960494DF}">
-                <a14:hiddenLine xmlns:a14="http://schemas.microsoft.com/office/drawing/2010/main" xmlns="" w="9525">
+                <a14:hiddenLine xmlns="" xmlns:a14="http://schemas.microsoft.com/office/drawing/2010/main" w="9525">
                   <a:solidFill>
                     <a:srgbClr val="000000"/>
                   </a:solidFill>
@@ -3919,7 +4003,7 @@
             </a:ln>
             <a:extLst>
               <a:ext uri="{91240B29-F687-4f45-9708-019B960494DF}">
-                <a14:hiddenLine xmlns:a14="http://schemas.microsoft.com/office/drawing/2010/main" xmlns="" w="9525">
+                <a14:hiddenLine xmlns="" xmlns:a14="http://schemas.microsoft.com/office/drawing/2010/main" w="9525">
                   <a:solidFill>
                     <a:srgbClr val="000000"/>
                   </a:solidFill>
@@ -4009,7 +4093,7 @@
             </a:ln>
             <a:extLst>
               <a:ext uri="{91240B29-F687-4f45-9708-019B960494DF}">
-                <a14:hiddenLine xmlns:a14="http://schemas.microsoft.com/office/drawing/2010/main" xmlns="" w="9525">
+                <a14:hiddenLine xmlns="" xmlns:a14="http://schemas.microsoft.com/office/drawing/2010/main" w="9525">
                   <a:solidFill>
                     <a:srgbClr val="000000"/>
                   </a:solidFill>
@@ -4071,7 +4155,7 @@
             </a:ln>
             <a:extLst>
               <a:ext uri="{91240B29-F687-4f45-9708-019B960494DF}">
-                <a14:hiddenLine xmlns:a14="http://schemas.microsoft.com/office/drawing/2010/main" xmlns="" w="9525">
+                <a14:hiddenLine xmlns="" xmlns:a14="http://schemas.microsoft.com/office/drawing/2010/main" w="9525">
                   <a:solidFill>
                     <a:srgbClr val="000000"/>
                   </a:solidFill>
@@ -4161,7 +4245,7 @@
             </a:ln>
             <a:extLst>
               <a:ext uri="{91240B29-F687-4f45-9708-019B960494DF}">
-                <a14:hiddenLine xmlns:a14="http://schemas.microsoft.com/office/drawing/2010/main" xmlns="" w="9525">
+                <a14:hiddenLine xmlns="" xmlns:a14="http://schemas.microsoft.com/office/drawing/2010/main" w="9525">
                   <a:solidFill>
                     <a:srgbClr val="000000"/>
                   </a:solidFill>
@@ -4251,7 +4335,7 @@
             </a:ln>
             <a:extLst>
               <a:ext uri="{91240B29-F687-4f45-9708-019B960494DF}">
-                <a14:hiddenLine xmlns:a14="http://schemas.microsoft.com/office/drawing/2010/main" xmlns="" w="9525">
+                <a14:hiddenLine xmlns="" xmlns:a14="http://schemas.microsoft.com/office/drawing/2010/main" w="9525">
                   <a:solidFill>
                     <a:srgbClr val="000000"/>
                   </a:solidFill>
@@ -4316,7 +4400,7 @@
             </a:ln>
             <a:extLst>
               <a:ext uri="{91240B29-F687-4f45-9708-019B960494DF}">
-                <a14:hiddenLine xmlns:a14="http://schemas.microsoft.com/office/drawing/2010/main" xmlns="" w="9525">
+                <a14:hiddenLine xmlns="" xmlns:a14="http://schemas.microsoft.com/office/drawing/2010/main" w="9525">
                   <a:solidFill>
                     <a:srgbClr val="000000"/>
                   </a:solidFill>
@@ -4378,7 +4462,7 @@
             </a:ln>
             <a:extLst>
               <a:ext uri="{91240B29-F687-4f45-9708-019B960494DF}">
-                <a14:hiddenLine xmlns:a14="http://schemas.microsoft.com/office/drawing/2010/main" xmlns="" w="9525">
+                <a14:hiddenLine xmlns="" xmlns:a14="http://schemas.microsoft.com/office/drawing/2010/main" w="9525">
                   <a:solidFill>
                     <a:srgbClr val="000000"/>
                   </a:solidFill>
@@ -4468,7 +4552,7 @@
             </a:ln>
             <a:extLst>
               <a:ext uri="{91240B29-F687-4f45-9708-019B960494DF}">
-                <a14:hiddenLine xmlns:a14="http://schemas.microsoft.com/office/drawing/2010/main" xmlns="" w="9525">
+                <a14:hiddenLine xmlns="" xmlns:a14="http://schemas.microsoft.com/office/drawing/2010/main" w="9525">
                   <a:solidFill>
                     <a:srgbClr val="000000"/>
                   </a:solidFill>
@@ -4558,7 +4642,7 @@
             </a:ln>
             <a:extLst>
               <a:ext uri="{91240B29-F687-4f45-9708-019B960494DF}">
-                <a14:hiddenLine xmlns:a14="http://schemas.microsoft.com/office/drawing/2010/main" xmlns="" w="9525">
+                <a14:hiddenLine xmlns="" xmlns:a14="http://schemas.microsoft.com/office/drawing/2010/main" w="9525">
                   <a:solidFill>
                     <a:srgbClr val="000000"/>
                   </a:solidFill>
@@ -4620,7 +4704,7 @@
             </a:ln>
             <a:extLst>
               <a:ext uri="{91240B29-F687-4f45-9708-019B960494DF}">
-                <a14:hiddenLine xmlns:a14="http://schemas.microsoft.com/office/drawing/2010/main" xmlns="" w="9525">
+                <a14:hiddenLine xmlns="" xmlns:a14="http://schemas.microsoft.com/office/drawing/2010/main" w="9525">
                   <a:solidFill>
                     <a:srgbClr val="000000"/>
                   </a:solidFill>
@@ -4740,7 +4824,7 @@
             </a:ln>
             <a:extLst>
               <a:ext uri="{91240B29-F687-4f45-9708-019B960494DF}">
-                <a14:hiddenLine xmlns:a14="http://schemas.microsoft.com/office/drawing/2010/main" xmlns="" w="9525">
+                <a14:hiddenLine xmlns="" xmlns:a14="http://schemas.microsoft.com/office/drawing/2010/main" w="9525">
                   <a:solidFill>
                     <a:srgbClr val="000000"/>
                   </a:solidFill>
@@ -4808,7 +4892,7 @@
             </a:ln>
             <a:extLst>
               <a:ext uri="{91240B29-F687-4f45-9708-019B960494DF}">
-                <a14:hiddenLine xmlns:a14="http://schemas.microsoft.com/office/drawing/2010/main" xmlns="" w="9525">
+                <a14:hiddenLine xmlns="" xmlns:a14="http://schemas.microsoft.com/office/drawing/2010/main" w="9525">
                   <a:solidFill>
                     <a:srgbClr val="000000"/>
                   </a:solidFill>
@@ -4898,7 +4982,7 @@
             </a:ln>
             <a:extLst>
               <a:ext uri="{91240B29-F687-4f45-9708-019B960494DF}">
-                <a14:hiddenLine xmlns:a14="http://schemas.microsoft.com/office/drawing/2010/main" xmlns="" w="9525">
+                <a14:hiddenLine xmlns="" xmlns:a14="http://schemas.microsoft.com/office/drawing/2010/main" w="9525">
                   <a:solidFill>
                     <a:srgbClr val="000000"/>
                   </a:solidFill>
@@ -5038,7 +5122,7 @@
           <a:p>
             <a:fld id="{AFFA8E18-38E7-4AF1-A6D2-47C002B4AF53}" type="datetimeFigureOut">
               <a:rPr lang="en-US" smtClean="0"/>
-              <a:t>12/2/2020</a:t>
+              <a:t>12/2/20</a:t>
             </a:fld>
             <a:endParaRPr lang="en-US"/>
           </a:p>
@@ -5305,7 +5389,7 @@
           <a:p>
             <a:fld id="{AFFA8E18-38E7-4AF1-A6D2-47C002B4AF53}" type="datetimeFigureOut">
               <a:rPr lang="en-US" smtClean="0"/>
-              <a:t>12/2/2020</a:t>
+              <a:t>12/2/20</a:t>
             </a:fld>
             <a:endParaRPr lang="en-US"/>
           </a:p>
@@ -5501,7 +5585,7 @@
           <a:p>
             <a:fld id="{AFFA8E18-38E7-4AF1-A6D2-47C002B4AF53}" type="datetimeFigureOut">
               <a:rPr lang="en-US" smtClean="0"/>
-              <a:t>12/2/2020</a:t>
+              <a:t>12/2/20</a:t>
             </a:fld>
             <a:endParaRPr lang="en-US"/>
           </a:p>
@@ -5764,7 +5848,7 @@
           <a:p>
             <a:fld id="{AFFA8E18-38E7-4AF1-A6D2-47C002B4AF53}" type="datetimeFigureOut">
               <a:rPr lang="en-US" smtClean="0"/>
-              <a:t>12/2/2020</a:t>
+              <a:t>12/2/20</a:t>
             </a:fld>
             <a:endParaRPr lang="en-US"/>
           </a:p>
@@ -6198,7 +6282,7 @@
           <a:p>
             <a:fld id="{AFFA8E18-38E7-4AF1-A6D2-47C002B4AF53}" type="datetimeFigureOut">
               <a:rPr lang="en-US" smtClean="0"/>
-              <a:t>12/2/2020</a:t>
+              <a:t>12/2/20</a:t>
             </a:fld>
             <a:endParaRPr lang="en-US"/>
           </a:p>
@@ -6744,7 +6828,7 @@
           <a:p>
             <a:fld id="{AFFA8E18-38E7-4AF1-A6D2-47C002B4AF53}" type="datetimeFigureOut">
               <a:rPr lang="en-US" smtClean="0"/>
-              <a:t>12/2/2020</a:t>
+              <a:t>12/2/20</a:t>
             </a:fld>
             <a:endParaRPr lang="en-US"/>
           </a:p>
@@ -7464,7 +7548,7 @@
           <a:p>
             <a:fld id="{AFFA8E18-38E7-4AF1-A6D2-47C002B4AF53}" type="datetimeFigureOut">
               <a:rPr lang="en-US" smtClean="0"/>
-              <a:t>12/2/2020</a:t>
+              <a:t>12/2/20</a:t>
             </a:fld>
             <a:endParaRPr lang="en-US"/>
           </a:p>
@@ -7634,7 +7718,7 @@
           <a:p>
             <a:fld id="{AFFA8E18-38E7-4AF1-A6D2-47C002B4AF53}" type="datetimeFigureOut">
               <a:rPr lang="en-US" smtClean="0"/>
-              <a:t>12/2/2020</a:t>
+              <a:t>12/2/20</a:t>
             </a:fld>
             <a:endParaRPr lang="en-US"/>
           </a:p>
@@ -7814,7 +7898,7 @@
           <a:p>
             <a:fld id="{AFFA8E18-38E7-4AF1-A6D2-47C002B4AF53}" type="datetimeFigureOut">
               <a:rPr lang="en-US" smtClean="0"/>
-              <a:t>12/2/2020</a:t>
+              <a:t>12/2/20</a:t>
             </a:fld>
             <a:endParaRPr lang="en-US"/>
           </a:p>
@@ -7984,7 +8068,7 @@
           <a:p>
             <a:fld id="{AFFA8E18-38E7-4AF1-A6D2-47C002B4AF53}" type="datetimeFigureOut">
               <a:rPr lang="en-US" smtClean="0"/>
-              <a:t>12/2/2020</a:t>
+              <a:t>12/2/20</a:t>
             </a:fld>
             <a:endParaRPr lang="en-US"/>
           </a:p>
@@ -8234,7 +8318,7 @@
           <a:p>
             <a:fld id="{AFFA8E18-38E7-4AF1-A6D2-47C002B4AF53}" type="datetimeFigureOut">
               <a:rPr lang="en-US" smtClean="0"/>
-              <a:t>12/2/2020</a:t>
+              <a:t>12/2/20</a:t>
             </a:fld>
             <a:endParaRPr lang="en-US"/>
           </a:p>
@@ -8466,7 +8550,7 @@
           <a:p>
             <a:fld id="{AFFA8E18-38E7-4AF1-A6D2-47C002B4AF53}" type="datetimeFigureOut">
               <a:rPr lang="en-US" smtClean="0"/>
-              <a:t>12/2/2020</a:t>
+              <a:t>12/2/20</a:t>
             </a:fld>
             <a:endParaRPr lang="en-US"/>
           </a:p>
@@ -8847,7 +8931,7 @@
           <a:p>
             <a:fld id="{AFFA8E18-38E7-4AF1-A6D2-47C002B4AF53}" type="datetimeFigureOut">
               <a:rPr lang="en-US" smtClean="0"/>
-              <a:t>12/2/2020</a:t>
+              <a:t>12/2/20</a:t>
             </a:fld>
             <a:endParaRPr lang="en-US"/>
           </a:p>
@@ -8965,7 +9049,7 @@
           <a:p>
             <a:fld id="{AFFA8E18-38E7-4AF1-A6D2-47C002B4AF53}" type="datetimeFigureOut">
               <a:rPr lang="en-US" smtClean="0"/>
-              <a:t>12/2/2020</a:t>
+              <a:t>12/2/20</a:t>
             </a:fld>
             <a:endParaRPr lang="en-US"/>
           </a:p>
@@ -9060,7 +9144,7 @@
           <a:p>
             <a:fld id="{AFFA8E18-38E7-4AF1-A6D2-47C002B4AF53}" type="datetimeFigureOut">
               <a:rPr lang="en-US" smtClean="0"/>
-              <a:t>12/2/2020</a:t>
+              <a:t>12/2/20</a:t>
             </a:fld>
             <a:endParaRPr lang="en-US"/>
           </a:p>
@@ -9309,7 +9393,7 @@
           <a:p>
             <a:fld id="{AFFA8E18-38E7-4AF1-A6D2-47C002B4AF53}" type="datetimeFigureOut">
               <a:rPr lang="en-US" smtClean="0"/>
-              <a:t>12/2/2020</a:t>
+              <a:t>12/2/20</a:t>
             </a:fld>
             <a:endParaRPr lang="en-US"/>
           </a:p>
@@ -9589,7 +9673,7 @@
           <a:p>
             <a:fld id="{AFFA8E18-38E7-4AF1-A6D2-47C002B4AF53}" type="datetimeFigureOut">
               <a:rPr lang="en-US" smtClean="0"/>
-              <a:t>12/2/2020</a:t>
+              <a:t>12/2/20</a:t>
             </a:fld>
             <a:endParaRPr lang="en-US"/>
           </a:p>
@@ -9705,7 +9789,7 @@
           <a:noFill/>
           <a:extLst>
             <a:ext uri="{909E8E84-426E-40dd-AFC4-6F175D3DCCD1}">
-              <a14:hiddenFill xmlns:a14="http://schemas.microsoft.com/office/drawing/2010/main" xmlns="">
+              <a14:hiddenFill xmlns="" xmlns:a14="http://schemas.microsoft.com/office/drawing/2010/main">
                 <a:solidFill>
                   <a:srgbClr val="FFFFFF"/>
                 </a:solidFill>
@@ -9779,7 +9863,7 @@
               </a:ln>
               <a:extLst>
                 <a:ext uri="{91240B29-F687-4f45-9708-019B960494DF}">
-                  <a14:hiddenLine xmlns:a14="http://schemas.microsoft.com/office/drawing/2010/main" xmlns="" w="9525">
+                  <a14:hiddenLine xmlns="" xmlns:a14="http://schemas.microsoft.com/office/drawing/2010/main" w="9525">
                     <a:solidFill>
                       <a:srgbClr val="000000"/>
                     </a:solidFill>
@@ -9869,7 +9953,7 @@
               </a:ln>
               <a:extLst>
                 <a:ext uri="{91240B29-F687-4f45-9708-019B960494DF}">
-                  <a14:hiddenLine xmlns:a14="http://schemas.microsoft.com/office/drawing/2010/main" xmlns="" w="9525">
+                  <a14:hiddenLine xmlns="" xmlns:a14="http://schemas.microsoft.com/office/drawing/2010/main" w="9525">
                     <a:solidFill>
                       <a:srgbClr val="000000"/>
                     </a:solidFill>
@@ -9959,7 +10043,7 @@
               </a:ln>
               <a:extLst>
                 <a:ext uri="{91240B29-F687-4f45-9708-019B960494DF}">
-                  <a14:hiddenLine xmlns:a14="http://schemas.microsoft.com/office/drawing/2010/main" xmlns="" w="9525">
+                  <a14:hiddenLine xmlns="" xmlns:a14="http://schemas.microsoft.com/office/drawing/2010/main" w="9525">
                     <a:solidFill>
                       <a:srgbClr val="000000"/>
                     </a:solidFill>
@@ -10021,7 +10105,7 @@
               </a:ln>
               <a:extLst>
                 <a:ext uri="{91240B29-F687-4f45-9708-019B960494DF}">
-                  <a14:hiddenLine xmlns:a14="http://schemas.microsoft.com/office/drawing/2010/main" xmlns="" w="9525">
+                  <a14:hiddenLine xmlns="" xmlns:a14="http://schemas.microsoft.com/office/drawing/2010/main" w="9525">
                     <a:solidFill>
                       <a:srgbClr val="000000"/>
                     </a:solidFill>
@@ -10111,7 +10195,7 @@
               </a:ln>
               <a:extLst>
                 <a:ext uri="{91240B29-F687-4f45-9708-019B960494DF}">
-                  <a14:hiddenLine xmlns:a14="http://schemas.microsoft.com/office/drawing/2010/main" xmlns="" w="9525">
+                  <a14:hiddenLine xmlns="" xmlns:a14="http://schemas.microsoft.com/office/drawing/2010/main" w="9525">
                     <a:solidFill>
                       <a:srgbClr val="000000"/>
                     </a:solidFill>
@@ -10173,7 +10257,7 @@
               </a:ln>
               <a:extLst>
                 <a:ext uri="{91240B29-F687-4f45-9708-019B960494DF}">
-                  <a14:hiddenLine xmlns:a14="http://schemas.microsoft.com/office/drawing/2010/main" xmlns="" w="9525">
+                  <a14:hiddenLine xmlns="" xmlns:a14="http://schemas.microsoft.com/office/drawing/2010/main" w="9525">
                     <a:solidFill>
                       <a:srgbClr val="000000"/>
                     </a:solidFill>
@@ -10235,7 +10319,7 @@
               </a:ln>
               <a:extLst>
                 <a:ext uri="{91240B29-F687-4f45-9708-019B960494DF}">
-                  <a14:hiddenLine xmlns:a14="http://schemas.microsoft.com/office/drawing/2010/main" xmlns="" w="9525">
+                  <a14:hiddenLine xmlns="" xmlns:a14="http://schemas.microsoft.com/office/drawing/2010/main" w="9525">
                     <a:solidFill>
                       <a:srgbClr val="000000"/>
                     </a:solidFill>
@@ -10325,7 +10409,7 @@
               </a:ln>
               <a:extLst>
                 <a:ext uri="{91240B29-F687-4f45-9708-019B960494DF}">
-                  <a14:hiddenLine xmlns:a14="http://schemas.microsoft.com/office/drawing/2010/main" xmlns="" w="9525">
+                  <a14:hiddenLine xmlns="" xmlns:a14="http://schemas.microsoft.com/office/drawing/2010/main" w="9525">
                     <a:solidFill>
                       <a:srgbClr val="000000"/>
                     </a:solidFill>
@@ -10415,7 +10499,7 @@
               </a:ln>
               <a:extLst>
                 <a:ext uri="{91240B29-F687-4f45-9708-019B960494DF}">
-                  <a14:hiddenLine xmlns:a14="http://schemas.microsoft.com/office/drawing/2010/main" xmlns="" w="9525">
+                  <a14:hiddenLine xmlns="" xmlns:a14="http://schemas.microsoft.com/office/drawing/2010/main" w="9525">
                     <a:solidFill>
                       <a:srgbClr val="000000"/>
                     </a:solidFill>
@@ -10477,7 +10561,7 @@
               </a:ln>
               <a:extLst>
                 <a:ext uri="{91240B29-F687-4f45-9708-019B960494DF}">
-                  <a14:hiddenLine xmlns:a14="http://schemas.microsoft.com/office/drawing/2010/main" xmlns="" w="9525">
+                  <a14:hiddenLine xmlns="" xmlns:a14="http://schemas.microsoft.com/office/drawing/2010/main" w="9525">
                     <a:solidFill>
                       <a:srgbClr val="000000"/>
                     </a:solidFill>
@@ -10587,7 +10671,7 @@
               </a:ln>
               <a:extLst>
                 <a:ext uri="{91240B29-F687-4f45-9708-019B960494DF}">
-                  <a14:hiddenLine xmlns:a14="http://schemas.microsoft.com/office/drawing/2010/main" xmlns="" w="9525">
+                  <a14:hiddenLine xmlns="" xmlns:a14="http://schemas.microsoft.com/office/drawing/2010/main" w="9525">
                     <a:solidFill>
                       <a:srgbClr val="000000"/>
                     </a:solidFill>
@@ -10671,7 +10755,7 @@
               </a:ln>
               <a:extLst>
                 <a:ext uri="{91240B29-F687-4f45-9708-019B960494DF}">
-                  <a14:hiddenLine xmlns:a14="http://schemas.microsoft.com/office/drawing/2010/main" xmlns="" w="9525">
+                  <a14:hiddenLine xmlns="" xmlns:a14="http://schemas.microsoft.com/office/drawing/2010/main" w="9525">
                     <a:solidFill>
                       <a:srgbClr val="000000"/>
                     </a:solidFill>
@@ -10733,7 +10817,7 @@
               </a:ln>
               <a:extLst>
                 <a:ext uri="{91240B29-F687-4f45-9708-019B960494DF}">
-                  <a14:hiddenLine xmlns:a14="http://schemas.microsoft.com/office/drawing/2010/main" xmlns="" w="9525">
+                  <a14:hiddenLine xmlns="" xmlns:a14="http://schemas.microsoft.com/office/drawing/2010/main" w="9525">
                     <a:solidFill>
                       <a:srgbClr val="000000"/>
                     </a:solidFill>
@@ -10795,7 +10879,7 @@
               </a:ln>
               <a:extLst>
                 <a:ext uri="{91240B29-F687-4f45-9708-019B960494DF}">
-                  <a14:hiddenLine xmlns:a14="http://schemas.microsoft.com/office/drawing/2010/main" xmlns="" w="9525">
+                  <a14:hiddenLine xmlns="" xmlns:a14="http://schemas.microsoft.com/office/drawing/2010/main" w="9525">
                     <a:solidFill>
                       <a:srgbClr val="000000"/>
                     </a:solidFill>
@@ -10885,7 +10969,7 @@
               </a:ln>
               <a:extLst>
                 <a:ext uri="{91240B29-F687-4f45-9708-019B960494DF}">
-                  <a14:hiddenLine xmlns:a14="http://schemas.microsoft.com/office/drawing/2010/main" xmlns="" w="9525">
+                  <a14:hiddenLine xmlns="" xmlns:a14="http://schemas.microsoft.com/office/drawing/2010/main" w="9525">
                     <a:solidFill>
                       <a:srgbClr val="000000"/>
                     </a:solidFill>
@@ -10919,7 +11003,7 @@
               </a:ln>
               <a:extLst>
                 <a:ext uri="{91240B29-F687-4f45-9708-019B960494DF}">
-                  <a14:hiddenLine xmlns:a14="http://schemas.microsoft.com/office/drawing/2010/main" xmlns="" w="9525">
+                  <a14:hiddenLine xmlns="" xmlns:a14="http://schemas.microsoft.com/office/drawing/2010/main" w="9525">
                     <a:solidFill>
                       <a:srgbClr val="000000"/>
                     </a:solidFill>
@@ -10984,7 +11068,7 @@
               </a:ln>
               <a:extLst>
                 <a:ext uri="{91240B29-F687-4f45-9708-019B960494DF}">
-                  <a14:hiddenLine xmlns:a14="http://schemas.microsoft.com/office/drawing/2010/main" xmlns="" w="9525">
+                  <a14:hiddenLine xmlns="" xmlns:a14="http://schemas.microsoft.com/office/drawing/2010/main" w="9525">
                     <a:solidFill>
                       <a:srgbClr val="000000"/>
                     </a:solidFill>
@@ -11074,7 +11158,7 @@
               </a:ln>
               <a:extLst>
                 <a:ext uri="{91240B29-F687-4f45-9708-019B960494DF}">
-                  <a14:hiddenLine xmlns:a14="http://schemas.microsoft.com/office/drawing/2010/main" xmlns="" w="9525">
+                  <a14:hiddenLine xmlns="" xmlns:a14="http://schemas.microsoft.com/office/drawing/2010/main" w="9525">
                     <a:solidFill>
                       <a:srgbClr val="000000"/>
                     </a:solidFill>
@@ -11136,7 +11220,7 @@
               </a:ln>
               <a:extLst>
                 <a:ext uri="{91240B29-F687-4f45-9708-019B960494DF}">
-                  <a14:hiddenLine xmlns:a14="http://schemas.microsoft.com/office/drawing/2010/main" xmlns="" w="9525">
+                  <a14:hiddenLine xmlns="" xmlns:a14="http://schemas.microsoft.com/office/drawing/2010/main" w="9525">
                     <a:solidFill>
                       <a:srgbClr val="000000"/>
                     </a:solidFill>
@@ -11226,7 +11310,7 @@
               </a:ln>
               <a:extLst>
                 <a:ext uri="{91240B29-F687-4f45-9708-019B960494DF}">
-                  <a14:hiddenLine xmlns:a14="http://schemas.microsoft.com/office/drawing/2010/main" xmlns="" w="9525">
+                  <a14:hiddenLine xmlns="" xmlns:a14="http://schemas.microsoft.com/office/drawing/2010/main" w="9525">
                     <a:solidFill>
                       <a:srgbClr val="000000"/>
                     </a:solidFill>
@@ -11291,7 +11375,7 @@
               </a:ln>
               <a:extLst>
                 <a:ext uri="{91240B29-F687-4f45-9708-019B960494DF}">
-                  <a14:hiddenLine xmlns:a14="http://schemas.microsoft.com/office/drawing/2010/main" xmlns="" w="9525">
+                  <a14:hiddenLine xmlns="" xmlns:a14="http://schemas.microsoft.com/office/drawing/2010/main" w="9525">
                     <a:solidFill>
                       <a:srgbClr val="000000"/>
                     </a:solidFill>
@@ -11353,7 +11437,7 @@
               </a:ln>
               <a:extLst>
                 <a:ext uri="{91240B29-F687-4f45-9708-019B960494DF}">
-                  <a14:hiddenLine xmlns:a14="http://schemas.microsoft.com/office/drawing/2010/main" xmlns="" w="9525">
+                  <a14:hiddenLine xmlns="" xmlns:a14="http://schemas.microsoft.com/office/drawing/2010/main" w="9525">
                     <a:solidFill>
                       <a:srgbClr val="000000"/>
                     </a:solidFill>
@@ -11443,7 +11527,7 @@
               </a:ln>
               <a:extLst>
                 <a:ext uri="{91240B29-F687-4f45-9708-019B960494DF}">
-                  <a14:hiddenLine xmlns:a14="http://schemas.microsoft.com/office/drawing/2010/main" xmlns="" w="9525">
+                  <a14:hiddenLine xmlns="" xmlns:a14="http://schemas.microsoft.com/office/drawing/2010/main" w="9525">
                     <a:solidFill>
                       <a:srgbClr val="000000"/>
                     </a:solidFill>
@@ -11533,7 +11617,7 @@
               </a:ln>
               <a:extLst>
                 <a:ext uri="{91240B29-F687-4f45-9708-019B960494DF}">
-                  <a14:hiddenLine xmlns:a14="http://schemas.microsoft.com/office/drawing/2010/main" xmlns="" w="9525">
+                  <a14:hiddenLine xmlns="" xmlns:a14="http://schemas.microsoft.com/office/drawing/2010/main" w="9525">
                     <a:solidFill>
                       <a:srgbClr val="000000"/>
                     </a:solidFill>
@@ -11598,7 +11682,7 @@
               </a:ln>
               <a:extLst>
                 <a:ext uri="{91240B29-F687-4f45-9708-019B960494DF}">
-                  <a14:hiddenLine xmlns:a14="http://schemas.microsoft.com/office/drawing/2010/main" xmlns="" w="9525">
+                  <a14:hiddenLine xmlns="" xmlns:a14="http://schemas.microsoft.com/office/drawing/2010/main" w="9525">
                     <a:solidFill>
                       <a:srgbClr val="000000"/>
                     </a:solidFill>
@@ -11718,7 +11802,7 @@
               </a:ln>
               <a:extLst>
                 <a:ext uri="{91240B29-F687-4f45-9708-019B960494DF}">
-                  <a14:hiddenLine xmlns:a14="http://schemas.microsoft.com/office/drawing/2010/main" xmlns="" w="9525">
+                  <a14:hiddenLine xmlns="" xmlns:a14="http://schemas.microsoft.com/office/drawing/2010/main" w="9525">
                     <a:solidFill>
                       <a:srgbClr val="000000"/>
                     </a:solidFill>
@@ -11816,7 +11900,7 @@
               </a:ln>
               <a:extLst>
                 <a:ext uri="{91240B29-F687-4f45-9708-019B960494DF}">
-                  <a14:hiddenLine xmlns:a14="http://schemas.microsoft.com/office/drawing/2010/main" xmlns="" w="9525">
+                  <a14:hiddenLine xmlns="" xmlns:a14="http://schemas.microsoft.com/office/drawing/2010/main" w="9525">
                     <a:solidFill>
                       <a:srgbClr val="000000"/>
                     </a:solidFill>
@@ -11931,7 +12015,7 @@
               </a:ln>
               <a:extLst>
                 <a:ext uri="{91240B29-F687-4f45-9708-019B960494DF}">
-                  <a14:hiddenLine xmlns:a14="http://schemas.microsoft.com/office/drawing/2010/main" xmlns="" w="9525">
+                  <a14:hiddenLine xmlns="" xmlns:a14="http://schemas.microsoft.com/office/drawing/2010/main" w="9525">
                     <a:solidFill>
                       <a:srgbClr val="000000"/>
                     </a:solidFill>
@@ -12021,7 +12105,7 @@
               </a:ln>
               <a:extLst>
                 <a:ext uri="{91240B29-F687-4f45-9708-019B960494DF}">
-                  <a14:hiddenLine xmlns:a14="http://schemas.microsoft.com/office/drawing/2010/main" xmlns="" w="9525">
+                  <a14:hiddenLine xmlns="" xmlns:a14="http://schemas.microsoft.com/office/drawing/2010/main" w="9525">
                     <a:solidFill>
                       <a:srgbClr val="000000"/>
                     </a:solidFill>
@@ -12086,7 +12170,7 @@
               </a:ln>
               <a:extLst>
                 <a:ext uri="{91240B29-F687-4f45-9708-019B960494DF}">
-                  <a14:hiddenLine xmlns:a14="http://schemas.microsoft.com/office/drawing/2010/main" xmlns="" w="9525">
+                  <a14:hiddenLine xmlns="" xmlns:a14="http://schemas.microsoft.com/office/drawing/2010/main" w="9525">
                     <a:solidFill>
                       <a:srgbClr val="000000"/>
                     </a:solidFill>
@@ -12176,7 +12260,7 @@
               </a:ln>
               <a:extLst>
                 <a:ext uri="{91240B29-F687-4f45-9708-019B960494DF}">
-                  <a14:hiddenLine xmlns:a14="http://schemas.microsoft.com/office/drawing/2010/main" xmlns="" w="9525">
+                  <a14:hiddenLine xmlns="" xmlns:a14="http://schemas.microsoft.com/office/drawing/2010/main" w="9525">
                     <a:solidFill>
                       <a:srgbClr val="000000"/>
                     </a:solidFill>
@@ -12244,7 +12328,7 @@
               </a:ln>
               <a:extLst>
                 <a:ext uri="{91240B29-F687-4f45-9708-019B960494DF}">
-                  <a14:hiddenLine xmlns:a14="http://schemas.microsoft.com/office/drawing/2010/main" xmlns="" w="9525">
+                  <a14:hiddenLine xmlns="" xmlns:a14="http://schemas.microsoft.com/office/drawing/2010/main" w="9525">
                     <a:solidFill>
                       <a:srgbClr val="000000"/>
                     </a:solidFill>
@@ -12334,7 +12418,7 @@
               </a:ln>
               <a:extLst>
                 <a:ext uri="{91240B29-F687-4f45-9708-019B960494DF}">
-                  <a14:hiddenLine xmlns:a14="http://schemas.microsoft.com/office/drawing/2010/main" xmlns="" w="9525">
+                  <a14:hiddenLine xmlns="" xmlns:a14="http://schemas.microsoft.com/office/drawing/2010/main" w="9525">
                     <a:solidFill>
                       <a:srgbClr val="000000"/>
                     </a:solidFill>
@@ -12402,7 +12486,7 @@
               </a:ln>
               <a:extLst>
                 <a:ext uri="{91240B29-F687-4f45-9708-019B960494DF}">
-                  <a14:hiddenLine xmlns:a14="http://schemas.microsoft.com/office/drawing/2010/main" xmlns="" w="9525">
+                  <a14:hiddenLine xmlns="" xmlns:a14="http://schemas.microsoft.com/office/drawing/2010/main" w="9525">
                     <a:solidFill>
                       <a:srgbClr val="000000"/>
                     </a:solidFill>
@@ -12492,7 +12576,7 @@
               </a:ln>
               <a:extLst>
                 <a:ext uri="{91240B29-F687-4f45-9708-019B960494DF}">
-                  <a14:hiddenLine xmlns:a14="http://schemas.microsoft.com/office/drawing/2010/main" xmlns="" w="9525">
+                  <a14:hiddenLine xmlns="" xmlns:a14="http://schemas.microsoft.com/office/drawing/2010/main" w="9525">
                     <a:solidFill>
                       <a:srgbClr val="000000"/>
                     </a:solidFill>
@@ -12526,7 +12610,7 @@
               </a:ln>
               <a:extLst>
                 <a:ext uri="{91240B29-F687-4f45-9708-019B960494DF}">
-                  <a14:hiddenLine xmlns:a14="http://schemas.microsoft.com/office/drawing/2010/main" xmlns="" w="9525">
+                  <a14:hiddenLine xmlns="" xmlns:a14="http://schemas.microsoft.com/office/drawing/2010/main" w="9525">
                     <a:solidFill>
                       <a:srgbClr val="000000"/>
                     </a:solidFill>
@@ -12666,7 +12750,7 @@
           <a:p>
             <a:fld id="{AFFA8E18-38E7-4AF1-A6D2-47C002B4AF53}" type="datetimeFigureOut">
               <a:rPr lang="en-US" smtClean="0"/>
-              <a:t>12/2/2020</a:t>
+              <a:t>12/2/20</a:t>
             </a:fld>
             <a:endParaRPr lang="en-US"/>
           </a:p>
@@ -13860,14 +13944,14 @@
             <p:ph idx="1"/>
             <p:extLst>
               <p:ext uri="{D42A27DB-BD31-4B8C-83A1-F6EECF244321}">
-                <p14:modId xmlns:p14="http://schemas.microsoft.com/office/powerpoint/2010/main" val="2756903915"/>
+                <p14:modId xmlns:p14="http://schemas.microsoft.com/office/powerpoint/2010/main" val="3979350147"/>
               </p:ext>
             </p:extLst>
           </p:nvPr>
         </p:nvGraphicFramePr>
         <p:xfrm>
           <a:off x="1141413" y="2249488"/>
-          <a:ext cx="9906000" cy="1112520"/>
+          <a:ext cx="10520500" cy="1112520"/>
         </p:xfrm>
         <a:graphic>
           <a:graphicData uri="http://schemas.openxmlformats.org/drawingml/2006/table">
@@ -13876,28 +13960,28 @@
                 <a:tableStyleId>{5C22544A-7EE6-4342-B048-85BDC9FD1C3A}</a:tableStyleId>
               </a:tblPr>
               <a:tblGrid>
-                <a:gridCol w="2476500">
+                <a:gridCol w="2264396">
                   <a:extLst>
                     <a:ext uri="{9D8B030D-6E8A-4147-A177-3AD203B41FA5}">
                       <a16:colId xmlns:a16="http://schemas.microsoft.com/office/drawing/2014/main" val="4061209500"/>
                     </a:ext>
                   </a:extLst>
                 </a:gridCol>
-                <a:gridCol w="2476500">
+                <a:gridCol w="2252869">
                   <a:extLst>
                     <a:ext uri="{9D8B030D-6E8A-4147-A177-3AD203B41FA5}">
                       <a16:colId xmlns:a16="http://schemas.microsoft.com/office/drawing/2014/main" val="3848457553"/>
                     </a:ext>
                   </a:extLst>
                 </a:gridCol>
-                <a:gridCol w="2476500">
+                <a:gridCol w="2862470">
                   <a:extLst>
                     <a:ext uri="{9D8B030D-6E8A-4147-A177-3AD203B41FA5}">
                       <a16:colId xmlns:a16="http://schemas.microsoft.com/office/drawing/2014/main" val="3053023025"/>
                     </a:ext>
                   </a:extLst>
                 </a:gridCol>
-                <a:gridCol w="2476500">
+                <a:gridCol w="3140765">
                   <a:extLst>
                     <a:ext uri="{9D8B030D-6E8A-4147-A177-3AD203B41FA5}">
                       <a16:colId xmlns:a16="http://schemas.microsoft.com/office/drawing/2014/main" val="1859756814"/>
@@ -13981,7 +14065,7 @@
                       </a:r>
                       <a:r>
                         <a:rPr lang="nb-NO" dirty="0"/>
-                        <a:t> [eV]</a:t>
+                        <a:t> [eV/atom]</a:t>
                       </a:r>
                       <a:endParaRPr lang="en-US" dirty="0"/>
                     </a:p>
@@ -14016,7 +14100,7 @@
                       </a:r>
                       <a:r>
                         <a:rPr lang="nb-NO" dirty="0"/>
-                        <a:t> [eV]</a:t>
+                        <a:t> [eV/atom]</a:t>
                       </a:r>
                       <a:endParaRPr lang="en-US" dirty="0"/>
                     </a:p>
@@ -14051,7 +14135,7 @@
                       </a:r>
                       <a:r>
                         <a:rPr lang="nb-NO" dirty="0"/>
-                        <a:t> med Y [eV]</a:t>
+                        <a:t> med Y [eV/atom]</a:t>
                       </a:r>
                       <a:endParaRPr lang="en-US" dirty="0"/>
                     </a:p>
@@ -14094,7 +14178,7 @@
                       </a:r>
                       <a:r>
                         <a:rPr lang="nb-NO" dirty="0"/>
-                        <a:t> [eV]</a:t>
+                        <a:t> [eV/atom]</a:t>
                       </a:r>
                       <a:endParaRPr lang="en-US" dirty="0"/>
                     </a:p>
@@ -15145,7 +15229,7 @@
             <p:ph idx="1"/>
             <p:extLst>
               <p:ext uri="{D42A27DB-BD31-4B8C-83A1-F6EECF244321}">
-                <p14:modId xmlns:p14="http://schemas.microsoft.com/office/powerpoint/2010/main" val="502797646"/>
+                <p14:modId xmlns:p14="http://schemas.microsoft.com/office/powerpoint/2010/main" val="3347345691"/>
               </p:ext>
             </p:extLst>
           </p:nvPr>
@@ -15294,7 +15378,7 @@
                       </a:pPr>
                       <a:r>
                         <a:rPr lang="nb-NO" dirty="0" err="1"/>
-                        <a:t>Bandgap</a:t>
+                        <a:t>Båndgap</a:t>
                       </a:r>
                       <a:r>
                         <a:rPr lang="nb-NO" dirty="0"/>

</xml_diff>

<commit_message>
mer i innholdsfortegnelse og flyttet på feilplassert slide
</commit_message>
<xml_diff>
--- a/Quinizarin som en organisk sensitizer I et tynnfilm.pptx
+++ b/Quinizarin som en organisk sensitizer I et tynnfilm.pptx
@@ -15,9 +15,9 @@
     <p:sldId id="259" r:id="rId6"/>
     <p:sldId id="260" r:id="rId7"/>
     <p:sldId id="261" r:id="rId8"/>
-    <p:sldId id="263" r:id="rId9"/>
-    <p:sldId id="269" r:id="rId10"/>
-    <p:sldId id="267" r:id="rId11"/>
+    <p:sldId id="269" r:id="rId9"/>
+    <p:sldId id="267" r:id="rId10"/>
+    <p:sldId id="263" r:id="rId11"/>
     <p:sldId id="265" r:id="rId12"/>
     <p:sldId id="264" r:id="rId13"/>
     <p:sldId id="266" r:id="rId14"/>
@@ -217,7 +217,7 @@
           <a:p>
             <a:fld id="{777B9218-BA03-4DAA-9319-CAA116347D98}" type="datetimeFigureOut">
               <a:rPr lang="en-US" smtClean="0"/>
-              <a:t>12/2/20</a:t>
+              <a:t>12/2/2020</a:t>
             </a:fld>
             <a:endParaRPr lang="en-US"/>
           </a:p>
@@ -896,7 +896,7 @@
           <a:noFill/>
           <a:extLst>
             <a:ext uri="{909E8E84-426E-40dd-AFC4-6F175D3DCCD1}">
-              <a14:hiddenFill xmlns="" xmlns:a14="http://schemas.microsoft.com/office/drawing/2010/main">
+              <a14:hiddenFill xmlns:a14="http://schemas.microsoft.com/office/drawing/2010/main" xmlns="">
                 <a:solidFill>
                   <a:srgbClr val="FFFFFF"/>
                 </a:solidFill>
@@ -956,7 +956,7 @@
             </a:ln>
             <a:extLst>
               <a:ext uri="{91240B29-F687-4f45-9708-019B960494DF}">
-                <a14:hiddenLine xmlns="" xmlns:a14="http://schemas.microsoft.com/office/drawing/2010/main" w="9525">
+                <a14:hiddenLine xmlns:a14="http://schemas.microsoft.com/office/drawing/2010/main" xmlns="" w="9525">
                   <a:solidFill>
                     <a:srgbClr val="000000"/>
                   </a:solidFill>
@@ -1046,7 +1046,7 @@
             </a:ln>
             <a:extLst>
               <a:ext uri="{91240B29-F687-4f45-9708-019B960494DF}">
-                <a14:hiddenLine xmlns="" xmlns:a14="http://schemas.microsoft.com/office/drawing/2010/main" w="9525">
+                <a14:hiddenLine xmlns:a14="http://schemas.microsoft.com/office/drawing/2010/main" xmlns="" w="9525">
                   <a:solidFill>
                     <a:srgbClr val="000000"/>
                   </a:solidFill>
@@ -1136,7 +1136,7 @@
             </a:ln>
             <a:extLst>
               <a:ext uri="{91240B29-F687-4f45-9708-019B960494DF}">
-                <a14:hiddenLine xmlns="" xmlns:a14="http://schemas.microsoft.com/office/drawing/2010/main" w="9525">
+                <a14:hiddenLine xmlns:a14="http://schemas.microsoft.com/office/drawing/2010/main" xmlns="" w="9525">
                   <a:solidFill>
                     <a:srgbClr val="000000"/>
                   </a:solidFill>
@@ -1170,7 +1170,7 @@
             </a:ln>
             <a:extLst>
               <a:ext uri="{91240B29-F687-4f45-9708-019B960494DF}">
-                <a14:hiddenLine xmlns="" xmlns:a14="http://schemas.microsoft.com/office/drawing/2010/main" w="9525">
+                <a14:hiddenLine xmlns:a14="http://schemas.microsoft.com/office/drawing/2010/main" xmlns="" w="9525">
                   <a:solidFill>
                     <a:srgbClr val="000000"/>
                   </a:solidFill>
@@ -1260,7 +1260,7 @@
             </a:ln>
             <a:extLst>
               <a:ext uri="{91240B29-F687-4f45-9708-019B960494DF}">
-                <a14:hiddenLine xmlns="" xmlns:a14="http://schemas.microsoft.com/office/drawing/2010/main" w="9525">
+                <a14:hiddenLine xmlns:a14="http://schemas.microsoft.com/office/drawing/2010/main" xmlns="" w="9525">
                   <a:solidFill>
                     <a:srgbClr val="000000"/>
                   </a:solidFill>
@@ -1322,7 +1322,7 @@
             </a:ln>
             <a:extLst>
               <a:ext uri="{91240B29-F687-4f45-9708-019B960494DF}">
-                <a14:hiddenLine xmlns="" xmlns:a14="http://schemas.microsoft.com/office/drawing/2010/main" w="9525">
+                <a14:hiddenLine xmlns:a14="http://schemas.microsoft.com/office/drawing/2010/main" xmlns="" w="9525">
                   <a:solidFill>
                     <a:srgbClr val="000000"/>
                   </a:solidFill>
@@ -1384,7 +1384,7 @@
             </a:ln>
             <a:extLst>
               <a:ext uri="{91240B29-F687-4f45-9708-019B960494DF}">
-                <a14:hiddenLine xmlns="" xmlns:a14="http://schemas.microsoft.com/office/drawing/2010/main" w="9525">
+                <a14:hiddenLine xmlns:a14="http://schemas.microsoft.com/office/drawing/2010/main" xmlns="" w="9525">
                   <a:solidFill>
                     <a:srgbClr val="000000"/>
                   </a:solidFill>
@@ -1474,7 +1474,7 @@
             </a:ln>
             <a:extLst>
               <a:ext uri="{91240B29-F687-4f45-9708-019B960494DF}">
-                <a14:hiddenLine xmlns="" xmlns:a14="http://schemas.microsoft.com/office/drawing/2010/main" w="9525">
+                <a14:hiddenLine xmlns:a14="http://schemas.microsoft.com/office/drawing/2010/main" xmlns="" w="9525">
                   <a:solidFill>
                     <a:srgbClr val="000000"/>
                   </a:solidFill>
@@ -1536,7 +1536,7 @@
             </a:ln>
             <a:extLst>
               <a:ext uri="{91240B29-F687-4f45-9708-019B960494DF}">
-                <a14:hiddenLine xmlns="" xmlns:a14="http://schemas.microsoft.com/office/drawing/2010/main" w="9525">
+                <a14:hiddenLine xmlns:a14="http://schemas.microsoft.com/office/drawing/2010/main" xmlns="" w="9525">
                   <a:solidFill>
                     <a:srgbClr val="000000"/>
                   </a:solidFill>
@@ -1598,7 +1598,7 @@
             </a:ln>
             <a:extLst>
               <a:ext uri="{91240B29-F687-4f45-9708-019B960494DF}">
-                <a14:hiddenLine xmlns="" xmlns:a14="http://schemas.microsoft.com/office/drawing/2010/main" w="9525">
+                <a14:hiddenLine xmlns:a14="http://schemas.microsoft.com/office/drawing/2010/main" xmlns="" w="9525">
                   <a:solidFill>
                     <a:srgbClr val="000000"/>
                   </a:solidFill>
@@ -1688,7 +1688,7 @@
             </a:ln>
             <a:extLst>
               <a:ext uri="{91240B29-F687-4f45-9708-019B960494DF}">
-                <a14:hiddenLine xmlns="" xmlns:a14="http://schemas.microsoft.com/office/drawing/2010/main" w="9525">
+                <a14:hiddenLine xmlns:a14="http://schemas.microsoft.com/office/drawing/2010/main" xmlns="" w="9525">
                   <a:solidFill>
                     <a:srgbClr val="000000"/>
                   </a:solidFill>
@@ -1778,7 +1778,7 @@
             </a:ln>
             <a:extLst>
               <a:ext uri="{91240B29-F687-4f45-9708-019B960494DF}">
-                <a14:hiddenLine xmlns="" xmlns:a14="http://schemas.microsoft.com/office/drawing/2010/main" w="9525">
+                <a14:hiddenLine xmlns:a14="http://schemas.microsoft.com/office/drawing/2010/main" xmlns="" w="9525">
                   <a:solidFill>
                     <a:srgbClr val="000000"/>
                   </a:solidFill>
@@ -1840,7 +1840,7 @@
             </a:ln>
             <a:extLst>
               <a:ext uri="{91240B29-F687-4f45-9708-019B960494DF}">
-                <a14:hiddenLine xmlns="" xmlns:a14="http://schemas.microsoft.com/office/drawing/2010/main" w="9525">
+                <a14:hiddenLine xmlns:a14="http://schemas.microsoft.com/office/drawing/2010/main" xmlns="" w="9525">
                   <a:solidFill>
                     <a:srgbClr val="000000"/>
                   </a:solidFill>
@@ -1950,7 +1950,7 @@
             </a:ln>
             <a:extLst>
               <a:ext uri="{91240B29-F687-4f45-9708-019B960494DF}">
-                <a14:hiddenLine xmlns="" xmlns:a14="http://schemas.microsoft.com/office/drawing/2010/main" w="9525">
+                <a14:hiddenLine xmlns:a14="http://schemas.microsoft.com/office/drawing/2010/main" xmlns="" w="9525">
                   <a:solidFill>
                     <a:srgbClr val="000000"/>
                   </a:solidFill>
@@ -2012,7 +2012,7 @@
             </a:ln>
             <a:extLst>
               <a:ext uri="{91240B29-F687-4f45-9708-019B960494DF}">
-                <a14:hiddenLine xmlns="" xmlns:a14="http://schemas.microsoft.com/office/drawing/2010/main" w="9525">
+                <a14:hiddenLine xmlns:a14="http://schemas.microsoft.com/office/drawing/2010/main" xmlns="" w="9525">
                   <a:solidFill>
                     <a:srgbClr val="000000"/>
                   </a:solidFill>
@@ -2102,7 +2102,7 @@
             </a:ln>
             <a:extLst>
               <a:ext uri="{91240B29-F687-4f45-9708-019B960494DF}">
-                <a14:hiddenLine xmlns="" xmlns:a14="http://schemas.microsoft.com/office/drawing/2010/main" w="9525">
+                <a14:hiddenLine xmlns:a14="http://schemas.microsoft.com/office/drawing/2010/main" xmlns="" w="9525">
                   <a:solidFill>
                     <a:srgbClr val="000000"/>
                   </a:solidFill>
@@ -2192,7 +2192,7 @@
             </a:ln>
             <a:extLst>
               <a:ext uri="{91240B29-F687-4f45-9708-019B960494DF}">
-                <a14:hiddenLine xmlns="" xmlns:a14="http://schemas.microsoft.com/office/drawing/2010/main" w="9525">
+                <a14:hiddenLine xmlns:a14="http://schemas.microsoft.com/office/drawing/2010/main" xmlns="" w="9525">
                   <a:solidFill>
                     <a:srgbClr val="000000"/>
                   </a:solidFill>
@@ -2254,7 +2254,7 @@
             </a:ln>
             <a:extLst>
               <a:ext uri="{91240B29-F687-4f45-9708-019B960494DF}">
-                <a14:hiddenLine xmlns="" xmlns:a14="http://schemas.microsoft.com/office/drawing/2010/main" w="9525">
+                <a14:hiddenLine xmlns:a14="http://schemas.microsoft.com/office/drawing/2010/main" xmlns="" w="9525">
                   <a:solidFill>
                     <a:srgbClr val="000000"/>
                   </a:solidFill>
@@ -2344,7 +2344,7 @@
             </a:ln>
             <a:extLst>
               <a:ext uri="{91240B29-F687-4f45-9708-019B960494DF}">
-                <a14:hiddenLine xmlns="" xmlns:a14="http://schemas.microsoft.com/office/drawing/2010/main" w="9525">
+                <a14:hiddenLine xmlns:a14="http://schemas.microsoft.com/office/drawing/2010/main" xmlns="" w="9525">
                   <a:solidFill>
                     <a:srgbClr val="000000"/>
                   </a:solidFill>
@@ -2434,7 +2434,7 @@
             </a:ln>
             <a:extLst>
               <a:ext uri="{91240B29-F687-4f45-9708-019B960494DF}">
-                <a14:hiddenLine xmlns="" xmlns:a14="http://schemas.microsoft.com/office/drawing/2010/main" w="9525">
+                <a14:hiddenLine xmlns:a14="http://schemas.microsoft.com/office/drawing/2010/main" xmlns="" w="9525">
                   <a:solidFill>
                     <a:srgbClr val="000000"/>
                   </a:solidFill>
@@ -2490,7 +2490,7 @@
             </a:ln>
             <a:extLst>
               <a:ext uri="{91240B29-F687-4f45-9708-019B960494DF}">
-                <a14:hiddenLine xmlns="" xmlns:a14="http://schemas.microsoft.com/office/drawing/2010/main" w="9525">
+                <a14:hiddenLine xmlns:a14="http://schemas.microsoft.com/office/drawing/2010/main" xmlns="" w="9525">
                   <a:solidFill>
                     <a:srgbClr val="000000"/>
                   </a:solidFill>
@@ -2580,7 +2580,7 @@
             </a:ln>
             <a:extLst>
               <a:ext uri="{91240B29-F687-4f45-9708-019B960494DF}">
-                <a14:hiddenLine xmlns="" xmlns:a14="http://schemas.microsoft.com/office/drawing/2010/main" w="9525">
+                <a14:hiddenLine xmlns:a14="http://schemas.microsoft.com/office/drawing/2010/main" xmlns="" w="9525">
                   <a:solidFill>
                     <a:srgbClr val="000000"/>
                   </a:solidFill>
@@ -2636,7 +2636,7 @@
             </a:ln>
             <a:extLst>
               <a:ext uri="{91240B29-F687-4f45-9708-019B960494DF}">
-                <a14:hiddenLine xmlns="" xmlns:a14="http://schemas.microsoft.com/office/drawing/2010/main" w="9525">
+                <a14:hiddenLine xmlns:a14="http://schemas.microsoft.com/office/drawing/2010/main" xmlns="" w="9525">
                   <a:solidFill>
                     <a:srgbClr val="000000"/>
                   </a:solidFill>
@@ -2726,7 +2726,7 @@
             </a:ln>
             <a:extLst>
               <a:ext uri="{91240B29-F687-4f45-9708-019B960494DF}">
-                <a14:hiddenLine xmlns="" xmlns:a14="http://schemas.microsoft.com/office/drawing/2010/main" w="9525">
+                <a14:hiddenLine xmlns:a14="http://schemas.microsoft.com/office/drawing/2010/main" xmlns="" w="9525">
                   <a:solidFill>
                     <a:srgbClr val="000000"/>
                   </a:solidFill>
@@ -2794,7 +2794,7 @@
             </a:ln>
             <a:extLst>
               <a:ext uri="{91240B29-F687-4f45-9708-019B960494DF}">
-                <a14:hiddenLine xmlns="" xmlns:a14="http://schemas.microsoft.com/office/drawing/2010/main" w="9525">
+                <a14:hiddenLine xmlns:a14="http://schemas.microsoft.com/office/drawing/2010/main" xmlns="" w="9525">
                   <a:solidFill>
                     <a:srgbClr val="000000"/>
                   </a:solidFill>
@@ -2884,7 +2884,7 @@
             </a:ln>
             <a:extLst>
               <a:ext uri="{91240B29-F687-4f45-9708-019B960494DF}">
-                <a14:hiddenLine xmlns="" xmlns:a14="http://schemas.microsoft.com/office/drawing/2010/main" w="9525">
+                <a14:hiddenLine xmlns:a14="http://schemas.microsoft.com/office/drawing/2010/main" xmlns="" w="9525">
                   <a:solidFill>
                     <a:srgbClr val="000000"/>
                   </a:solidFill>
@@ -2952,7 +2952,7 @@
             </a:ln>
             <a:extLst>
               <a:ext uri="{91240B29-F687-4f45-9708-019B960494DF}">
-                <a14:hiddenLine xmlns="" xmlns:a14="http://schemas.microsoft.com/office/drawing/2010/main" w="9525">
+                <a14:hiddenLine xmlns:a14="http://schemas.microsoft.com/office/drawing/2010/main" xmlns="" w="9525">
                   <a:solidFill>
                     <a:srgbClr val="000000"/>
                   </a:solidFill>
@@ -3042,7 +3042,7 @@
             </a:ln>
             <a:extLst>
               <a:ext uri="{91240B29-F687-4f45-9708-019B960494DF}">
-                <a14:hiddenLine xmlns="" xmlns:a14="http://schemas.microsoft.com/office/drawing/2010/main" w="9525">
+                <a14:hiddenLine xmlns:a14="http://schemas.microsoft.com/office/drawing/2010/main" xmlns="" w="9525">
                   <a:solidFill>
                     <a:srgbClr val="000000"/>
                   </a:solidFill>
@@ -3076,7 +3076,7 @@
             </a:ln>
             <a:extLst>
               <a:ext uri="{91240B29-F687-4f45-9708-019B960494DF}">
-                <a14:hiddenLine xmlns="" xmlns:a14="http://schemas.microsoft.com/office/drawing/2010/main" w="9525">
+                <a14:hiddenLine xmlns:a14="http://schemas.microsoft.com/office/drawing/2010/main" xmlns="" w="9525">
                   <a:solidFill>
                     <a:srgbClr val="000000"/>
                   </a:solidFill>
@@ -3166,7 +3166,7 @@
             </a:ln>
             <a:extLst>
               <a:ext uri="{91240B29-F687-4f45-9708-019B960494DF}">
-                <a14:hiddenLine xmlns="" xmlns:a14="http://schemas.microsoft.com/office/drawing/2010/main" w="9525">
+                <a14:hiddenLine xmlns:a14="http://schemas.microsoft.com/office/drawing/2010/main" xmlns="" w="9525">
                   <a:solidFill>
                     <a:srgbClr val="000000"/>
                   </a:solidFill>
@@ -3228,7 +3228,7 @@
             </a:ln>
             <a:extLst>
               <a:ext uri="{91240B29-F687-4f45-9708-019B960494DF}">
-                <a14:hiddenLine xmlns="" xmlns:a14="http://schemas.microsoft.com/office/drawing/2010/main" w="9525">
+                <a14:hiddenLine xmlns:a14="http://schemas.microsoft.com/office/drawing/2010/main" xmlns="" w="9525">
                   <a:solidFill>
                     <a:srgbClr val="000000"/>
                   </a:solidFill>
@@ -3290,7 +3290,7 @@
             </a:ln>
             <a:extLst>
               <a:ext uri="{91240B29-F687-4f45-9708-019B960494DF}">
-                <a14:hiddenLine xmlns="" xmlns:a14="http://schemas.microsoft.com/office/drawing/2010/main" w="9525">
+                <a14:hiddenLine xmlns:a14="http://schemas.microsoft.com/office/drawing/2010/main" xmlns="" w="9525">
                   <a:solidFill>
                     <a:srgbClr val="000000"/>
                   </a:solidFill>
@@ -3380,7 +3380,7 @@
             </a:ln>
             <a:extLst>
               <a:ext uri="{91240B29-F687-4f45-9708-019B960494DF}">
-                <a14:hiddenLine xmlns="" xmlns:a14="http://schemas.microsoft.com/office/drawing/2010/main" w="9525">
+                <a14:hiddenLine xmlns:a14="http://schemas.microsoft.com/office/drawing/2010/main" xmlns="" w="9525">
                   <a:solidFill>
                     <a:srgbClr val="000000"/>
                   </a:solidFill>
@@ -3448,7 +3448,7 @@
             </a:ln>
             <a:extLst>
               <a:ext uri="{91240B29-F687-4f45-9708-019B960494DF}">
-                <a14:hiddenLine xmlns="" xmlns:a14="http://schemas.microsoft.com/office/drawing/2010/main" w="9525">
+                <a14:hiddenLine xmlns:a14="http://schemas.microsoft.com/office/drawing/2010/main" xmlns="" w="9525">
                   <a:solidFill>
                     <a:srgbClr val="000000"/>
                   </a:solidFill>
@@ -3510,7 +3510,7 @@
             </a:ln>
             <a:extLst>
               <a:ext uri="{91240B29-F687-4f45-9708-019B960494DF}">
-                <a14:hiddenLine xmlns="" xmlns:a14="http://schemas.microsoft.com/office/drawing/2010/main" w="9525">
+                <a14:hiddenLine xmlns:a14="http://schemas.microsoft.com/office/drawing/2010/main" xmlns="" w="9525">
                   <a:solidFill>
                     <a:srgbClr val="000000"/>
                   </a:solidFill>
@@ -3600,7 +3600,7 @@
             </a:ln>
             <a:extLst>
               <a:ext uri="{91240B29-F687-4f45-9708-019B960494DF}">
-                <a14:hiddenLine xmlns="" xmlns:a14="http://schemas.microsoft.com/office/drawing/2010/main" w="9525">
+                <a14:hiddenLine xmlns:a14="http://schemas.microsoft.com/office/drawing/2010/main" xmlns="" w="9525">
                   <a:solidFill>
                     <a:srgbClr val="000000"/>
                   </a:solidFill>
@@ -3662,7 +3662,7 @@
             </a:ln>
             <a:extLst>
               <a:ext uri="{91240B29-F687-4f45-9708-019B960494DF}">
-                <a14:hiddenLine xmlns="" xmlns:a14="http://schemas.microsoft.com/office/drawing/2010/main" w="9525">
+                <a14:hiddenLine xmlns:a14="http://schemas.microsoft.com/office/drawing/2010/main" xmlns="" w="9525">
                   <a:solidFill>
                     <a:srgbClr val="000000"/>
                   </a:solidFill>
@@ -3752,7 +3752,7 @@
             </a:ln>
             <a:extLst>
               <a:ext uri="{91240B29-F687-4f45-9708-019B960494DF}">
-                <a14:hiddenLine xmlns="" xmlns:a14="http://schemas.microsoft.com/office/drawing/2010/main" w="9525">
+                <a14:hiddenLine xmlns:a14="http://schemas.microsoft.com/office/drawing/2010/main" xmlns="" w="9525">
                   <a:solidFill>
                     <a:srgbClr val="000000"/>
                   </a:solidFill>
@@ -3814,7 +3814,7 @@
             </a:ln>
             <a:extLst>
               <a:ext uri="{91240B29-F687-4f45-9708-019B960494DF}">
-                <a14:hiddenLine xmlns="" xmlns:a14="http://schemas.microsoft.com/office/drawing/2010/main" w="9525">
+                <a14:hiddenLine xmlns:a14="http://schemas.microsoft.com/office/drawing/2010/main" xmlns="" w="9525">
                   <a:solidFill>
                     <a:srgbClr val="000000"/>
                   </a:solidFill>
@@ -3904,7 +3904,7 @@
             </a:ln>
             <a:extLst>
               <a:ext uri="{91240B29-F687-4f45-9708-019B960494DF}">
-                <a14:hiddenLine xmlns="" xmlns:a14="http://schemas.microsoft.com/office/drawing/2010/main" w="9525">
+                <a14:hiddenLine xmlns:a14="http://schemas.microsoft.com/office/drawing/2010/main" xmlns="" w="9525">
                   <a:solidFill>
                     <a:srgbClr val="000000"/>
                   </a:solidFill>
@@ -3938,7 +3938,7 @@
             </a:ln>
             <a:extLst>
               <a:ext uri="{91240B29-F687-4f45-9708-019B960494DF}">
-                <a14:hiddenLine xmlns="" xmlns:a14="http://schemas.microsoft.com/office/drawing/2010/main" w="9525">
+                <a14:hiddenLine xmlns:a14="http://schemas.microsoft.com/office/drawing/2010/main" xmlns="" w="9525">
                   <a:solidFill>
                     <a:srgbClr val="000000"/>
                   </a:solidFill>
@@ -4003,7 +4003,7 @@
             </a:ln>
             <a:extLst>
               <a:ext uri="{91240B29-F687-4f45-9708-019B960494DF}">
-                <a14:hiddenLine xmlns="" xmlns:a14="http://schemas.microsoft.com/office/drawing/2010/main" w="9525">
+                <a14:hiddenLine xmlns:a14="http://schemas.microsoft.com/office/drawing/2010/main" xmlns="" w="9525">
                   <a:solidFill>
                     <a:srgbClr val="000000"/>
                   </a:solidFill>
@@ -4093,7 +4093,7 @@
             </a:ln>
             <a:extLst>
               <a:ext uri="{91240B29-F687-4f45-9708-019B960494DF}">
-                <a14:hiddenLine xmlns="" xmlns:a14="http://schemas.microsoft.com/office/drawing/2010/main" w="9525">
+                <a14:hiddenLine xmlns:a14="http://schemas.microsoft.com/office/drawing/2010/main" xmlns="" w="9525">
                   <a:solidFill>
                     <a:srgbClr val="000000"/>
                   </a:solidFill>
@@ -4155,7 +4155,7 @@
             </a:ln>
             <a:extLst>
               <a:ext uri="{91240B29-F687-4f45-9708-019B960494DF}">
-                <a14:hiddenLine xmlns="" xmlns:a14="http://schemas.microsoft.com/office/drawing/2010/main" w="9525">
+                <a14:hiddenLine xmlns:a14="http://schemas.microsoft.com/office/drawing/2010/main" xmlns="" w="9525">
                   <a:solidFill>
                     <a:srgbClr val="000000"/>
                   </a:solidFill>
@@ -4245,7 +4245,7 @@
             </a:ln>
             <a:extLst>
               <a:ext uri="{91240B29-F687-4f45-9708-019B960494DF}">
-                <a14:hiddenLine xmlns="" xmlns:a14="http://schemas.microsoft.com/office/drawing/2010/main" w="9525">
+                <a14:hiddenLine xmlns:a14="http://schemas.microsoft.com/office/drawing/2010/main" xmlns="" w="9525">
                   <a:solidFill>
                     <a:srgbClr val="000000"/>
                   </a:solidFill>
@@ -4335,7 +4335,7 @@
             </a:ln>
             <a:extLst>
               <a:ext uri="{91240B29-F687-4f45-9708-019B960494DF}">
-                <a14:hiddenLine xmlns="" xmlns:a14="http://schemas.microsoft.com/office/drawing/2010/main" w="9525">
+                <a14:hiddenLine xmlns:a14="http://schemas.microsoft.com/office/drawing/2010/main" xmlns="" w="9525">
                   <a:solidFill>
                     <a:srgbClr val="000000"/>
                   </a:solidFill>
@@ -4400,7 +4400,7 @@
             </a:ln>
             <a:extLst>
               <a:ext uri="{91240B29-F687-4f45-9708-019B960494DF}">
-                <a14:hiddenLine xmlns="" xmlns:a14="http://schemas.microsoft.com/office/drawing/2010/main" w="9525">
+                <a14:hiddenLine xmlns:a14="http://schemas.microsoft.com/office/drawing/2010/main" xmlns="" w="9525">
                   <a:solidFill>
                     <a:srgbClr val="000000"/>
                   </a:solidFill>
@@ -4462,7 +4462,7 @@
             </a:ln>
             <a:extLst>
               <a:ext uri="{91240B29-F687-4f45-9708-019B960494DF}">
-                <a14:hiddenLine xmlns="" xmlns:a14="http://schemas.microsoft.com/office/drawing/2010/main" w="9525">
+                <a14:hiddenLine xmlns:a14="http://schemas.microsoft.com/office/drawing/2010/main" xmlns="" w="9525">
                   <a:solidFill>
                     <a:srgbClr val="000000"/>
                   </a:solidFill>
@@ -4552,7 +4552,7 @@
             </a:ln>
             <a:extLst>
               <a:ext uri="{91240B29-F687-4f45-9708-019B960494DF}">
-                <a14:hiddenLine xmlns="" xmlns:a14="http://schemas.microsoft.com/office/drawing/2010/main" w="9525">
+                <a14:hiddenLine xmlns:a14="http://schemas.microsoft.com/office/drawing/2010/main" xmlns="" w="9525">
                   <a:solidFill>
                     <a:srgbClr val="000000"/>
                   </a:solidFill>
@@ -4642,7 +4642,7 @@
             </a:ln>
             <a:extLst>
               <a:ext uri="{91240B29-F687-4f45-9708-019B960494DF}">
-                <a14:hiddenLine xmlns="" xmlns:a14="http://schemas.microsoft.com/office/drawing/2010/main" w="9525">
+                <a14:hiddenLine xmlns:a14="http://schemas.microsoft.com/office/drawing/2010/main" xmlns="" w="9525">
                   <a:solidFill>
                     <a:srgbClr val="000000"/>
                   </a:solidFill>
@@ -4704,7 +4704,7 @@
             </a:ln>
             <a:extLst>
               <a:ext uri="{91240B29-F687-4f45-9708-019B960494DF}">
-                <a14:hiddenLine xmlns="" xmlns:a14="http://schemas.microsoft.com/office/drawing/2010/main" w="9525">
+                <a14:hiddenLine xmlns:a14="http://schemas.microsoft.com/office/drawing/2010/main" xmlns="" w="9525">
                   <a:solidFill>
                     <a:srgbClr val="000000"/>
                   </a:solidFill>
@@ -4824,7 +4824,7 @@
             </a:ln>
             <a:extLst>
               <a:ext uri="{91240B29-F687-4f45-9708-019B960494DF}">
-                <a14:hiddenLine xmlns="" xmlns:a14="http://schemas.microsoft.com/office/drawing/2010/main" w="9525">
+                <a14:hiddenLine xmlns:a14="http://schemas.microsoft.com/office/drawing/2010/main" xmlns="" w="9525">
                   <a:solidFill>
                     <a:srgbClr val="000000"/>
                   </a:solidFill>
@@ -4892,7 +4892,7 @@
             </a:ln>
             <a:extLst>
               <a:ext uri="{91240B29-F687-4f45-9708-019B960494DF}">
-                <a14:hiddenLine xmlns="" xmlns:a14="http://schemas.microsoft.com/office/drawing/2010/main" w="9525">
+                <a14:hiddenLine xmlns:a14="http://schemas.microsoft.com/office/drawing/2010/main" xmlns="" w="9525">
                   <a:solidFill>
                     <a:srgbClr val="000000"/>
                   </a:solidFill>
@@ -4982,7 +4982,7 @@
             </a:ln>
             <a:extLst>
               <a:ext uri="{91240B29-F687-4f45-9708-019B960494DF}">
-                <a14:hiddenLine xmlns="" xmlns:a14="http://schemas.microsoft.com/office/drawing/2010/main" w="9525">
+                <a14:hiddenLine xmlns:a14="http://schemas.microsoft.com/office/drawing/2010/main" xmlns="" w="9525">
                   <a:solidFill>
                     <a:srgbClr val="000000"/>
                   </a:solidFill>
@@ -5122,7 +5122,7 @@
           <a:p>
             <a:fld id="{AFFA8E18-38E7-4AF1-A6D2-47C002B4AF53}" type="datetimeFigureOut">
               <a:rPr lang="en-US" smtClean="0"/>
-              <a:t>12/2/20</a:t>
+              <a:t>12/2/2020</a:t>
             </a:fld>
             <a:endParaRPr lang="en-US"/>
           </a:p>
@@ -5389,7 +5389,7 @@
           <a:p>
             <a:fld id="{AFFA8E18-38E7-4AF1-A6D2-47C002B4AF53}" type="datetimeFigureOut">
               <a:rPr lang="en-US" smtClean="0"/>
-              <a:t>12/2/20</a:t>
+              <a:t>12/2/2020</a:t>
             </a:fld>
             <a:endParaRPr lang="en-US"/>
           </a:p>
@@ -5585,7 +5585,7 @@
           <a:p>
             <a:fld id="{AFFA8E18-38E7-4AF1-A6D2-47C002B4AF53}" type="datetimeFigureOut">
               <a:rPr lang="en-US" smtClean="0"/>
-              <a:t>12/2/20</a:t>
+              <a:t>12/2/2020</a:t>
             </a:fld>
             <a:endParaRPr lang="en-US"/>
           </a:p>
@@ -5848,7 +5848,7 @@
           <a:p>
             <a:fld id="{AFFA8E18-38E7-4AF1-A6D2-47C002B4AF53}" type="datetimeFigureOut">
               <a:rPr lang="en-US" smtClean="0"/>
-              <a:t>12/2/20</a:t>
+              <a:t>12/2/2020</a:t>
             </a:fld>
             <a:endParaRPr lang="en-US"/>
           </a:p>
@@ -6282,7 +6282,7 @@
           <a:p>
             <a:fld id="{AFFA8E18-38E7-4AF1-A6D2-47C002B4AF53}" type="datetimeFigureOut">
               <a:rPr lang="en-US" smtClean="0"/>
-              <a:t>12/2/20</a:t>
+              <a:t>12/2/2020</a:t>
             </a:fld>
             <a:endParaRPr lang="en-US"/>
           </a:p>
@@ -6828,7 +6828,7 @@
           <a:p>
             <a:fld id="{AFFA8E18-38E7-4AF1-A6D2-47C002B4AF53}" type="datetimeFigureOut">
               <a:rPr lang="en-US" smtClean="0"/>
-              <a:t>12/2/20</a:t>
+              <a:t>12/2/2020</a:t>
             </a:fld>
             <a:endParaRPr lang="en-US"/>
           </a:p>
@@ -7548,7 +7548,7 @@
           <a:p>
             <a:fld id="{AFFA8E18-38E7-4AF1-A6D2-47C002B4AF53}" type="datetimeFigureOut">
               <a:rPr lang="en-US" smtClean="0"/>
-              <a:t>12/2/20</a:t>
+              <a:t>12/2/2020</a:t>
             </a:fld>
             <a:endParaRPr lang="en-US"/>
           </a:p>
@@ -7718,7 +7718,7 @@
           <a:p>
             <a:fld id="{AFFA8E18-38E7-4AF1-A6D2-47C002B4AF53}" type="datetimeFigureOut">
               <a:rPr lang="en-US" smtClean="0"/>
-              <a:t>12/2/20</a:t>
+              <a:t>12/2/2020</a:t>
             </a:fld>
             <a:endParaRPr lang="en-US"/>
           </a:p>
@@ -7898,7 +7898,7 @@
           <a:p>
             <a:fld id="{AFFA8E18-38E7-4AF1-A6D2-47C002B4AF53}" type="datetimeFigureOut">
               <a:rPr lang="en-US" smtClean="0"/>
-              <a:t>12/2/20</a:t>
+              <a:t>12/2/2020</a:t>
             </a:fld>
             <a:endParaRPr lang="en-US"/>
           </a:p>
@@ -8068,7 +8068,7 @@
           <a:p>
             <a:fld id="{AFFA8E18-38E7-4AF1-A6D2-47C002B4AF53}" type="datetimeFigureOut">
               <a:rPr lang="en-US" smtClean="0"/>
-              <a:t>12/2/20</a:t>
+              <a:t>12/2/2020</a:t>
             </a:fld>
             <a:endParaRPr lang="en-US"/>
           </a:p>
@@ -8318,7 +8318,7 @@
           <a:p>
             <a:fld id="{AFFA8E18-38E7-4AF1-A6D2-47C002B4AF53}" type="datetimeFigureOut">
               <a:rPr lang="en-US" smtClean="0"/>
-              <a:t>12/2/20</a:t>
+              <a:t>12/2/2020</a:t>
             </a:fld>
             <a:endParaRPr lang="en-US"/>
           </a:p>
@@ -8550,7 +8550,7 @@
           <a:p>
             <a:fld id="{AFFA8E18-38E7-4AF1-A6D2-47C002B4AF53}" type="datetimeFigureOut">
               <a:rPr lang="en-US" smtClean="0"/>
-              <a:t>12/2/20</a:t>
+              <a:t>12/2/2020</a:t>
             </a:fld>
             <a:endParaRPr lang="en-US"/>
           </a:p>
@@ -8931,7 +8931,7 @@
           <a:p>
             <a:fld id="{AFFA8E18-38E7-4AF1-A6D2-47C002B4AF53}" type="datetimeFigureOut">
               <a:rPr lang="en-US" smtClean="0"/>
-              <a:t>12/2/20</a:t>
+              <a:t>12/2/2020</a:t>
             </a:fld>
             <a:endParaRPr lang="en-US"/>
           </a:p>
@@ -9049,7 +9049,7 @@
           <a:p>
             <a:fld id="{AFFA8E18-38E7-4AF1-A6D2-47C002B4AF53}" type="datetimeFigureOut">
               <a:rPr lang="en-US" smtClean="0"/>
-              <a:t>12/2/20</a:t>
+              <a:t>12/2/2020</a:t>
             </a:fld>
             <a:endParaRPr lang="en-US"/>
           </a:p>
@@ -9144,7 +9144,7 @@
           <a:p>
             <a:fld id="{AFFA8E18-38E7-4AF1-A6D2-47C002B4AF53}" type="datetimeFigureOut">
               <a:rPr lang="en-US" smtClean="0"/>
-              <a:t>12/2/20</a:t>
+              <a:t>12/2/2020</a:t>
             </a:fld>
             <a:endParaRPr lang="en-US"/>
           </a:p>
@@ -9393,7 +9393,7 @@
           <a:p>
             <a:fld id="{AFFA8E18-38E7-4AF1-A6D2-47C002B4AF53}" type="datetimeFigureOut">
               <a:rPr lang="en-US" smtClean="0"/>
-              <a:t>12/2/20</a:t>
+              <a:t>12/2/2020</a:t>
             </a:fld>
             <a:endParaRPr lang="en-US"/>
           </a:p>
@@ -9673,7 +9673,7 @@
           <a:p>
             <a:fld id="{AFFA8E18-38E7-4AF1-A6D2-47C002B4AF53}" type="datetimeFigureOut">
               <a:rPr lang="en-US" smtClean="0"/>
-              <a:t>12/2/20</a:t>
+              <a:t>12/2/2020</a:t>
             </a:fld>
             <a:endParaRPr lang="en-US"/>
           </a:p>
@@ -9789,7 +9789,7 @@
           <a:noFill/>
           <a:extLst>
             <a:ext uri="{909E8E84-426E-40dd-AFC4-6F175D3DCCD1}">
-              <a14:hiddenFill xmlns="" xmlns:a14="http://schemas.microsoft.com/office/drawing/2010/main">
+              <a14:hiddenFill xmlns:a14="http://schemas.microsoft.com/office/drawing/2010/main" xmlns="">
                 <a:solidFill>
                   <a:srgbClr val="FFFFFF"/>
                 </a:solidFill>
@@ -9863,7 +9863,7 @@
               </a:ln>
               <a:extLst>
                 <a:ext uri="{91240B29-F687-4f45-9708-019B960494DF}">
-                  <a14:hiddenLine xmlns="" xmlns:a14="http://schemas.microsoft.com/office/drawing/2010/main" w="9525">
+                  <a14:hiddenLine xmlns:a14="http://schemas.microsoft.com/office/drawing/2010/main" xmlns="" w="9525">
                     <a:solidFill>
                       <a:srgbClr val="000000"/>
                     </a:solidFill>
@@ -9953,7 +9953,7 @@
               </a:ln>
               <a:extLst>
                 <a:ext uri="{91240B29-F687-4f45-9708-019B960494DF}">
-                  <a14:hiddenLine xmlns="" xmlns:a14="http://schemas.microsoft.com/office/drawing/2010/main" w="9525">
+                  <a14:hiddenLine xmlns:a14="http://schemas.microsoft.com/office/drawing/2010/main" xmlns="" w="9525">
                     <a:solidFill>
                       <a:srgbClr val="000000"/>
                     </a:solidFill>
@@ -10043,7 +10043,7 @@
               </a:ln>
               <a:extLst>
                 <a:ext uri="{91240B29-F687-4f45-9708-019B960494DF}">
-                  <a14:hiddenLine xmlns="" xmlns:a14="http://schemas.microsoft.com/office/drawing/2010/main" w="9525">
+                  <a14:hiddenLine xmlns:a14="http://schemas.microsoft.com/office/drawing/2010/main" xmlns="" w="9525">
                     <a:solidFill>
                       <a:srgbClr val="000000"/>
                     </a:solidFill>
@@ -10105,7 +10105,7 @@
               </a:ln>
               <a:extLst>
                 <a:ext uri="{91240B29-F687-4f45-9708-019B960494DF}">
-                  <a14:hiddenLine xmlns="" xmlns:a14="http://schemas.microsoft.com/office/drawing/2010/main" w="9525">
+                  <a14:hiddenLine xmlns:a14="http://schemas.microsoft.com/office/drawing/2010/main" xmlns="" w="9525">
                     <a:solidFill>
                       <a:srgbClr val="000000"/>
                     </a:solidFill>
@@ -10195,7 +10195,7 @@
               </a:ln>
               <a:extLst>
                 <a:ext uri="{91240B29-F687-4f45-9708-019B960494DF}">
-                  <a14:hiddenLine xmlns="" xmlns:a14="http://schemas.microsoft.com/office/drawing/2010/main" w="9525">
+                  <a14:hiddenLine xmlns:a14="http://schemas.microsoft.com/office/drawing/2010/main" xmlns="" w="9525">
                     <a:solidFill>
                       <a:srgbClr val="000000"/>
                     </a:solidFill>
@@ -10257,7 +10257,7 @@
               </a:ln>
               <a:extLst>
                 <a:ext uri="{91240B29-F687-4f45-9708-019B960494DF}">
-                  <a14:hiddenLine xmlns="" xmlns:a14="http://schemas.microsoft.com/office/drawing/2010/main" w="9525">
+                  <a14:hiddenLine xmlns:a14="http://schemas.microsoft.com/office/drawing/2010/main" xmlns="" w="9525">
                     <a:solidFill>
                       <a:srgbClr val="000000"/>
                     </a:solidFill>
@@ -10319,7 +10319,7 @@
               </a:ln>
               <a:extLst>
                 <a:ext uri="{91240B29-F687-4f45-9708-019B960494DF}">
-                  <a14:hiddenLine xmlns="" xmlns:a14="http://schemas.microsoft.com/office/drawing/2010/main" w="9525">
+                  <a14:hiddenLine xmlns:a14="http://schemas.microsoft.com/office/drawing/2010/main" xmlns="" w="9525">
                     <a:solidFill>
                       <a:srgbClr val="000000"/>
                     </a:solidFill>
@@ -10409,7 +10409,7 @@
               </a:ln>
               <a:extLst>
                 <a:ext uri="{91240B29-F687-4f45-9708-019B960494DF}">
-                  <a14:hiddenLine xmlns="" xmlns:a14="http://schemas.microsoft.com/office/drawing/2010/main" w="9525">
+                  <a14:hiddenLine xmlns:a14="http://schemas.microsoft.com/office/drawing/2010/main" xmlns="" w="9525">
                     <a:solidFill>
                       <a:srgbClr val="000000"/>
                     </a:solidFill>
@@ -10499,7 +10499,7 @@
               </a:ln>
               <a:extLst>
                 <a:ext uri="{91240B29-F687-4f45-9708-019B960494DF}">
-                  <a14:hiddenLine xmlns="" xmlns:a14="http://schemas.microsoft.com/office/drawing/2010/main" w="9525">
+                  <a14:hiddenLine xmlns:a14="http://schemas.microsoft.com/office/drawing/2010/main" xmlns="" w="9525">
                     <a:solidFill>
                       <a:srgbClr val="000000"/>
                     </a:solidFill>
@@ -10561,7 +10561,7 @@
               </a:ln>
               <a:extLst>
                 <a:ext uri="{91240B29-F687-4f45-9708-019B960494DF}">
-                  <a14:hiddenLine xmlns="" xmlns:a14="http://schemas.microsoft.com/office/drawing/2010/main" w="9525">
+                  <a14:hiddenLine xmlns:a14="http://schemas.microsoft.com/office/drawing/2010/main" xmlns="" w="9525">
                     <a:solidFill>
                       <a:srgbClr val="000000"/>
                     </a:solidFill>
@@ -10671,7 +10671,7 @@
               </a:ln>
               <a:extLst>
                 <a:ext uri="{91240B29-F687-4f45-9708-019B960494DF}">
-                  <a14:hiddenLine xmlns="" xmlns:a14="http://schemas.microsoft.com/office/drawing/2010/main" w="9525">
+                  <a14:hiddenLine xmlns:a14="http://schemas.microsoft.com/office/drawing/2010/main" xmlns="" w="9525">
                     <a:solidFill>
                       <a:srgbClr val="000000"/>
                     </a:solidFill>
@@ -10755,7 +10755,7 @@
               </a:ln>
               <a:extLst>
                 <a:ext uri="{91240B29-F687-4f45-9708-019B960494DF}">
-                  <a14:hiddenLine xmlns="" xmlns:a14="http://schemas.microsoft.com/office/drawing/2010/main" w="9525">
+                  <a14:hiddenLine xmlns:a14="http://schemas.microsoft.com/office/drawing/2010/main" xmlns="" w="9525">
                     <a:solidFill>
                       <a:srgbClr val="000000"/>
                     </a:solidFill>
@@ -10817,7 +10817,7 @@
               </a:ln>
               <a:extLst>
                 <a:ext uri="{91240B29-F687-4f45-9708-019B960494DF}">
-                  <a14:hiddenLine xmlns="" xmlns:a14="http://schemas.microsoft.com/office/drawing/2010/main" w="9525">
+                  <a14:hiddenLine xmlns:a14="http://schemas.microsoft.com/office/drawing/2010/main" xmlns="" w="9525">
                     <a:solidFill>
                       <a:srgbClr val="000000"/>
                     </a:solidFill>
@@ -10879,7 +10879,7 @@
               </a:ln>
               <a:extLst>
                 <a:ext uri="{91240B29-F687-4f45-9708-019B960494DF}">
-                  <a14:hiddenLine xmlns="" xmlns:a14="http://schemas.microsoft.com/office/drawing/2010/main" w="9525">
+                  <a14:hiddenLine xmlns:a14="http://schemas.microsoft.com/office/drawing/2010/main" xmlns="" w="9525">
                     <a:solidFill>
                       <a:srgbClr val="000000"/>
                     </a:solidFill>
@@ -10969,7 +10969,7 @@
               </a:ln>
               <a:extLst>
                 <a:ext uri="{91240B29-F687-4f45-9708-019B960494DF}">
-                  <a14:hiddenLine xmlns="" xmlns:a14="http://schemas.microsoft.com/office/drawing/2010/main" w="9525">
+                  <a14:hiddenLine xmlns:a14="http://schemas.microsoft.com/office/drawing/2010/main" xmlns="" w="9525">
                     <a:solidFill>
                       <a:srgbClr val="000000"/>
                     </a:solidFill>
@@ -11003,7 +11003,7 @@
               </a:ln>
               <a:extLst>
                 <a:ext uri="{91240B29-F687-4f45-9708-019B960494DF}">
-                  <a14:hiddenLine xmlns="" xmlns:a14="http://schemas.microsoft.com/office/drawing/2010/main" w="9525">
+                  <a14:hiddenLine xmlns:a14="http://schemas.microsoft.com/office/drawing/2010/main" xmlns="" w="9525">
                     <a:solidFill>
                       <a:srgbClr val="000000"/>
                     </a:solidFill>
@@ -11068,7 +11068,7 @@
               </a:ln>
               <a:extLst>
                 <a:ext uri="{91240B29-F687-4f45-9708-019B960494DF}">
-                  <a14:hiddenLine xmlns="" xmlns:a14="http://schemas.microsoft.com/office/drawing/2010/main" w="9525">
+                  <a14:hiddenLine xmlns:a14="http://schemas.microsoft.com/office/drawing/2010/main" xmlns="" w="9525">
                     <a:solidFill>
                       <a:srgbClr val="000000"/>
                     </a:solidFill>
@@ -11158,7 +11158,7 @@
               </a:ln>
               <a:extLst>
                 <a:ext uri="{91240B29-F687-4f45-9708-019B960494DF}">
-                  <a14:hiddenLine xmlns="" xmlns:a14="http://schemas.microsoft.com/office/drawing/2010/main" w="9525">
+                  <a14:hiddenLine xmlns:a14="http://schemas.microsoft.com/office/drawing/2010/main" xmlns="" w="9525">
                     <a:solidFill>
                       <a:srgbClr val="000000"/>
                     </a:solidFill>
@@ -11220,7 +11220,7 @@
               </a:ln>
               <a:extLst>
                 <a:ext uri="{91240B29-F687-4f45-9708-019B960494DF}">
-                  <a14:hiddenLine xmlns="" xmlns:a14="http://schemas.microsoft.com/office/drawing/2010/main" w="9525">
+                  <a14:hiddenLine xmlns:a14="http://schemas.microsoft.com/office/drawing/2010/main" xmlns="" w="9525">
                     <a:solidFill>
                       <a:srgbClr val="000000"/>
                     </a:solidFill>
@@ -11310,7 +11310,7 @@
               </a:ln>
               <a:extLst>
                 <a:ext uri="{91240B29-F687-4f45-9708-019B960494DF}">
-                  <a14:hiddenLine xmlns="" xmlns:a14="http://schemas.microsoft.com/office/drawing/2010/main" w="9525">
+                  <a14:hiddenLine xmlns:a14="http://schemas.microsoft.com/office/drawing/2010/main" xmlns="" w="9525">
                     <a:solidFill>
                       <a:srgbClr val="000000"/>
                     </a:solidFill>
@@ -11375,7 +11375,7 @@
               </a:ln>
               <a:extLst>
                 <a:ext uri="{91240B29-F687-4f45-9708-019B960494DF}">
-                  <a14:hiddenLine xmlns="" xmlns:a14="http://schemas.microsoft.com/office/drawing/2010/main" w="9525">
+                  <a14:hiddenLine xmlns:a14="http://schemas.microsoft.com/office/drawing/2010/main" xmlns="" w="9525">
                     <a:solidFill>
                       <a:srgbClr val="000000"/>
                     </a:solidFill>
@@ -11437,7 +11437,7 @@
               </a:ln>
               <a:extLst>
                 <a:ext uri="{91240B29-F687-4f45-9708-019B960494DF}">
-                  <a14:hiddenLine xmlns="" xmlns:a14="http://schemas.microsoft.com/office/drawing/2010/main" w="9525">
+                  <a14:hiddenLine xmlns:a14="http://schemas.microsoft.com/office/drawing/2010/main" xmlns="" w="9525">
                     <a:solidFill>
                       <a:srgbClr val="000000"/>
                     </a:solidFill>
@@ -11527,7 +11527,7 @@
               </a:ln>
               <a:extLst>
                 <a:ext uri="{91240B29-F687-4f45-9708-019B960494DF}">
-                  <a14:hiddenLine xmlns="" xmlns:a14="http://schemas.microsoft.com/office/drawing/2010/main" w="9525">
+                  <a14:hiddenLine xmlns:a14="http://schemas.microsoft.com/office/drawing/2010/main" xmlns="" w="9525">
                     <a:solidFill>
                       <a:srgbClr val="000000"/>
                     </a:solidFill>
@@ -11617,7 +11617,7 @@
               </a:ln>
               <a:extLst>
                 <a:ext uri="{91240B29-F687-4f45-9708-019B960494DF}">
-                  <a14:hiddenLine xmlns="" xmlns:a14="http://schemas.microsoft.com/office/drawing/2010/main" w="9525">
+                  <a14:hiddenLine xmlns:a14="http://schemas.microsoft.com/office/drawing/2010/main" xmlns="" w="9525">
                     <a:solidFill>
                       <a:srgbClr val="000000"/>
                     </a:solidFill>
@@ -11682,7 +11682,7 @@
               </a:ln>
               <a:extLst>
                 <a:ext uri="{91240B29-F687-4f45-9708-019B960494DF}">
-                  <a14:hiddenLine xmlns="" xmlns:a14="http://schemas.microsoft.com/office/drawing/2010/main" w="9525">
+                  <a14:hiddenLine xmlns:a14="http://schemas.microsoft.com/office/drawing/2010/main" xmlns="" w="9525">
                     <a:solidFill>
                       <a:srgbClr val="000000"/>
                     </a:solidFill>
@@ -11802,7 +11802,7 @@
               </a:ln>
               <a:extLst>
                 <a:ext uri="{91240B29-F687-4f45-9708-019B960494DF}">
-                  <a14:hiddenLine xmlns="" xmlns:a14="http://schemas.microsoft.com/office/drawing/2010/main" w="9525">
+                  <a14:hiddenLine xmlns:a14="http://schemas.microsoft.com/office/drawing/2010/main" xmlns="" w="9525">
                     <a:solidFill>
                       <a:srgbClr val="000000"/>
                     </a:solidFill>
@@ -11900,7 +11900,7 @@
               </a:ln>
               <a:extLst>
                 <a:ext uri="{91240B29-F687-4f45-9708-019B960494DF}">
-                  <a14:hiddenLine xmlns="" xmlns:a14="http://schemas.microsoft.com/office/drawing/2010/main" w="9525">
+                  <a14:hiddenLine xmlns:a14="http://schemas.microsoft.com/office/drawing/2010/main" xmlns="" w="9525">
                     <a:solidFill>
                       <a:srgbClr val="000000"/>
                     </a:solidFill>
@@ -12015,7 +12015,7 @@
               </a:ln>
               <a:extLst>
                 <a:ext uri="{91240B29-F687-4f45-9708-019B960494DF}">
-                  <a14:hiddenLine xmlns="" xmlns:a14="http://schemas.microsoft.com/office/drawing/2010/main" w="9525">
+                  <a14:hiddenLine xmlns:a14="http://schemas.microsoft.com/office/drawing/2010/main" xmlns="" w="9525">
                     <a:solidFill>
                       <a:srgbClr val="000000"/>
                     </a:solidFill>
@@ -12105,7 +12105,7 @@
               </a:ln>
               <a:extLst>
                 <a:ext uri="{91240B29-F687-4f45-9708-019B960494DF}">
-                  <a14:hiddenLine xmlns="" xmlns:a14="http://schemas.microsoft.com/office/drawing/2010/main" w="9525">
+                  <a14:hiddenLine xmlns:a14="http://schemas.microsoft.com/office/drawing/2010/main" xmlns="" w="9525">
                     <a:solidFill>
                       <a:srgbClr val="000000"/>
                     </a:solidFill>
@@ -12170,7 +12170,7 @@
               </a:ln>
               <a:extLst>
                 <a:ext uri="{91240B29-F687-4f45-9708-019B960494DF}">
-                  <a14:hiddenLine xmlns="" xmlns:a14="http://schemas.microsoft.com/office/drawing/2010/main" w="9525">
+                  <a14:hiddenLine xmlns:a14="http://schemas.microsoft.com/office/drawing/2010/main" xmlns="" w="9525">
                     <a:solidFill>
                       <a:srgbClr val="000000"/>
                     </a:solidFill>
@@ -12260,7 +12260,7 @@
               </a:ln>
               <a:extLst>
                 <a:ext uri="{91240B29-F687-4f45-9708-019B960494DF}">
-                  <a14:hiddenLine xmlns="" xmlns:a14="http://schemas.microsoft.com/office/drawing/2010/main" w="9525">
+                  <a14:hiddenLine xmlns:a14="http://schemas.microsoft.com/office/drawing/2010/main" xmlns="" w="9525">
                     <a:solidFill>
                       <a:srgbClr val="000000"/>
                     </a:solidFill>
@@ -12328,7 +12328,7 @@
               </a:ln>
               <a:extLst>
                 <a:ext uri="{91240B29-F687-4f45-9708-019B960494DF}">
-                  <a14:hiddenLine xmlns="" xmlns:a14="http://schemas.microsoft.com/office/drawing/2010/main" w="9525">
+                  <a14:hiddenLine xmlns:a14="http://schemas.microsoft.com/office/drawing/2010/main" xmlns="" w="9525">
                     <a:solidFill>
                       <a:srgbClr val="000000"/>
                     </a:solidFill>
@@ -12418,7 +12418,7 @@
               </a:ln>
               <a:extLst>
                 <a:ext uri="{91240B29-F687-4f45-9708-019B960494DF}">
-                  <a14:hiddenLine xmlns="" xmlns:a14="http://schemas.microsoft.com/office/drawing/2010/main" w="9525">
+                  <a14:hiddenLine xmlns:a14="http://schemas.microsoft.com/office/drawing/2010/main" xmlns="" w="9525">
                     <a:solidFill>
                       <a:srgbClr val="000000"/>
                     </a:solidFill>
@@ -12486,7 +12486,7 @@
               </a:ln>
               <a:extLst>
                 <a:ext uri="{91240B29-F687-4f45-9708-019B960494DF}">
-                  <a14:hiddenLine xmlns="" xmlns:a14="http://schemas.microsoft.com/office/drawing/2010/main" w="9525">
+                  <a14:hiddenLine xmlns:a14="http://schemas.microsoft.com/office/drawing/2010/main" xmlns="" w="9525">
                     <a:solidFill>
                       <a:srgbClr val="000000"/>
                     </a:solidFill>
@@ -12576,7 +12576,7 @@
               </a:ln>
               <a:extLst>
                 <a:ext uri="{91240B29-F687-4f45-9708-019B960494DF}">
-                  <a14:hiddenLine xmlns="" xmlns:a14="http://schemas.microsoft.com/office/drawing/2010/main" w="9525">
+                  <a14:hiddenLine xmlns:a14="http://schemas.microsoft.com/office/drawing/2010/main" xmlns="" w="9525">
                     <a:solidFill>
                       <a:srgbClr val="000000"/>
                     </a:solidFill>
@@ -12610,7 +12610,7 @@
               </a:ln>
               <a:extLst>
                 <a:ext uri="{91240B29-F687-4f45-9708-019B960494DF}">
-                  <a14:hiddenLine xmlns="" xmlns:a14="http://schemas.microsoft.com/office/drawing/2010/main" w="9525">
+                  <a14:hiddenLine xmlns:a14="http://schemas.microsoft.com/office/drawing/2010/main" xmlns="" w="9525">
                     <a:solidFill>
                       <a:srgbClr val="000000"/>
                     </a:solidFill>
@@ -12750,7 +12750,7 @@
           <a:p>
             <a:fld id="{AFFA8E18-38E7-4AF1-A6D2-47C002B4AF53}" type="datetimeFigureOut">
               <a:rPr lang="en-US" smtClean="0"/>
-              <a:t>12/2/20</a:t>
+              <a:t>12/2/2020</a:t>
             </a:fld>
             <a:endParaRPr lang="en-US"/>
           </a:p>
@@ -13265,7 +13265,7 @@
           <p:cNvPr id="2" name="Tittel 1">
             <a:extLst>
               <a:ext uri="{FF2B5EF4-FFF2-40B4-BE49-F238E27FC236}">
-                <a16:creationId xmlns:a16="http://schemas.microsoft.com/office/drawing/2014/main" id="{05393AF7-A346-704E-878A-BEE346461D6E}"/>
+                <a16:creationId xmlns:a16="http://schemas.microsoft.com/office/drawing/2014/main" id="{C781ED52-8BDC-43DB-A322-58B9C17F8612}"/>
               </a:ext>
             </a:extLst>
           </p:cNvPr>
@@ -13283,60 +13283,22 @@
           <a:p>
             <a:r>
               <a:rPr lang="nb-NO" dirty="0"/>
-              <a:t>Konvergens for </a:t>
+              <a:t>Relaksering av </a:t>
             </a:r>
             <a:r>
               <a:rPr lang="nb-NO" dirty="0" err="1"/>
-              <a:t>quinizarin</a:t>
-            </a:r>
-            <a:endParaRPr lang="nb-NO" dirty="0"/>
-          </a:p>
-        </p:txBody>
-      </p:sp>
-      <p:sp>
-        <p:nvSpPr>
-          <p:cNvPr id="3" name="Plassholder for innhold 2">
-            <a:extLst>
-              <a:ext uri="{FF2B5EF4-FFF2-40B4-BE49-F238E27FC236}">
-                <a16:creationId xmlns:a16="http://schemas.microsoft.com/office/drawing/2014/main" id="{5062EBB3-060F-264E-BFBB-CD1271629D94}"/>
-              </a:ext>
-            </a:extLst>
-          </p:cNvPr>
-          <p:cNvSpPr>
-            <a:spLocks noGrp="1"/>
-          </p:cNvSpPr>
-          <p:nvPr>
-            <p:ph idx="1"/>
-          </p:nvPr>
-        </p:nvSpPr>
-        <p:spPr>
-          <a:xfrm>
-            <a:off x="1141413" y="1795191"/>
-            <a:ext cx="1445377" cy="603794"/>
-          </a:xfrm>
-        </p:spPr>
-        <p:txBody>
-          <a:bodyPr/>
-          <a:lstStyle/>
-          <a:p>
-            <a:r>
-              <a:rPr lang="nb-NO" dirty="0"/>
-              <a:t>k-</a:t>
-            </a:r>
-            <a:r>
-              <a:rPr lang="nb-NO" dirty="0" err="1"/>
-              <a:t>point</a:t>
-            </a:r>
-            <a:endParaRPr lang="nb-NO" dirty="0"/>
+              <a:t>Quinizarin</a:t>
+            </a:r>
+            <a:endParaRPr lang="en-US" dirty="0"/>
           </a:p>
         </p:txBody>
       </p:sp>
       <p:pic>
         <p:nvPicPr>
-          <p:cNvPr id="7" name="Bilde 6">
+          <p:cNvPr id="5" name="Bilde 4" descr="Et bilde som inneholder dag&#10;&#10;Automatisk generert beskrivelse">
             <a:extLst>
               <a:ext uri="{FF2B5EF4-FFF2-40B4-BE49-F238E27FC236}">
-                <a16:creationId xmlns:a16="http://schemas.microsoft.com/office/drawing/2014/main" id="{FD65437B-5D52-D644-B463-A1E42F1AE92A}"/>
+                <a16:creationId xmlns:a16="http://schemas.microsoft.com/office/drawing/2014/main" id="{A157F21A-0466-C845-9A30-27E9A58EA9B4}"/>
               </a:ext>
             </a:extLst>
           </p:cNvPr>
@@ -13345,7 +13307,7 @@
           </p:cNvPicPr>
           <p:nvPr/>
         </p:nvPicPr>
-        <p:blipFill>
+        <p:blipFill rotWithShape="1">
           <a:blip r:embed="rId2">
             <a:extLst>
               <a:ext uri="{28A0092B-C50C-407E-A947-70E740481C1C}">
@@ -13353,14 +13315,13 @@
               </a:ext>
             </a:extLst>
           </a:blip>
-          <a:stretch>
-            <a:fillRect/>
-          </a:stretch>
+          <a:srcRect l="7298" t="8472" r="27452" b="7582"/>
+          <a:stretch/>
         </p:blipFill>
         <p:spPr>
           <a:xfrm>
-            <a:off x="6465218" y="2636764"/>
-            <a:ext cx="5140244" cy="3855183"/>
+            <a:off x="372107" y="2571750"/>
+            <a:ext cx="5612470" cy="3357562"/>
           </a:xfrm>
           <a:prstGeom prst="rect">
             <a:avLst/>
@@ -13369,10 +13330,10 @@
       </p:pic>
       <p:pic>
         <p:nvPicPr>
-          <p:cNvPr id="9" name="Bilde 8">
+          <p:cNvPr id="7" name="Bilde 6" descr="Et bilde som inneholder dag&#10;&#10;Automatisk generert beskrivelse">
             <a:extLst>
               <a:ext uri="{FF2B5EF4-FFF2-40B4-BE49-F238E27FC236}">
-                <a16:creationId xmlns:a16="http://schemas.microsoft.com/office/drawing/2014/main" id="{F6E2D91D-164B-5242-9531-C6469B6D60E1}"/>
+                <a16:creationId xmlns:a16="http://schemas.microsoft.com/office/drawing/2014/main" id="{960DEAEE-7B05-D74B-A21E-22506FCC86C1}"/>
               </a:ext>
             </a:extLst>
           </p:cNvPr>
@@ -13381,7 +13342,7 @@
           </p:cNvPicPr>
           <p:nvPr/>
         </p:nvPicPr>
-        <p:blipFill>
+        <p:blipFill rotWithShape="1">
           <a:blip r:embed="rId3">
             <a:extLst>
               <a:ext uri="{28A0092B-C50C-407E-A947-70E740481C1C}">
@@ -13389,14 +13350,13 @@
               </a:ext>
             </a:extLst>
           </a:blip>
-          <a:stretch>
-            <a:fillRect/>
-          </a:stretch>
+          <a:srcRect l="7298" t="8662" r="27452" b="7299"/>
+          <a:stretch/>
         </p:blipFill>
         <p:spPr>
           <a:xfrm>
-            <a:off x="1000125" y="2636764"/>
-            <a:ext cx="5140241" cy="3855181"/>
+            <a:off x="6213625" y="2571750"/>
+            <a:ext cx="5606268" cy="3357562"/>
           </a:xfrm>
           <a:prstGeom prst="rect">
             <a:avLst/>
@@ -13406,7 +13366,7 @@
     </p:spTree>
     <p:extLst>
       <p:ext uri="{BB962C8B-B14F-4D97-AF65-F5344CB8AC3E}">
-        <p14:creationId xmlns:p14="http://schemas.microsoft.com/office/powerpoint/2010/main" val="1930082410"/>
+        <p14:creationId xmlns:p14="http://schemas.microsoft.com/office/powerpoint/2010/main" val="437827719"/>
       </p:ext>
     </p:extLst>
   </p:cSld>
@@ -13455,8 +13415,16 @@
           <a:lstStyle/>
           <a:p>
             <a:r>
-              <a:rPr lang="nb-NO"/>
-              <a:t>Quinizarin med Y</a:t>
+              <a:rPr lang="nb-NO" dirty="0"/>
+              <a:t>Relaksering av </a:t>
+            </a:r>
+            <a:r>
+              <a:rPr lang="nb-NO" dirty="0" err="1"/>
+              <a:t>Quinizarin</a:t>
+            </a:r>
+            <a:r>
+              <a:rPr lang="nb-NO" dirty="0"/>
+              <a:t> med Y</a:t>
             </a:r>
             <a:endParaRPr lang="en-US" dirty="0"/>
           </a:p>
@@ -13598,6 +13566,10 @@
               </a:spcBef>
               <a:buSzPct val="125000"/>
             </a:pPr>
+            <a:r>
+              <a:rPr lang="nb-NO" dirty="0"/>
+              <a:t>Relaksering av </a:t>
+            </a:r>
             <a:r>
               <a:rPr lang="nb-NO" dirty="0" err="1"/>
               <a:t>Quinizarin</a:t>
@@ -15728,9 +15700,16 @@
             <p:ph idx="1"/>
           </p:nvPr>
         </p:nvSpPr>
-        <p:spPr/>
+        <p:spPr>
+          <a:xfrm>
+            <a:off x="1141412" y="2249487"/>
+            <a:ext cx="4954587" cy="3541714"/>
+          </a:xfrm>
+        </p:spPr>
         <p:txBody>
-          <a:bodyPr/>
+          <a:bodyPr>
+            <a:normAutofit/>
+          </a:bodyPr>
           <a:lstStyle/>
           <a:p>
             <a:r>
@@ -15751,10 +15730,259 @@
           <a:p>
             <a:r>
               <a:rPr lang="nb-NO" dirty="0"/>
-              <a:t>Kjøringer</a:t>
-            </a:r>
-          </a:p>
-          <a:p>
+              <a:t>DFT og kjøringer</a:t>
+            </a:r>
+          </a:p>
+          <a:p>
+            <a:r>
+              <a:rPr lang="nb-NO" dirty="0"/>
+              <a:t>Konvergens</a:t>
+            </a:r>
+          </a:p>
+          <a:p>
+            <a:r>
+              <a:rPr lang="nb-NO" dirty="0"/>
+              <a:t>Relaksering</a:t>
+            </a:r>
+          </a:p>
+          <a:p>
+            <a:pPr marL="0" indent="0">
+              <a:buNone/>
+            </a:pPr>
+            <a:endParaRPr lang="nb-NO" dirty="0"/>
+          </a:p>
+          <a:p>
+            <a:endParaRPr lang="nb-NO" dirty="0"/>
+          </a:p>
+          <a:p>
+            <a:endParaRPr lang="en-US" dirty="0"/>
+          </a:p>
+        </p:txBody>
+      </p:sp>
+      <p:sp>
+        <p:nvSpPr>
+          <p:cNvPr id="5" name="Plassholder for innhold 2">
+            <a:extLst>
+              <a:ext uri="{FF2B5EF4-FFF2-40B4-BE49-F238E27FC236}">
+                <a16:creationId xmlns:a16="http://schemas.microsoft.com/office/drawing/2014/main" id="{3CA34886-CAA0-4FB4-999F-D4D933563106}"/>
+              </a:ext>
+            </a:extLst>
+          </p:cNvPr>
+          <p:cNvSpPr txBox="1">
+            <a:spLocks/>
+          </p:cNvSpPr>
+          <p:nvPr/>
+        </p:nvSpPr>
+        <p:spPr>
+          <a:xfrm>
+            <a:off x="6095999" y="2097088"/>
+            <a:ext cx="5103811" cy="3846513"/>
+          </a:xfrm>
+          <a:prstGeom prst="rect">
+            <a:avLst/>
+          </a:prstGeom>
+        </p:spPr>
+        <p:txBody>
+          <a:bodyPr vert="horz" lIns="91440" tIns="45720" rIns="91440" bIns="45720" rtlCol="0">
+            <a:normAutofit/>
+          </a:bodyPr>
+          <a:lstStyle>
+            <a:lvl1pPr marL="228600" indent="-228600" algn="l" defTabSz="914400" rtl="0" eaLnBrk="1" latinLnBrk="0" hangingPunct="1">
+              <a:lnSpc>
+                <a:spcPct val="120000"/>
+              </a:lnSpc>
+              <a:spcBef>
+                <a:spcPts val="1000"/>
+              </a:spcBef>
+              <a:buSzPct val="125000"/>
+              <a:buFont typeface="Arial" panose="020B0604020202020204" pitchFamily="34" charset="0"/>
+              <a:buChar char="•"/>
+              <a:defRPr sz="2400" kern="1200">
+                <a:solidFill>
+                  <a:schemeClr val="tx1"/>
+                </a:solidFill>
+                <a:latin typeface="+mn-lt"/>
+                <a:ea typeface="+mn-ea"/>
+                <a:cs typeface="+mn-cs"/>
+              </a:defRPr>
+            </a:lvl1pPr>
+            <a:lvl2pPr marL="685800" indent="-228600" algn="l" defTabSz="914400" rtl="0" eaLnBrk="1" latinLnBrk="0" hangingPunct="1">
+              <a:lnSpc>
+                <a:spcPct val="120000"/>
+              </a:lnSpc>
+              <a:spcBef>
+                <a:spcPts val="500"/>
+              </a:spcBef>
+              <a:buSzPct val="125000"/>
+              <a:buFont typeface="Arial" panose="020B0604020202020204" pitchFamily="34" charset="0"/>
+              <a:buChar char="•"/>
+              <a:defRPr sz="2000" kern="1200">
+                <a:solidFill>
+                  <a:schemeClr val="tx1"/>
+                </a:solidFill>
+                <a:latin typeface="+mn-lt"/>
+                <a:ea typeface="+mn-ea"/>
+                <a:cs typeface="+mn-cs"/>
+              </a:defRPr>
+            </a:lvl2pPr>
+            <a:lvl3pPr marL="1143000" indent="-228600" algn="l" defTabSz="914400" rtl="0" eaLnBrk="1" latinLnBrk="0" hangingPunct="1">
+              <a:lnSpc>
+                <a:spcPct val="120000"/>
+              </a:lnSpc>
+              <a:spcBef>
+                <a:spcPts val="500"/>
+              </a:spcBef>
+              <a:buSzPct val="125000"/>
+              <a:buFont typeface="Arial" panose="020B0604020202020204" pitchFamily="34" charset="0"/>
+              <a:buChar char="•"/>
+              <a:defRPr sz="1800" kern="1200">
+                <a:solidFill>
+                  <a:schemeClr val="tx1"/>
+                </a:solidFill>
+                <a:latin typeface="+mn-lt"/>
+                <a:ea typeface="+mn-ea"/>
+                <a:cs typeface="+mn-cs"/>
+              </a:defRPr>
+            </a:lvl3pPr>
+            <a:lvl4pPr marL="1600200" indent="-228600" algn="l" defTabSz="914400" rtl="0" eaLnBrk="1" latinLnBrk="0" hangingPunct="1">
+              <a:lnSpc>
+                <a:spcPct val="120000"/>
+              </a:lnSpc>
+              <a:spcBef>
+                <a:spcPts val="500"/>
+              </a:spcBef>
+              <a:buSzPct val="125000"/>
+              <a:buFont typeface="Arial" panose="020B0604020202020204" pitchFamily="34" charset="0"/>
+              <a:buChar char="•"/>
+              <a:defRPr sz="1600" kern="1200">
+                <a:solidFill>
+                  <a:schemeClr val="tx1"/>
+                </a:solidFill>
+                <a:latin typeface="+mn-lt"/>
+                <a:ea typeface="+mn-ea"/>
+                <a:cs typeface="+mn-cs"/>
+              </a:defRPr>
+            </a:lvl4pPr>
+            <a:lvl5pPr marL="2057400" indent="-228600" algn="l" defTabSz="914400" rtl="0" eaLnBrk="1" latinLnBrk="0" hangingPunct="1">
+              <a:lnSpc>
+                <a:spcPct val="120000"/>
+              </a:lnSpc>
+              <a:spcBef>
+                <a:spcPts val="500"/>
+              </a:spcBef>
+              <a:buSzPct val="125000"/>
+              <a:buFont typeface="Arial" panose="020B0604020202020204" pitchFamily="34" charset="0"/>
+              <a:buChar char="•"/>
+              <a:defRPr sz="1600" kern="1200">
+                <a:solidFill>
+                  <a:schemeClr val="tx1"/>
+                </a:solidFill>
+                <a:latin typeface="+mn-lt"/>
+                <a:ea typeface="+mn-ea"/>
+                <a:cs typeface="+mn-cs"/>
+              </a:defRPr>
+            </a:lvl5pPr>
+            <a:lvl6pPr marL="2514600" indent="-228600" algn="l" defTabSz="914400" rtl="0" eaLnBrk="1" latinLnBrk="0" hangingPunct="1">
+              <a:lnSpc>
+                <a:spcPct val="120000"/>
+              </a:lnSpc>
+              <a:spcBef>
+                <a:spcPts val="500"/>
+              </a:spcBef>
+              <a:buSzPct val="125000"/>
+              <a:buFont typeface="Arial" panose="020B0604020202020204" pitchFamily="34" charset="0"/>
+              <a:buChar char="•"/>
+              <a:defRPr sz="1400" kern="1200">
+                <a:solidFill>
+                  <a:schemeClr val="tx1"/>
+                </a:solidFill>
+                <a:latin typeface="+mn-lt"/>
+                <a:ea typeface="+mn-ea"/>
+                <a:cs typeface="+mn-cs"/>
+              </a:defRPr>
+            </a:lvl6pPr>
+            <a:lvl7pPr marL="2971800" indent="-228600" algn="l" defTabSz="914400" rtl="0" eaLnBrk="1" latinLnBrk="0" hangingPunct="1">
+              <a:lnSpc>
+                <a:spcPct val="120000"/>
+              </a:lnSpc>
+              <a:spcBef>
+                <a:spcPts val="500"/>
+              </a:spcBef>
+              <a:buSzPct val="125000"/>
+              <a:buFont typeface="Arial" panose="020B0604020202020204" pitchFamily="34" charset="0"/>
+              <a:buChar char="•"/>
+              <a:defRPr sz="1400" kern="1200">
+                <a:solidFill>
+                  <a:schemeClr val="tx1"/>
+                </a:solidFill>
+                <a:latin typeface="+mn-lt"/>
+                <a:ea typeface="+mn-ea"/>
+                <a:cs typeface="+mn-cs"/>
+              </a:defRPr>
+            </a:lvl7pPr>
+            <a:lvl8pPr marL="3429000" indent="-228600" algn="l" defTabSz="914400" rtl="0" eaLnBrk="1" latinLnBrk="0" hangingPunct="1">
+              <a:lnSpc>
+                <a:spcPct val="120000"/>
+              </a:lnSpc>
+              <a:spcBef>
+                <a:spcPts val="500"/>
+              </a:spcBef>
+              <a:buSzPct val="125000"/>
+              <a:buFont typeface="Arial" panose="020B0604020202020204" pitchFamily="34" charset="0"/>
+              <a:buChar char="•"/>
+              <a:defRPr sz="1400" kern="1200">
+                <a:solidFill>
+                  <a:schemeClr val="tx1"/>
+                </a:solidFill>
+                <a:latin typeface="+mn-lt"/>
+                <a:ea typeface="+mn-ea"/>
+                <a:cs typeface="+mn-cs"/>
+              </a:defRPr>
+            </a:lvl8pPr>
+            <a:lvl9pPr marL="3886200" indent="-228600" algn="l" defTabSz="914400" rtl="0" eaLnBrk="1" latinLnBrk="0" hangingPunct="1">
+              <a:lnSpc>
+                <a:spcPct val="120000"/>
+              </a:lnSpc>
+              <a:spcBef>
+                <a:spcPts val="500"/>
+              </a:spcBef>
+              <a:buSzPct val="125000"/>
+              <a:buFont typeface="Arial" panose="020B0604020202020204" pitchFamily="34" charset="0"/>
+              <a:buChar char="•"/>
+              <a:defRPr sz="1400" kern="1200">
+                <a:solidFill>
+                  <a:schemeClr val="tx1"/>
+                </a:solidFill>
+                <a:latin typeface="+mn-lt"/>
+                <a:ea typeface="+mn-ea"/>
+                <a:cs typeface="+mn-cs"/>
+              </a:defRPr>
+            </a:lvl9pPr>
+          </a:lstStyle>
+          <a:p>
+            <a:r>
+              <a:rPr lang="nb-NO" dirty="0"/>
+              <a:t>Energier</a:t>
+            </a:r>
+          </a:p>
+          <a:p>
+            <a:r>
+              <a:rPr lang="nb-NO" dirty="0"/>
+              <a:t>DOS</a:t>
+            </a:r>
+          </a:p>
+          <a:p>
+            <a:r>
+              <a:rPr lang="nb-NO" dirty="0" err="1"/>
+              <a:t>Båndgap</a:t>
+            </a:r>
+            <a:endParaRPr lang="nb-NO" dirty="0"/>
+          </a:p>
+          <a:p>
+            <a:r>
+              <a:rPr lang="nb-NO" dirty="0"/>
+              <a:t>Ladningstetthet</a:t>
+            </a:r>
             <a:endParaRPr lang="en-US" dirty="0"/>
           </a:p>
         </p:txBody>
@@ -17195,135 +17423,6 @@
           <p:cNvPr id="2" name="Tittel 1">
             <a:extLst>
               <a:ext uri="{FF2B5EF4-FFF2-40B4-BE49-F238E27FC236}">
-                <a16:creationId xmlns:a16="http://schemas.microsoft.com/office/drawing/2014/main" id="{C781ED52-8BDC-43DB-A322-58B9C17F8612}"/>
-              </a:ext>
-            </a:extLst>
-          </p:cNvPr>
-          <p:cNvSpPr>
-            <a:spLocks noGrp="1"/>
-          </p:cNvSpPr>
-          <p:nvPr>
-            <p:ph type="title"/>
-          </p:nvPr>
-        </p:nvSpPr>
-        <p:spPr/>
-        <p:txBody>
-          <a:bodyPr/>
-          <a:lstStyle/>
-          <a:p>
-            <a:r>
-              <a:rPr lang="nb-NO" dirty="0" err="1"/>
-              <a:t>Quinizarin</a:t>
-            </a:r>
-            <a:endParaRPr lang="en-US" dirty="0"/>
-          </a:p>
-        </p:txBody>
-      </p:sp>
-      <p:pic>
-        <p:nvPicPr>
-          <p:cNvPr id="5" name="Bilde 4" descr="Et bilde som inneholder dag&#10;&#10;Automatisk generert beskrivelse">
-            <a:extLst>
-              <a:ext uri="{FF2B5EF4-FFF2-40B4-BE49-F238E27FC236}">
-                <a16:creationId xmlns:a16="http://schemas.microsoft.com/office/drawing/2014/main" id="{A157F21A-0466-C845-9A30-27E9A58EA9B4}"/>
-              </a:ext>
-            </a:extLst>
-          </p:cNvPr>
-          <p:cNvPicPr>
-            <a:picLocks noChangeAspect="1"/>
-          </p:cNvPicPr>
-          <p:nvPr/>
-        </p:nvPicPr>
-        <p:blipFill rotWithShape="1">
-          <a:blip r:embed="rId2">
-            <a:extLst>
-              <a:ext uri="{28A0092B-C50C-407E-A947-70E740481C1C}">
-                <a14:useLocalDpi xmlns:a14="http://schemas.microsoft.com/office/drawing/2010/main" val="0"/>
-              </a:ext>
-            </a:extLst>
-          </a:blip>
-          <a:srcRect l="7298" t="8472" r="27452" b="7582"/>
-          <a:stretch/>
-        </p:blipFill>
-        <p:spPr>
-          <a:xfrm>
-            <a:off x="372107" y="2571750"/>
-            <a:ext cx="5612470" cy="3357562"/>
-          </a:xfrm>
-          <a:prstGeom prst="rect">
-            <a:avLst/>
-          </a:prstGeom>
-        </p:spPr>
-      </p:pic>
-      <p:pic>
-        <p:nvPicPr>
-          <p:cNvPr id="7" name="Bilde 6" descr="Et bilde som inneholder dag&#10;&#10;Automatisk generert beskrivelse">
-            <a:extLst>
-              <a:ext uri="{FF2B5EF4-FFF2-40B4-BE49-F238E27FC236}">
-                <a16:creationId xmlns:a16="http://schemas.microsoft.com/office/drawing/2014/main" id="{960DEAEE-7B05-D74B-A21E-22506FCC86C1}"/>
-              </a:ext>
-            </a:extLst>
-          </p:cNvPr>
-          <p:cNvPicPr>
-            <a:picLocks noChangeAspect="1"/>
-          </p:cNvPicPr>
-          <p:nvPr/>
-        </p:nvPicPr>
-        <p:blipFill rotWithShape="1">
-          <a:blip r:embed="rId3">
-            <a:extLst>
-              <a:ext uri="{28A0092B-C50C-407E-A947-70E740481C1C}">
-                <a14:useLocalDpi xmlns:a14="http://schemas.microsoft.com/office/drawing/2010/main" val="0"/>
-              </a:ext>
-            </a:extLst>
-          </a:blip>
-          <a:srcRect l="7298" t="8662" r="27452" b="7299"/>
-          <a:stretch/>
-        </p:blipFill>
-        <p:spPr>
-          <a:xfrm>
-            <a:off x="6213625" y="2571750"/>
-            <a:ext cx="5606268" cy="3357562"/>
-          </a:xfrm>
-          <a:prstGeom prst="rect">
-            <a:avLst/>
-          </a:prstGeom>
-        </p:spPr>
-      </p:pic>
-    </p:spTree>
-    <p:extLst>
-      <p:ext uri="{BB962C8B-B14F-4D97-AF65-F5344CB8AC3E}">
-        <p14:creationId xmlns:p14="http://schemas.microsoft.com/office/powerpoint/2010/main" val="437827719"/>
-      </p:ext>
-    </p:extLst>
-  </p:cSld>
-  <p:clrMapOvr>
-    <a:masterClrMapping/>
-  </p:clrMapOvr>
-</p:sld>
-</file>
-
-<file path=ppt/slides/slide9.xml><?xml version="1.0" encoding="utf-8"?>
-<p:sld xmlns:a="http://schemas.openxmlformats.org/drawingml/2006/main" xmlns:r="http://schemas.openxmlformats.org/officeDocument/2006/relationships" xmlns:p="http://schemas.openxmlformats.org/presentationml/2006/main">
-  <p:cSld>
-    <p:spTree>
-      <p:nvGrpSpPr>
-        <p:cNvPr id="1" name=""/>
-        <p:cNvGrpSpPr/>
-        <p:nvPr/>
-      </p:nvGrpSpPr>
-      <p:grpSpPr>
-        <a:xfrm>
-          <a:off x="0" y="0"/>
-          <a:ext cx="0" cy="0"/>
-          <a:chOff x="0" y="0"/>
-          <a:chExt cx="0" cy="0"/>
-        </a:xfrm>
-      </p:grpSpPr>
-      <p:sp>
-        <p:nvSpPr>
-          <p:cNvPr id="2" name="Tittel 1">
-            <a:extLst>
-              <a:ext uri="{FF2B5EF4-FFF2-40B4-BE49-F238E27FC236}">
                 <a16:creationId xmlns:a16="http://schemas.microsoft.com/office/drawing/2014/main" id="{05393AF7-A346-704E-878A-BEE346461D6E}"/>
               </a:ext>
             </a:extLst>
@@ -17464,6 +17563,179 @@
     <p:extLst>
       <p:ext uri="{BB962C8B-B14F-4D97-AF65-F5344CB8AC3E}">
         <p14:creationId xmlns:p14="http://schemas.microsoft.com/office/powerpoint/2010/main" val="248458425"/>
+      </p:ext>
+    </p:extLst>
+  </p:cSld>
+  <p:clrMapOvr>
+    <a:masterClrMapping/>
+  </p:clrMapOvr>
+</p:sld>
+</file>
+
+<file path=ppt/slides/slide9.xml><?xml version="1.0" encoding="utf-8"?>
+<p:sld xmlns:a="http://schemas.openxmlformats.org/drawingml/2006/main" xmlns:r="http://schemas.openxmlformats.org/officeDocument/2006/relationships" xmlns:p="http://schemas.openxmlformats.org/presentationml/2006/main">
+  <p:cSld>
+    <p:spTree>
+      <p:nvGrpSpPr>
+        <p:cNvPr id="1" name=""/>
+        <p:cNvGrpSpPr/>
+        <p:nvPr/>
+      </p:nvGrpSpPr>
+      <p:grpSpPr>
+        <a:xfrm>
+          <a:off x="0" y="0"/>
+          <a:ext cx="0" cy="0"/>
+          <a:chOff x="0" y="0"/>
+          <a:chExt cx="0" cy="0"/>
+        </a:xfrm>
+      </p:grpSpPr>
+      <p:sp>
+        <p:nvSpPr>
+          <p:cNvPr id="2" name="Tittel 1">
+            <a:extLst>
+              <a:ext uri="{FF2B5EF4-FFF2-40B4-BE49-F238E27FC236}">
+                <a16:creationId xmlns:a16="http://schemas.microsoft.com/office/drawing/2014/main" id="{05393AF7-A346-704E-878A-BEE346461D6E}"/>
+              </a:ext>
+            </a:extLst>
+          </p:cNvPr>
+          <p:cNvSpPr>
+            <a:spLocks noGrp="1"/>
+          </p:cNvSpPr>
+          <p:nvPr>
+            <p:ph type="title"/>
+          </p:nvPr>
+        </p:nvSpPr>
+        <p:spPr/>
+        <p:txBody>
+          <a:bodyPr/>
+          <a:lstStyle/>
+          <a:p>
+            <a:r>
+              <a:rPr lang="nb-NO" dirty="0"/>
+              <a:t>Konvergens for </a:t>
+            </a:r>
+            <a:r>
+              <a:rPr lang="nb-NO" dirty="0" err="1"/>
+              <a:t>quinizarin</a:t>
+            </a:r>
+            <a:endParaRPr lang="nb-NO" dirty="0"/>
+          </a:p>
+        </p:txBody>
+      </p:sp>
+      <p:sp>
+        <p:nvSpPr>
+          <p:cNvPr id="3" name="Plassholder for innhold 2">
+            <a:extLst>
+              <a:ext uri="{FF2B5EF4-FFF2-40B4-BE49-F238E27FC236}">
+                <a16:creationId xmlns:a16="http://schemas.microsoft.com/office/drawing/2014/main" id="{5062EBB3-060F-264E-BFBB-CD1271629D94}"/>
+              </a:ext>
+            </a:extLst>
+          </p:cNvPr>
+          <p:cNvSpPr>
+            <a:spLocks noGrp="1"/>
+          </p:cNvSpPr>
+          <p:nvPr>
+            <p:ph idx="1"/>
+          </p:nvPr>
+        </p:nvSpPr>
+        <p:spPr>
+          <a:xfrm>
+            <a:off x="1141413" y="1795191"/>
+            <a:ext cx="1445377" cy="603794"/>
+          </a:xfrm>
+        </p:spPr>
+        <p:txBody>
+          <a:bodyPr/>
+          <a:lstStyle/>
+          <a:p>
+            <a:r>
+              <a:rPr lang="nb-NO" dirty="0"/>
+              <a:t>k-</a:t>
+            </a:r>
+            <a:r>
+              <a:rPr lang="nb-NO" dirty="0" err="1"/>
+              <a:t>point</a:t>
+            </a:r>
+            <a:endParaRPr lang="nb-NO" dirty="0"/>
+          </a:p>
+        </p:txBody>
+      </p:sp>
+      <p:pic>
+        <p:nvPicPr>
+          <p:cNvPr id="7" name="Bilde 6">
+            <a:extLst>
+              <a:ext uri="{FF2B5EF4-FFF2-40B4-BE49-F238E27FC236}">
+                <a16:creationId xmlns:a16="http://schemas.microsoft.com/office/drawing/2014/main" id="{FD65437B-5D52-D644-B463-A1E42F1AE92A}"/>
+              </a:ext>
+            </a:extLst>
+          </p:cNvPr>
+          <p:cNvPicPr>
+            <a:picLocks noChangeAspect="1"/>
+          </p:cNvPicPr>
+          <p:nvPr/>
+        </p:nvPicPr>
+        <p:blipFill>
+          <a:blip r:embed="rId2">
+            <a:extLst>
+              <a:ext uri="{28A0092B-C50C-407E-A947-70E740481C1C}">
+                <a14:useLocalDpi xmlns:a14="http://schemas.microsoft.com/office/drawing/2010/main" val="0"/>
+              </a:ext>
+            </a:extLst>
+          </a:blip>
+          <a:stretch>
+            <a:fillRect/>
+          </a:stretch>
+        </p:blipFill>
+        <p:spPr>
+          <a:xfrm>
+            <a:off x="6465218" y="2636764"/>
+            <a:ext cx="5140244" cy="3855183"/>
+          </a:xfrm>
+          <a:prstGeom prst="rect">
+            <a:avLst/>
+          </a:prstGeom>
+        </p:spPr>
+      </p:pic>
+      <p:pic>
+        <p:nvPicPr>
+          <p:cNvPr id="9" name="Bilde 8">
+            <a:extLst>
+              <a:ext uri="{FF2B5EF4-FFF2-40B4-BE49-F238E27FC236}">
+                <a16:creationId xmlns:a16="http://schemas.microsoft.com/office/drawing/2014/main" id="{F6E2D91D-164B-5242-9531-C6469B6D60E1}"/>
+              </a:ext>
+            </a:extLst>
+          </p:cNvPr>
+          <p:cNvPicPr>
+            <a:picLocks noChangeAspect="1"/>
+          </p:cNvPicPr>
+          <p:nvPr/>
+        </p:nvPicPr>
+        <p:blipFill>
+          <a:blip r:embed="rId3">
+            <a:extLst>
+              <a:ext uri="{28A0092B-C50C-407E-A947-70E740481C1C}">
+                <a14:useLocalDpi xmlns:a14="http://schemas.microsoft.com/office/drawing/2010/main" val="0"/>
+              </a:ext>
+            </a:extLst>
+          </a:blip>
+          <a:stretch>
+            <a:fillRect/>
+          </a:stretch>
+        </p:blipFill>
+        <p:spPr>
+          <a:xfrm>
+            <a:off x="1000125" y="2636764"/>
+            <a:ext cx="5140241" cy="3855181"/>
+          </a:xfrm>
+          <a:prstGeom prst="rect">
+            <a:avLst/>
+          </a:prstGeom>
+        </p:spPr>
+      </p:pic>
+    </p:spTree>
+    <p:extLst>
+      <p:ext uri="{BB962C8B-B14F-4D97-AF65-F5344CB8AC3E}">
+        <p14:creationId xmlns:p14="http://schemas.microsoft.com/office/powerpoint/2010/main" val="1930082410"/>
       </p:ext>
     </p:extLst>
   </p:cSld>

</xml_diff>